<commit_message>
Internal/JRC Release: VECTO 1.1 beta 3
See VECTO Changelog.txt for details
</commit_message>
<xml_diff>
--- a/User Manual Source/material User Manual.pptx
+++ b/User Manual Source/material User Manual.pptx
@@ -299,7 +299,7 @@
           <a:p>
             <a:fld id="{11A2203D-8DA4-4655-BF9E-AA17BDE25312}" type="datetimeFigureOut">
               <a:rPr lang="en-GB" smtClean="0"/>
-              <a:t>05/02/2013</a:t>
+              <a:t>20/03/2013</a:t>
             </a:fld>
             <a:endParaRPr lang="en-GB"/>
           </a:p>
@@ -469,7 +469,7 @@
           <a:p>
             <a:fld id="{11A2203D-8DA4-4655-BF9E-AA17BDE25312}" type="datetimeFigureOut">
               <a:rPr lang="en-GB" smtClean="0"/>
-              <a:t>05/02/2013</a:t>
+              <a:t>20/03/2013</a:t>
             </a:fld>
             <a:endParaRPr lang="en-GB"/>
           </a:p>
@@ -649,7 +649,7 @@
           <a:p>
             <a:fld id="{11A2203D-8DA4-4655-BF9E-AA17BDE25312}" type="datetimeFigureOut">
               <a:rPr lang="en-GB" smtClean="0"/>
-              <a:t>05/02/2013</a:t>
+              <a:t>20/03/2013</a:t>
             </a:fld>
             <a:endParaRPr lang="en-GB"/>
           </a:p>
@@ -819,7 +819,7 @@
           <a:p>
             <a:fld id="{11A2203D-8DA4-4655-BF9E-AA17BDE25312}" type="datetimeFigureOut">
               <a:rPr lang="en-GB" smtClean="0"/>
-              <a:t>05/02/2013</a:t>
+              <a:t>20/03/2013</a:t>
             </a:fld>
             <a:endParaRPr lang="en-GB"/>
           </a:p>
@@ -1065,7 +1065,7 @@
           <a:p>
             <a:fld id="{11A2203D-8DA4-4655-BF9E-AA17BDE25312}" type="datetimeFigureOut">
               <a:rPr lang="en-GB" smtClean="0"/>
-              <a:t>05/02/2013</a:t>
+              <a:t>20/03/2013</a:t>
             </a:fld>
             <a:endParaRPr lang="en-GB"/>
           </a:p>
@@ -1353,7 +1353,7 @@
           <a:p>
             <a:fld id="{11A2203D-8DA4-4655-BF9E-AA17BDE25312}" type="datetimeFigureOut">
               <a:rPr lang="en-GB" smtClean="0"/>
-              <a:t>05/02/2013</a:t>
+              <a:t>20/03/2013</a:t>
             </a:fld>
             <a:endParaRPr lang="en-GB"/>
           </a:p>
@@ -1775,7 +1775,7 @@
           <a:p>
             <a:fld id="{11A2203D-8DA4-4655-BF9E-AA17BDE25312}" type="datetimeFigureOut">
               <a:rPr lang="en-GB" smtClean="0"/>
-              <a:t>05/02/2013</a:t>
+              <a:t>20/03/2013</a:t>
             </a:fld>
             <a:endParaRPr lang="en-GB"/>
           </a:p>
@@ -1893,7 +1893,7 @@
           <a:p>
             <a:fld id="{11A2203D-8DA4-4655-BF9E-AA17BDE25312}" type="datetimeFigureOut">
               <a:rPr lang="en-GB" smtClean="0"/>
-              <a:t>05/02/2013</a:t>
+              <a:t>20/03/2013</a:t>
             </a:fld>
             <a:endParaRPr lang="en-GB"/>
           </a:p>
@@ -1988,7 +1988,7 @@
           <a:p>
             <a:fld id="{11A2203D-8DA4-4655-BF9E-AA17BDE25312}" type="datetimeFigureOut">
               <a:rPr lang="en-GB" smtClean="0"/>
-              <a:t>05/02/2013</a:t>
+              <a:t>20/03/2013</a:t>
             </a:fld>
             <a:endParaRPr lang="en-GB"/>
           </a:p>
@@ -2265,7 +2265,7 @@
           <a:p>
             <a:fld id="{11A2203D-8DA4-4655-BF9E-AA17BDE25312}" type="datetimeFigureOut">
               <a:rPr lang="en-GB" smtClean="0"/>
-              <a:t>05/02/2013</a:t>
+              <a:t>20/03/2013</a:t>
             </a:fld>
             <a:endParaRPr lang="en-GB"/>
           </a:p>
@@ -2518,7 +2518,7 @@
           <a:p>
             <a:fld id="{11A2203D-8DA4-4655-BF9E-AA17BDE25312}" type="datetimeFigureOut">
               <a:rPr lang="en-GB" smtClean="0"/>
-              <a:t>05/02/2013</a:t>
+              <a:t>20/03/2013</a:t>
             </a:fld>
             <a:endParaRPr lang="en-GB"/>
           </a:p>
@@ -2734,7 +2734,7 @@
           <a:p>
             <a:fld id="{11A2203D-8DA4-4655-BF9E-AA17BDE25312}" type="datetimeFigureOut">
               <a:rPr lang="en-GB" smtClean="0"/>
-              <a:t>05/02/2013</a:t>
+              <a:t>20/03/2013</a:t>
             </a:fld>
             <a:endParaRPr lang="en-GB"/>
           </a:p>
@@ -4037,7 +4037,7 @@
       </p:grpSpPr>
       <p:pic>
         <p:nvPicPr>
-          <p:cNvPr id="1027" name="Picture 3"/>
+          <p:cNvPr id="4099" name="Picture 3"/>
           <p:cNvPicPr>
             <a:picLocks noChangeAspect="1" noChangeArrowheads="1"/>
           </p:cNvPicPr>
@@ -4058,8 +4058,8 @@
         </p:blipFill>
         <p:spPr bwMode="auto">
           <a:xfrm>
-            <a:off x="2091331" y="882806"/>
-            <a:ext cx="3584151" cy="3924300"/>
+            <a:off x="495719" y="1050766"/>
+            <a:ext cx="3588835" cy="3924300"/>
           </a:xfrm>
           <a:prstGeom prst="rect">
             <a:avLst/>
@@ -4068,7 +4068,6 @@
           <a:ln>
             <a:noFill/>
           </a:ln>
-          <a:effectLst/>
           <a:extLst>
             <a:ext uri="{909E8E84-426E-40DD-AFC4-6F175D3DCCD1}">
               <a14:hiddenFill xmlns:a14="http://schemas.microsoft.com/office/drawing/2010/main">
@@ -4087,15 +4086,6 @@
                 <a:tailEnd/>
               </a14:hiddenLine>
             </a:ext>
-            <a:ext uri="{AF507438-7753-43E0-B8FC-AC1667EBCBE1}">
-              <a14:hiddenEffects xmlns:a14="http://schemas.microsoft.com/office/drawing/2010/main">
-                <a:effectLst>
-                  <a:outerShdw dist="35921" dir="2700000" algn="ctr" rotWithShape="0">
-                    <a:schemeClr val="bg2"/>
-                  </a:outerShdw>
-                </a:effectLst>
-              </a14:hiddenEffects>
-            </a:ext>
           </a:extLst>
         </p:spPr>
       </p:pic>
@@ -4107,7 +4097,7 @@
         </p:nvSpPr>
         <p:spPr>
           <a:xfrm>
-            <a:off x="2161595" y="1091885"/>
+            <a:off x="565983" y="1259845"/>
             <a:ext cx="114808" cy="118102"/>
           </a:xfrm>
           <a:prstGeom prst="rect">
@@ -4159,7 +4149,7 @@
         </p:nvSpPr>
         <p:spPr>
           <a:xfrm>
-            <a:off x="2296001" y="1091883"/>
+            <a:off x="700389" y="1259843"/>
             <a:ext cx="114808" cy="118104"/>
           </a:xfrm>
           <a:prstGeom prst="rect">
@@ -4211,7 +4201,7 @@
         </p:nvSpPr>
         <p:spPr>
           <a:xfrm>
-            <a:off x="2446673" y="1091883"/>
+            <a:off x="851061" y="1259843"/>
             <a:ext cx="114808" cy="118103"/>
           </a:xfrm>
           <a:prstGeom prst="rect">
@@ -4263,7 +4253,7 @@
         </p:nvSpPr>
         <p:spPr>
           <a:xfrm>
-            <a:off x="2603835" y="1091884"/>
+            <a:off x="1008223" y="1259844"/>
             <a:ext cx="114808" cy="118103"/>
           </a:xfrm>
           <a:prstGeom prst="rect">
@@ -4315,7 +4305,7 @@
         </p:nvSpPr>
         <p:spPr>
           <a:xfrm>
-            <a:off x="2775286" y="1091885"/>
+            <a:off x="1179674" y="1259845"/>
             <a:ext cx="114808" cy="118102"/>
           </a:xfrm>
           <a:prstGeom prst="rect">
@@ -4367,7 +4357,7 @@
         </p:nvSpPr>
         <p:spPr>
           <a:xfrm>
-            <a:off x="2571170" y="1587184"/>
+            <a:off x="975558" y="1755144"/>
             <a:ext cx="681618" cy="141603"/>
           </a:xfrm>
           <a:prstGeom prst="rect">
@@ -4419,7 +4409,7 @@
         </p:nvSpPr>
         <p:spPr>
           <a:xfrm>
-            <a:off x="4057070" y="1587184"/>
+            <a:off x="2461458" y="1755144"/>
             <a:ext cx="448255" cy="141604"/>
           </a:xfrm>
           <a:prstGeom prst="rect">
@@ -4471,7 +4461,7 @@
         </p:nvSpPr>
         <p:spPr>
           <a:xfrm>
-            <a:off x="5138738" y="1591947"/>
+            <a:off x="3543126" y="1759907"/>
             <a:ext cx="219074" cy="141604"/>
           </a:xfrm>
           <a:prstGeom prst="rect">
@@ -4523,7 +4513,7 @@
         </p:nvSpPr>
         <p:spPr>
           <a:xfrm>
-            <a:off x="3309357" y="1920559"/>
+            <a:off x="1713745" y="2088519"/>
             <a:ext cx="367293" cy="794066"/>
           </a:xfrm>
           <a:prstGeom prst="rect">
@@ -4575,7 +4565,7 @@
         </p:nvSpPr>
         <p:spPr>
           <a:xfrm>
-            <a:off x="3957057" y="1915796"/>
+            <a:off x="2361445" y="2083756"/>
             <a:ext cx="1567443" cy="979804"/>
           </a:xfrm>
           <a:prstGeom prst="rect">
@@ -4627,7 +4617,7 @@
         </p:nvSpPr>
         <p:spPr>
           <a:xfrm>
-            <a:off x="4843463" y="2949258"/>
+            <a:off x="3247851" y="3117218"/>
             <a:ext cx="366712" cy="127317"/>
           </a:xfrm>
           <a:prstGeom prst="rect">
@@ -4679,7 +4669,7 @@
         </p:nvSpPr>
         <p:spPr>
           <a:xfrm>
-            <a:off x="4843463" y="3106420"/>
+            <a:off x="3247851" y="3274380"/>
             <a:ext cx="366712" cy="127317"/>
           </a:xfrm>
           <a:prstGeom prst="rect">
@@ -4731,7 +4721,7 @@
         </p:nvSpPr>
         <p:spPr>
           <a:xfrm>
-            <a:off x="3300413" y="2941320"/>
+            <a:off x="1704801" y="3109280"/>
             <a:ext cx="366712" cy="292417"/>
           </a:xfrm>
           <a:prstGeom prst="rect">
@@ -4783,7 +4773,7 @@
         </p:nvSpPr>
         <p:spPr>
           <a:xfrm>
-            <a:off x="2247900" y="3468370"/>
+            <a:off x="652288" y="3636330"/>
             <a:ext cx="3276600" cy="309880"/>
           </a:xfrm>
           <a:prstGeom prst="rect">
@@ -4835,7 +4825,7 @@
         </p:nvSpPr>
         <p:spPr>
           <a:xfrm>
-            <a:off x="2247900" y="3963670"/>
+            <a:off x="652288" y="4131630"/>
             <a:ext cx="3276600" cy="367030"/>
           </a:xfrm>
           <a:prstGeom prst="rect">
@@ -4887,7 +4877,7 @@
         </p:nvSpPr>
         <p:spPr>
           <a:xfrm>
-            <a:off x="4570413" y="4448175"/>
+            <a:off x="2974801" y="4616135"/>
             <a:ext cx="452437" cy="127000"/>
           </a:xfrm>
           <a:prstGeom prst="rect">
@@ -4939,7 +4929,7 @@
         </p:nvSpPr>
         <p:spPr>
           <a:xfrm>
-            <a:off x="5079207" y="4448174"/>
+            <a:off x="3483595" y="4616134"/>
             <a:ext cx="457199" cy="127000"/>
           </a:xfrm>
           <a:prstGeom prst="rect">
@@ -6220,7 +6210,7 @@
         </p:blipFill>
         <p:spPr bwMode="auto">
           <a:xfrm>
-            <a:off x="2043113" y="1795464"/>
+            <a:off x="107504" y="1818201"/>
             <a:ext cx="3176959" cy="2052160"/>
           </a:xfrm>
           <a:prstGeom prst="rect">
@@ -6269,7 +6259,7 @@
         </p:nvSpPr>
         <p:spPr>
           <a:xfrm>
-            <a:off x="2185351" y="2224364"/>
+            <a:off x="249742" y="2247101"/>
             <a:ext cx="2882154" cy="166405"/>
           </a:xfrm>
           <a:prstGeom prst="rect">
@@ -6321,7 +6311,7 @@
         </p:nvSpPr>
         <p:spPr>
           <a:xfrm>
-            <a:off x="2920540" y="2586693"/>
+            <a:off x="984931" y="2609430"/>
             <a:ext cx="235407" cy="130149"/>
           </a:xfrm>
           <a:prstGeom prst="rect">
@@ -6373,7 +6363,7 @@
         </p:nvSpPr>
         <p:spPr>
           <a:xfrm>
-            <a:off x="4241855" y="2586694"/>
+            <a:off x="2306246" y="2609431"/>
             <a:ext cx="813684" cy="130148"/>
           </a:xfrm>
           <a:prstGeom prst="rect">
@@ -6425,7 +6415,7 @@
         </p:nvSpPr>
         <p:spPr>
           <a:xfrm>
-            <a:off x="2609425" y="2981570"/>
+            <a:off x="673816" y="3004307"/>
             <a:ext cx="304210" cy="130149"/>
           </a:xfrm>
           <a:prstGeom prst="rect">
@@ -6477,7 +6467,7 @@
         </p:nvSpPr>
         <p:spPr>
           <a:xfrm>
-            <a:off x="2806300" y="3247812"/>
+            <a:off x="870691" y="3270549"/>
             <a:ext cx="316740" cy="130149"/>
           </a:xfrm>
           <a:prstGeom prst="rect">
@@ -6529,7 +6519,7 @@
         </p:nvSpPr>
         <p:spPr>
           <a:xfrm>
-            <a:off x="2298311" y="3575878"/>
+            <a:off x="362702" y="3598615"/>
             <a:ext cx="647234" cy="159066"/>
           </a:xfrm>
           <a:prstGeom prst="rect">
@@ -6581,7 +6571,7 @@
         </p:nvSpPr>
         <p:spPr>
           <a:xfrm>
-            <a:off x="3683794" y="2981570"/>
+            <a:off x="1748185" y="3004307"/>
             <a:ext cx="304800" cy="130149"/>
           </a:xfrm>
           <a:prstGeom prst="rect">
@@ -6657,7 +6647,7 @@
       </p:grpSpPr>
       <p:pic>
         <p:nvPicPr>
-          <p:cNvPr id="4101" name="Picture 5"/>
+          <p:cNvPr id="2050" name="Picture 2"/>
           <p:cNvPicPr>
             <a:picLocks noChangeAspect="1" noChangeArrowheads="1"/>
           </p:cNvPicPr>
@@ -6678,8 +6668,8 @@
         </p:blipFill>
         <p:spPr bwMode="auto">
           <a:xfrm>
-            <a:off x="1959204" y="1124745"/>
-            <a:ext cx="4328557" cy="3960978"/>
+            <a:off x="2363213" y="1122894"/>
+            <a:ext cx="4329376" cy="4259649"/>
           </a:xfrm>
           <a:prstGeom prst="rect">
             <a:avLst/>
@@ -6688,7 +6678,6 @@
           <a:ln>
             <a:noFill/>
           </a:ln>
-          <a:effectLst/>
           <a:extLst>
             <a:ext uri="{909E8E84-426E-40DD-AFC4-6F175D3DCCD1}">
               <a14:hiddenFill xmlns:a14="http://schemas.microsoft.com/office/drawing/2010/main">
@@ -6707,15 +6696,6 @@
                 <a:tailEnd/>
               </a14:hiddenLine>
             </a:ext>
-            <a:ext uri="{AF507438-7753-43E0-B8FC-AC1667EBCBE1}">
-              <a14:hiddenEffects xmlns:a14="http://schemas.microsoft.com/office/drawing/2010/main">
-                <a:effectLst>
-                  <a:outerShdw dist="35921" dir="2700000" algn="ctr" rotWithShape="0">
-                    <a:schemeClr val="bg2"/>
-                  </a:outerShdw>
-                </a:effectLst>
-              </a14:hiddenEffects>
-            </a:ext>
           </a:extLst>
         </p:spPr>
       </p:pic>
@@ -6727,7 +6707,7 @@
         </p:nvSpPr>
         <p:spPr>
           <a:xfrm>
-            <a:off x="2023280" y="1336005"/>
+            <a:off x="2427288" y="1334154"/>
             <a:ext cx="114808" cy="118102"/>
           </a:xfrm>
           <a:prstGeom prst="rect">
@@ -6779,7 +6759,7 @@
         </p:nvSpPr>
         <p:spPr>
           <a:xfrm>
-            <a:off x="2157686" y="1336004"/>
+            <a:off x="2561694" y="1334153"/>
             <a:ext cx="114808" cy="118103"/>
           </a:xfrm>
           <a:prstGeom prst="rect">
@@ -6831,7 +6811,7 @@
         </p:nvSpPr>
         <p:spPr>
           <a:xfrm>
-            <a:off x="2308358" y="1336004"/>
+            <a:off x="2712366" y="1334153"/>
             <a:ext cx="114808" cy="118103"/>
           </a:xfrm>
           <a:prstGeom prst="rect">
@@ -6883,7 +6863,7 @@
         </p:nvSpPr>
         <p:spPr>
           <a:xfrm>
-            <a:off x="2465520" y="1336004"/>
+            <a:off x="2869528" y="1334153"/>
             <a:ext cx="114808" cy="118103"/>
           </a:xfrm>
           <a:prstGeom prst="rect">
@@ -6935,7 +6915,7 @@
         </p:nvSpPr>
         <p:spPr>
           <a:xfrm>
-            <a:off x="2636971" y="1336004"/>
+            <a:off x="3040979" y="1334153"/>
             <a:ext cx="114808" cy="118104"/>
           </a:xfrm>
           <a:prstGeom prst="rect">
@@ -6987,7 +6967,7 @@
         </p:nvSpPr>
         <p:spPr>
           <a:xfrm>
-            <a:off x="2073433" y="1981001"/>
+            <a:off x="2477441" y="2171104"/>
             <a:ext cx="471487" cy="133549"/>
           </a:xfrm>
           <a:prstGeom prst="rect">
@@ -7039,7 +7019,7 @@
         </p:nvSpPr>
         <p:spPr>
           <a:xfrm>
-            <a:off x="5934075" y="1974924"/>
+            <a:off x="6338083" y="2165027"/>
             <a:ext cx="190500" cy="491852"/>
           </a:xfrm>
           <a:prstGeom prst="rect">
@@ -7091,7 +7071,7 @@
         </p:nvSpPr>
         <p:spPr>
           <a:xfrm>
-            <a:off x="2094070" y="2506463"/>
+            <a:off x="2498078" y="2696566"/>
             <a:ext cx="4029785" cy="931863"/>
           </a:xfrm>
           <a:prstGeom prst="rect">
@@ -7143,7 +7123,7 @@
         </p:nvSpPr>
         <p:spPr>
           <a:xfrm>
-            <a:off x="2094070" y="3501007"/>
+            <a:off x="2498078" y="3697460"/>
             <a:ext cx="4029785" cy="1115443"/>
           </a:xfrm>
           <a:prstGeom prst="rect">
@@ -7195,7 +7175,7 @@
         </p:nvSpPr>
         <p:spPr>
           <a:xfrm>
-            <a:off x="5199220" y="4730477"/>
+            <a:off x="5603228" y="5028530"/>
             <a:ext cx="461805" cy="141362"/>
           </a:xfrm>
           <a:prstGeom prst="rect">
@@ -7247,7 +7227,7 @@
         </p:nvSpPr>
         <p:spPr>
           <a:xfrm>
-            <a:off x="5713570" y="4730476"/>
+            <a:off x="6117578" y="5028529"/>
             <a:ext cx="455455" cy="141362"/>
           </a:xfrm>
           <a:prstGeom prst="rect">
@@ -7299,7 +7279,7 @@
         </p:nvSpPr>
         <p:spPr>
           <a:xfrm>
-            <a:off x="2662396" y="1782563"/>
+            <a:off x="3038624" y="1991716"/>
             <a:ext cx="600074" cy="139699"/>
           </a:xfrm>
           <a:prstGeom prst="rect">
@@ -7351,7 +7331,7 @@
         </p:nvSpPr>
         <p:spPr>
           <a:xfrm>
-            <a:off x="2072614" y="2152650"/>
+            <a:off x="2476622" y="2342753"/>
             <a:ext cx="471487" cy="130174"/>
           </a:xfrm>
           <a:prstGeom prst="rect">
@@ -7403,8 +7383,60 @@
         </p:nvSpPr>
         <p:spPr>
           <a:xfrm>
-            <a:off x="2073433" y="2320925"/>
+            <a:off x="2477441" y="2511028"/>
             <a:ext cx="471487" cy="133350"/>
+          </a:xfrm>
+          <a:prstGeom prst="rect">
+            <a:avLst/>
+          </a:prstGeom>
+          <a:solidFill>
+            <a:schemeClr val="accent2">
+              <a:lumMod val="20000"/>
+              <a:lumOff val="80000"/>
+              <a:alpha val="50196"/>
+            </a:schemeClr>
+          </a:solidFill>
+          <a:ln w="9525">
+            <a:solidFill>
+              <a:srgbClr val="FF0000"/>
+            </a:solidFill>
+          </a:ln>
+        </p:spPr>
+        <p:style>
+          <a:lnRef idx="2">
+            <a:schemeClr val="accent1">
+              <a:shade val="50000"/>
+            </a:schemeClr>
+          </a:lnRef>
+          <a:fillRef idx="1">
+            <a:schemeClr val="accent1"/>
+          </a:fillRef>
+          <a:effectRef idx="0">
+            <a:schemeClr val="accent1"/>
+          </a:effectRef>
+          <a:fontRef idx="minor">
+            <a:schemeClr val="lt1"/>
+          </a:fontRef>
+        </p:style>
+        <p:txBody>
+          <a:bodyPr rtlCol="0" anchor="ctr"/>
+          <a:lstStyle/>
+          <a:p>
+            <a:pPr algn="ctr"/>
+            <a:endParaRPr lang="en-GB"/>
+          </a:p>
+        </p:txBody>
+      </p:sp>
+      <p:sp>
+        <p:nvSpPr>
+          <p:cNvPr id="18" name="Rechteck 17"/>
+          <p:cNvSpPr/>
+          <p:nvPr/>
+        </p:nvSpPr>
+        <p:spPr>
+          <a:xfrm>
+            <a:off x="2506390" y="1832967"/>
+            <a:ext cx="697458" cy="124421"/>
           </a:xfrm>
           <a:prstGeom prst="rect">
             <a:avLst/>
@@ -7479,7 +7511,7 @@
       </p:grpSpPr>
       <p:pic>
         <p:nvPicPr>
-          <p:cNvPr id="1028" name="Picture 4"/>
+          <p:cNvPr id="1026" name="Picture 2"/>
           <p:cNvPicPr>
             <a:picLocks noChangeAspect="1" noChangeArrowheads="1"/>
           </p:cNvPicPr>
@@ -7500,8 +7532,8 @@
         </p:blipFill>
         <p:spPr bwMode="auto">
           <a:xfrm>
-            <a:off x="1957303" y="1124747"/>
-            <a:ext cx="4337995" cy="3977550"/>
+            <a:off x="2483768" y="1124746"/>
+            <a:ext cx="4337995" cy="4268129"/>
           </a:xfrm>
           <a:prstGeom prst="rect">
             <a:avLst/>
@@ -7510,7 +7542,6 @@
           <a:ln>
             <a:noFill/>
           </a:ln>
-          <a:effectLst/>
           <a:extLst>
             <a:ext uri="{909E8E84-426E-40DD-AFC4-6F175D3DCCD1}">
               <a14:hiddenFill xmlns:a14="http://schemas.microsoft.com/office/drawing/2010/main">
@@ -7529,15 +7560,6 @@
                 <a:tailEnd/>
               </a14:hiddenLine>
             </a:ext>
-            <a:ext uri="{AF507438-7753-43E0-B8FC-AC1667EBCBE1}">
-              <a14:hiddenEffects xmlns:a14="http://schemas.microsoft.com/office/drawing/2010/main">
-                <a:effectLst>
-                  <a:outerShdw dist="35921" dir="2700000" algn="ctr" rotWithShape="0">
-                    <a:schemeClr val="bg2"/>
-                  </a:outerShdw>
-                </a:effectLst>
-              </a14:hiddenEffects>
-            </a:ext>
           </a:extLst>
         </p:spPr>
       </p:pic>
@@ -7549,7 +7571,7 @@
         </p:nvSpPr>
         <p:spPr>
           <a:xfrm>
-            <a:off x="2054980" y="1787125"/>
+            <a:off x="2552870" y="1996675"/>
             <a:ext cx="600074" cy="139699"/>
           </a:xfrm>
           <a:prstGeom prst="rect">
@@ -7601,60 +7623,8 @@
         </p:nvSpPr>
         <p:spPr>
           <a:xfrm>
-            <a:off x="2080380" y="2104625"/>
+            <a:off x="2597320" y="2314175"/>
             <a:ext cx="4041020" cy="155975"/>
-          </a:xfrm>
-          <a:prstGeom prst="rect">
-            <a:avLst/>
-          </a:prstGeom>
-          <a:solidFill>
-            <a:schemeClr val="accent2">
-              <a:lumMod val="20000"/>
-              <a:lumOff val="80000"/>
-              <a:alpha val="50196"/>
-            </a:schemeClr>
-          </a:solidFill>
-          <a:ln w="9525">
-            <a:solidFill>
-              <a:srgbClr val="FF0000"/>
-            </a:solidFill>
-          </a:ln>
-        </p:spPr>
-        <p:style>
-          <a:lnRef idx="2">
-            <a:schemeClr val="accent1">
-              <a:shade val="50000"/>
-            </a:schemeClr>
-          </a:lnRef>
-          <a:fillRef idx="1">
-            <a:schemeClr val="accent1"/>
-          </a:fillRef>
-          <a:effectRef idx="0">
-            <a:schemeClr val="accent1"/>
-          </a:effectRef>
-          <a:fontRef idx="minor">
-            <a:schemeClr val="lt1"/>
-          </a:fontRef>
-        </p:style>
-        <p:txBody>
-          <a:bodyPr rtlCol="0" anchor="ctr"/>
-          <a:lstStyle/>
-          <a:p>
-            <a:pPr algn="ctr"/>
-            <a:endParaRPr lang="en-GB"/>
-          </a:p>
-        </p:txBody>
-      </p:sp>
-      <p:sp>
-        <p:nvSpPr>
-          <p:cNvPr id="8" name="Rechteck 7"/>
-          <p:cNvSpPr/>
-          <p:nvPr/>
-        </p:nvSpPr>
-        <p:spPr>
-          <a:xfrm>
-            <a:off x="2105780" y="2358625"/>
-            <a:ext cx="1177170" cy="835425"/>
           </a:xfrm>
           <a:prstGeom prst="rect">
             <a:avLst/>
@@ -8147,7 +8117,7 @@
       </p:grpSpPr>
       <p:pic>
         <p:nvPicPr>
-          <p:cNvPr id="2" name="Picture 2"/>
+          <p:cNvPr id="1028" name="Picture 4"/>
           <p:cNvPicPr>
             <a:picLocks noChangeAspect="1" noChangeArrowheads="1"/>
           </p:cNvPicPr>
@@ -8168,8 +8138,8 @@
         </p:blipFill>
         <p:spPr bwMode="auto">
           <a:xfrm>
-            <a:off x="2915817" y="1412777"/>
-            <a:ext cx="2962774" cy="4243972"/>
+            <a:off x="1599291" y="404665"/>
+            <a:ext cx="2962773" cy="4761380"/>
           </a:xfrm>
           <a:prstGeom prst="rect">
             <a:avLst/>
@@ -8178,7 +8148,6 @@
           <a:ln>
             <a:noFill/>
           </a:ln>
-          <a:effectLst/>
           <a:extLst>
             <a:ext uri="{909E8E84-426E-40DD-AFC4-6F175D3DCCD1}">
               <a14:hiddenFill xmlns:a14="http://schemas.microsoft.com/office/drawing/2010/main">
@@ -8197,15 +8166,6 @@
                 <a:tailEnd/>
               </a14:hiddenLine>
             </a:ext>
-            <a:ext uri="{AF507438-7753-43E0-B8FC-AC1667EBCBE1}">
-              <a14:hiddenEffects xmlns:a14="http://schemas.microsoft.com/office/drawing/2010/main">
-                <a:effectLst>
-                  <a:outerShdw dist="35921" dir="2700000" algn="ctr" rotWithShape="0">
-                    <a:schemeClr val="bg2"/>
-                  </a:outerShdw>
-                </a:effectLst>
-              </a14:hiddenEffects>
-            </a:ext>
           </a:extLst>
         </p:spPr>
       </p:pic>
@@ -8217,7 +8177,7 @@
         </p:nvSpPr>
         <p:spPr>
           <a:xfrm>
-            <a:off x="2975446" y="1615306"/>
+            <a:off x="1658920" y="605273"/>
             <a:ext cx="114808" cy="118102"/>
           </a:xfrm>
           <a:prstGeom prst="rect">
@@ -8269,7 +8229,7 @@
         </p:nvSpPr>
         <p:spPr>
           <a:xfrm>
-            <a:off x="3109852" y="1615304"/>
+            <a:off x="1793326" y="605271"/>
             <a:ext cx="114808" cy="118104"/>
           </a:xfrm>
           <a:prstGeom prst="rect">
@@ -8321,7 +8281,7 @@
         </p:nvSpPr>
         <p:spPr>
           <a:xfrm>
-            <a:off x="3260524" y="1615304"/>
+            <a:off x="1943998" y="605271"/>
             <a:ext cx="114808" cy="118103"/>
           </a:xfrm>
           <a:prstGeom prst="rect">
@@ -8373,7 +8333,7 @@
         </p:nvSpPr>
         <p:spPr>
           <a:xfrm>
-            <a:off x="3417686" y="1615305"/>
+            <a:off x="2101160" y="605272"/>
             <a:ext cx="114808" cy="118103"/>
           </a:xfrm>
           <a:prstGeom prst="rect">
@@ -8425,7 +8385,7 @@
         </p:nvSpPr>
         <p:spPr>
           <a:xfrm>
-            <a:off x="3589137" y="1615306"/>
+            <a:off x="2272611" y="605273"/>
             <a:ext cx="114808" cy="118102"/>
           </a:xfrm>
           <a:prstGeom prst="rect">
@@ -8477,7 +8437,7 @@
         </p:nvSpPr>
         <p:spPr>
           <a:xfrm>
-            <a:off x="3696001" y="2097906"/>
+            <a:off x="2379475" y="1087873"/>
             <a:ext cx="2051915" cy="141486"/>
           </a:xfrm>
           <a:prstGeom prst="rect">
@@ -8529,7 +8489,7 @@
         </p:nvSpPr>
         <p:spPr>
           <a:xfrm>
-            <a:off x="3348339" y="2297807"/>
+            <a:off x="2501713" y="2418074"/>
             <a:ext cx="371475" cy="142875"/>
           </a:xfrm>
           <a:prstGeom prst="rect">
@@ -8581,7 +8541,7 @@
         </p:nvSpPr>
         <p:spPr>
           <a:xfrm>
-            <a:off x="5348589" y="2297807"/>
+            <a:off x="4032063" y="2418074"/>
             <a:ext cx="276225" cy="142875"/>
           </a:xfrm>
           <a:prstGeom prst="rect">
@@ -8633,8 +8593,8 @@
         </p:nvSpPr>
         <p:spPr>
           <a:xfrm>
-            <a:off x="3039885" y="2474342"/>
-            <a:ext cx="2714381" cy="1035050"/>
+            <a:off x="1723359" y="1464309"/>
+            <a:ext cx="2714381" cy="923291"/>
           </a:xfrm>
           <a:prstGeom prst="rect">
             <a:avLst/>
@@ -8685,7 +8645,7 @@
         </p:nvSpPr>
         <p:spPr>
           <a:xfrm>
-            <a:off x="3035124" y="3552255"/>
+            <a:off x="1718598" y="2415222"/>
             <a:ext cx="184628" cy="145727"/>
           </a:xfrm>
           <a:prstGeom prst="rect">
@@ -8737,7 +8697,7 @@
         </p:nvSpPr>
         <p:spPr>
           <a:xfrm>
-            <a:off x="4792964" y="5311205"/>
+            <a:off x="3481200" y="4817903"/>
             <a:ext cx="452437" cy="145727"/>
           </a:xfrm>
           <a:prstGeom prst="rect">
@@ -8789,7 +8749,7 @@
         </p:nvSpPr>
         <p:spPr>
           <a:xfrm>
-            <a:off x="5297789" y="5311205"/>
+            <a:off x="3978882" y="4817903"/>
             <a:ext cx="457199" cy="145728"/>
           </a:xfrm>
           <a:prstGeom prst="rect">
@@ -8841,8 +8801,476 @@
         </p:nvSpPr>
         <p:spPr>
           <a:xfrm>
-            <a:off x="3040607" y="3789040"/>
-            <a:ext cx="2714381" cy="1035050"/>
+            <a:off x="1749481" y="2842507"/>
+            <a:ext cx="2644719" cy="141993"/>
+          </a:xfrm>
+          <a:prstGeom prst="rect">
+            <a:avLst/>
+          </a:prstGeom>
+          <a:solidFill>
+            <a:schemeClr val="accent2">
+              <a:lumMod val="20000"/>
+              <a:lumOff val="80000"/>
+              <a:alpha val="50196"/>
+            </a:schemeClr>
+          </a:solidFill>
+          <a:ln w="9525">
+            <a:solidFill>
+              <a:srgbClr val="FF0000"/>
+            </a:solidFill>
+          </a:ln>
+        </p:spPr>
+        <p:style>
+          <a:lnRef idx="2">
+            <a:schemeClr val="accent1">
+              <a:shade val="50000"/>
+            </a:schemeClr>
+          </a:lnRef>
+          <a:fillRef idx="1">
+            <a:schemeClr val="accent1"/>
+          </a:fillRef>
+          <a:effectRef idx="0">
+            <a:schemeClr val="accent1"/>
+          </a:effectRef>
+          <a:fontRef idx="minor">
+            <a:schemeClr val="lt1"/>
+          </a:fontRef>
+        </p:style>
+        <p:txBody>
+          <a:bodyPr rtlCol="0" anchor="ctr"/>
+          <a:lstStyle/>
+          <a:p>
+            <a:pPr algn="ctr"/>
+            <a:endParaRPr lang="en-GB"/>
+          </a:p>
+        </p:txBody>
+      </p:sp>
+      <p:sp>
+        <p:nvSpPr>
+          <p:cNvPr id="18" name="Rechteck 17"/>
+          <p:cNvSpPr/>
+          <p:nvPr/>
+        </p:nvSpPr>
+        <p:spPr>
+          <a:xfrm>
+            <a:off x="2374526" y="1250155"/>
+            <a:ext cx="1406900" cy="135733"/>
+          </a:xfrm>
+          <a:prstGeom prst="rect">
+            <a:avLst/>
+          </a:prstGeom>
+          <a:solidFill>
+            <a:schemeClr val="accent2">
+              <a:lumMod val="20000"/>
+              <a:lumOff val="80000"/>
+              <a:alpha val="50196"/>
+            </a:schemeClr>
+          </a:solidFill>
+          <a:ln w="9525">
+            <a:solidFill>
+              <a:srgbClr val="FF0000"/>
+            </a:solidFill>
+          </a:ln>
+        </p:spPr>
+        <p:style>
+          <a:lnRef idx="2">
+            <a:schemeClr val="accent1">
+              <a:shade val="50000"/>
+            </a:schemeClr>
+          </a:lnRef>
+          <a:fillRef idx="1">
+            <a:schemeClr val="accent1"/>
+          </a:fillRef>
+          <a:effectRef idx="0">
+            <a:schemeClr val="accent1"/>
+          </a:effectRef>
+          <a:fontRef idx="minor">
+            <a:schemeClr val="lt1"/>
+          </a:fontRef>
+        </p:style>
+        <p:txBody>
+          <a:bodyPr rtlCol="0" anchor="ctr"/>
+          <a:lstStyle/>
+          <a:p>
+            <a:pPr algn="ctr"/>
+            <a:endParaRPr lang="en-GB"/>
+          </a:p>
+        </p:txBody>
+      </p:sp>
+      <p:sp>
+        <p:nvSpPr>
+          <p:cNvPr id="20" name="Rechteck 19"/>
+          <p:cNvSpPr/>
+          <p:nvPr/>
+        </p:nvSpPr>
+        <p:spPr>
+          <a:xfrm>
+            <a:off x="1749482" y="3028950"/>
+            <a:ext cx="1212793" cy="128146"/>
+          </a:xfrm>
+          <a:prstGeom prst="rect">
+            <a:avLst/>
+          </a:prstGeom>
+          <a:solidFill>
+            <a:schemeClr val="accent2">
+              <a:lumMod val="20000"/>
+              <a:lumOff val="80000"/>
+              <a:alpha val="50196"/>
+            </a:schemeClr>
+          </a:solidFill>
+          <a:ln w="9525">
+            <a:solidFill>
+              <a:srgbClr val="FF0000"/>
+            </a:solidFill>
+          </a:ln>
+        </p:spPr>
+        <p:style>
+          <a:lnRef idx="2">
+            <a:schemeClr val="accent1">
+              <a:shade val="50000"/>
+            </a:schemeClr>
+          </a:lnRef>
+          <a:fillRef idx="1">
+            <a:schemeClr val="accent1"/>
+          </a:fillRef>
+          <a:effectRef idx="0">
+            <a:schemeClr val="accent1"/>
+          </a:effectRef>
+          <a:fontRef idx="minor">
+            <a:schemeClr val="lt1"/>
+          </a:fontRef>
+        </p:style>
+        <p:txBody>
+          <a:bodyPr rtlCol="0" anchor="ctr"/>
+          <a:lstStyle/>
+          <a:p>
+            <a:pPr algn="ctr"/>
+            <a:endParaRPr lang="en-GB"/>
+          </a:p>
+        </p:txBody>
+      </p:sp>
+      <p:sp>
+        <p:nvSpPr>
+          <p:cNvPr id="21" name="Rechteck 20"/>
+          <p:cNvSpPr/>
+          <p:nvPr/>
+        </p:nvSpPr>
+        <p:spPr>
+          <a:xfrm>
+            <a:off x="1749482" y="3197225"/>
+            <a:ext cx="831794" cy="125675"/>
+          </a:xfrm>
+          <a:prstGeom prst="rect">
+            <a:avLst/>
+          </a:prstGeom>
+          <a:solidFill>
+            <a:schemeClr val="accent2">
+              <a:lumMod val="20000"/>
+              <a:lumOff val="80000"/>
+              <a:alpha val="50196"/>
+            </a:schemeClr>
+          </a:solidFill>
+          <a:ln w="9525">
+            <a:solidFill>
+              <a:srgbClr val="FF0000"/>
+            </a:solidFill>
+          </a:ln>
+        </p:spPr>
+        <p:style>
+          <a:lnRef idx="2">
+            <a:schemeClr val="accent1">
+              <a:shade val="50000"/>
+            </a:schemeClr>
+          </a:lnRef>
+          <a:fillRef idx="1">
+            <a:schemeClr val="accent1"/>
+          </a:fillRef>
+          <a:effectRef idx="0">
+            <a:schemeClr val="accent1"/>
+          </a:effectRef>
+          <a:fontRef idx="minor">
+            <a:schemeClr val="lt1"/>
+          </a:fontRef>
+        </p:style>
+        <p:txBody>
+          <a:bodyPr rtlCol="0" anchor="ctr"/>
+          <a:lstStyle/>
+          <a:p>
+            <a:pPr algn="ctr"/>
+            <a:endParaRPr lang="en-GB"/>
+          </a:p>
+        </p:txBody>
+      </p:sp>
+      <p:sp>
+        <p:nvSpPr>
+          <p:cNvPr id="23" name="Rechteck 22"/>
+          <p:cNvSpPr/>
+          <p:nvPr/>
+        </p:nvSpPr>
+        <p:spPr>
+          <a:xfrm>
+            <a:off x="3816163" y="3030849"/>
+            <a:ext cx="354012" cy="142875"/>
+          </a:xfrm>
+          <a:prstGeom prst="rect">
+            <a:avLst/>
+          </a:prstGeom>
+          <a:solidFill>
+            <a:schemeClr val="accent2">
+              <a:lumMod val="20000"/>
+              <a:lumOff val="80000"/>
+              <a:alpha val="50196"/>
+            </a:schemeClr>
+          </a:solidFill>
+          <a:ln w="9525">
+            <a:solidFill>
+              <a:srgbClr val="FF0000"/>
+            </a:solidFill>
+          </a:ln>
+        </p:spPr>
+        <p:style>
+          <a:lnRef idx="2">
+            <a:schemeClr val="accent1">
+              <a:shade val="50000"/>
+            </a:schemeClr>
+          </a:lnRef>
+          <a:fillRef idx="1">
+            <a:schemeClr val="accent1"/>
+          </a:fillRef>
+          <a:effectRef idx="0">
+            <a:schemeClr val="accent1"/>
+          </a:effectRef>
+          <a:fontRef idx="minor">
+            <a:schemeClr val="lt1"/>
+          </a:fontRef>
+        </p:style>
+        <p:txBody>
+          <a:bodyPr rtlCol="0" anchor="ctr"/>
+          <a:lstStyle/>
+          <a:p>
+            <a:pPr algn="ctr"/>
+            <a:endParaRPr lang="en-GB"/>
+          </a:p>
+        </p:txBody>
+      </p:sp>
+      <p:sp>
+        <p:nvSpPr>
+          <p:cNvPr id="24" name="Rechteck 23"/>
+          <p:cNvSpPr/>
+          <p:nvPr/>
+        </p:nvSpPr>
+        <p:spPr>
+          <a:xfrm>
+            <a:off x="3816163" y="3197225"/>
+            <a:ext cx="354012" cy="142875"/>
+          </a:xfrm>
+          <a:prstGeom prst="rect">
+            <a:avLst/>
+          </a:prstGeom>
+          <a:solidFill>
+            <a:schemeClr val="accent2">
+              <a:lumMod val="20000"/>
+              <a:lumOff val="80000"/>
+              <a:alpha val="50196"/>
+            </a:schemeClr>
+          </a:solidFill>
+          <a:ln w="9525">
+            <a:solidFill>
+              <a:srgbClr val="FF0000"/>
+            </a:solidFill>
+          </a:ln>
+        </p:spPr>
+        <p:style>
+          <a:lnRef idx="2">
+            <a:schemeClr val="accent1">
+              <a:shade val="50000"/>
+            </a:schemeClr>
+          </a:lnRef>
+          <a:fillRef idx="1">
+            <a:schemeClr val="accent1"/>
+          </a:fillRef>
+          <a:effectRef idx="0">
+            <a:schemeClr val="accent1"/>
+          </a:effectRef>
+          <a:fontRef idx="minor">
+            <a:schemeClr val="lt1"/>
+          </a:fontRef>
+        </p:style>
+        <p:txBody>
+          <a:bodyPr rtlCol="0" anchor="ctr"/>
+          <a:lstStyle/>
+          <a:p>
+            <a:pPr algn="ctr"/>
+            <a:endParaRPr lang="en-GB"/>
+          </a:p>
+        </p:txBody>
+      </p:sp>
+      <p:sp>
+        <p:nvSpPr>
+          <p:cNvPr id="25" name="Rechteck 24"/>
+          <p:cNvSpPr/>
+          <p:nvPr/>
+        </p:nvSpPr>
+        <p:spPr>
+          <a:xfrm>
+            <a:off x="1749481" y="3362325"/>
+            <a:ext cx="2644719" cy="600075"/>
+          </a:xfrm>
+          <a:prstGeom prst="rect">
+            <a:avLst/>
+          </a:prstGeom>
+          <a:solidFill>
+            <a:schemeClr val="accent2">
+              <a:lumMod val="20000"/>
+              <a:lumOff val="80000"/>
+              <a:alpha val="50196"/>
+            </a:schemeClr>
+          </a:solidFill>
+          <a:ln w="9525">
+            <a:solidFill>
+              <a:srgbClr val="FF0000"/>
+            </a:solidFill>
+          </a:ln>
+        </p:spPr>
+        <p:style>
+          <a:lnRef idx="2">
+            <a:schemeClr val="accent1">
+              <a:shade val="50000"/>
+            </a:schemeClr>
+          </a:lnRef>
+          <a:fillRef idx="1">
+            <a:schemeClr val="accent1"/>
+          </a:fillRef>
+          <a:effectRef idx="0">
+            <a:schemeClr val="accent1"/>
+          </a:effectRef>
+          <a:fontRef idx="minor">
+            <a:schemeClr val="lt1"/>
+          </a:fontRef>
+        </p:style>
+        <p:txBody>
+          <a:bodyPr rtlCol="0" anchor="ctr"/>
+          <a:lstStyle/>
+          <a:p>
+            <a:pPr algn="ctr"/>
+            <a:endParaRPr lang="en-GB"/>
+          </a:p>
+        </p:txBody>
+      </p:sp>
+      <p:sp>
+        <p:nvSpPr>
+          <p:cNvPr id="26" name="Rechteck 25"/>
+          <p:cNvSpPr/>
+          <p:nvPr/>
+        </p:nvSpPr>
+        <p:spPr>
+          <a:xfrm>
+            <a:off x="1754678" y="4149080"/>
+            <a:ext cx="550373" cy="141933"/>
+          </a:xfrm>
+          <a:prstGeom prst="rect">
+            <a:avLst/>
+          </a:prstGeom>
+          <a:solidFill>
+            <a:schemeClr val="accent2">
+              <a:lumMod val="20000"/>
+              <a:lumOff val="80000"/>
+              <a:alpha val="50196"/>
+            </a:schemeClr>
+          </a:solidFill>
+          <a:ln w="9525">
+            <a:solidFill>
+              <a:srgbClr val="FF0000"/>
+            </a:solidFill>
+          </a:ln>
+        </p:spPr>
+        <p:style>
+          <a:lnRef idx="2">
+            <a:schemeClr val="accent1">
+              <a:shade val="50000"/>
+            </a:schemeClr>
+          </a:lnRef>
+          <a:fillRef idx="1">
+            <a:schemeClr val="accent1"/>
+          </a:fillRef>
+          <a:effectRef idx="0">
+            <a:schemeClr val="accent1"/>
+          </a:effectRef>
+          <a:fontRef idx="minor">
+            <a:schemeClr val="lt1"/>
+          </a:fontRef>
+        </p:style>
+        <p:txBody>
+          <a:bodyPr rtlCol="0" anchor="ctr"/>
+          <a:lstStyle/>
+          <a:p>
+            <a:pPr algn="ctr"/>
+            <a:endParaRPr lang="en-GB"/>
+          </a:p>
+        </p:txBody>
+      </p:sp>
+      <p:sp>
+        <p:nvSpPr>
+          <p:cNvPr id="27" name="Rechteck 26"/>
+          <p:cNvSpPr/>
+          <p:nvPr/>
+        </p:nvSpPr>
+        <p:spPr>
+          <a:xfrm>
+            <a:off x="1754679" y="4407971"/>
+            <a:ext cx="2639522" cy="141933"/>
+          </a:xfrm>
+          <a:prstGeom prst="rect">
+            <a:avLst/>
+          </a:prstGeom>
+          <a:solidFill>
+            <a:schemeClr val="accent2">
+              <a:lumMod val="20000"/>
+              <a:lumOff val="80000"/>
+              <a:alpha val="50196"/>
+            </a:schemeClr>
+          </a:solidFill>
+          <a:ln w="9525">
+            <a:solidFill>
+              <a:srgbClr val="FF0000"/>
+            </a:solidFill>
+          </a:ln>
+        </p:spPr>
+        <p:style>
+          <a:lnRef idx="2">
+            <a:schemeClr val="accent1">
+              <a:shade val="50000"/>
+            </a:schemeClr>
+          </a:lnRef>
+          <a:fillRef idx="1">
+            <a:schemeClr val="accent1"/>
+          </a:fillRef>
+          <a:effectRef idx="0">
+            <a:schemeClr val="accent1"/>
+          </a:effectRef>
+          <a:fontRef idx="minor">
+            <a:schemeClr val="lt1"/>
+          </a:fontRef>
+        </p:style>
+        <p:txBody>
+          <a:bodyPr rtlCol="0" anchor="ctr"/>
+          <a:lstStyle/>
+          <a:p>
+            <a:pPr algn="ctr"/>
+            <a:endParaRPr lang="en-GB"/>
+          </a:p>
+        </p:txBody>
+      </p:sp>
+      <p:sp>
+        <p:nvSpPr>
+          <p:cNvPr id="29" name="Rechteck 28"/>
+          <p:cNvSpPr/>
+          <p:nvPr/>
+        </p:nvSpPr>
+        <p:spPr>
+          <a:xfrm>
+            <a:off x="3568513" y="4573899"/>
+            <a:ext cx="427644" cy="142875"/>
           </a:xfrm>
           <a:prstGeom prst="rect">
             <a:avLst/>
@@ -8917,7 +9345,7 @@
       </p:grpSpPr>
       <p:pic>
         <p:nvPicPr>
-          <p:cNvPr id="4103" name="Picture 7"/>
+          <p:cNvPr id="3074" name="Picture 2"/>
           <p:cNvPicPr>
             <a:picLocks noChangeAspect="1" noChangeArrowheads="1"/>
           </p:cNvPicPr>
@@ -8938,8 +9366,8 @@
         </p:blipFill>
         <p:spPr bwMode="auto">
           <a:xfrm>
-            <a:off x="3117752" y="2124657"/>
-            <a:ext cx="3196380" cy="2744120"/>
+            <a:off x="890179" y="1995608"/>
+            <a:ext cx="3196379" cy="2736248"/>
           </a:xfrm>
           <a:prstGeom prst="rect">
             <a:avLst/>
@@ -8948,7 +9376,6 @@
           <a:ln>
             <a:noFill/>
           </a:ln>
-          <a:effectLst/>
           <a:extLst>
             <a:ext uri="{909E8E84-426E-40DD-AFC4-6F175D3DCCD1}">
               <a14:hiddenFill xmlns:a14="http://schemas.microsoft.com/office/drawing/2010/main">
@@ -8967,15 +9394,6 @@
                 <a:tailEnd/>
               </a14:hiddenLine>
             </a:ext>
-            <a:ext uri="{AF507438-7753-43E0-B8FC-AC1667EBCBE1}">
-              <a14:hiddenEffects xmlns:a14="http://schemas.microsoft.com/office/drawing/2010/main">
-                <a:effectLst>
-                  <a:outerShdw dist="35921" dir="2700000" algn="ctr" rotWithShape="0">
-                    <a:schemeClr val="bg2"/>
-                  </a:outerShdw>
-                </a:effectLst>
-              </a14:hiddenEffects>
-            </a:ext>
           </a:extLst>
         </p:spPr>
       </p:pic>
@@ -8987,7 +9405,7 @@
         </p:nvSpPr>
         <p:spPr>
           <a:xfrm>
-            <a:off x="3187741" y="2327001"/>
+            <a:off x="960168" y="2197952"/>
             <a:ext cx="114808" cy="118102"/>
           </a:xfrm>
           <a:prstGeom prst="rect">
@@ -9039,7 +9457,7 @@
         </p:nvSpPr>
         <p:spPr>
           <a:xfrm>
-            <a:off x="3322147" y="2326999"/>
+            <a:off x="1094574" y="2197950"/>
             <a:ext cx="114808" cy="118104"/>
           </a:xfrm>
           <a:prstGeom prst="rect">
@@ -9091,7 +9509,7 @@
         </p:nvSpPr>
         <p:spPr>
           <a:xfrm>
-            <a:off x="3463293" y="2326999"/>
+            <a:off x="1235720" y="2197950"/>
             <a:ext cx="114808" cy="118103"/>
           </a:xfrm>
           <a:prstGeom prst="rect">
@@ -9143,7 +9561,7 @@
         </p:nvSpPr>
         <p:spPr>
           <a:xfrm>
-            <a:off x="3611128" y="2327000"/>
+            <a:off x="1383555" y="2197951"/>
             <a:ext cx="114808" cy="118103"/>
           </a:xfrm>
           <a:prstGeom prst="rect">
@@ -9195,7 +9613,7 @@
         </p:nvSpPr>
         <p:spPr>
           <a:xfrm>
-            <a:off x="3780793" y="2327001"/>
+            <a:off x="1553220" y="2197952"/>
             <a:ext cx="114808" cy="118102"/>
           </a:xfrm>
           <a:prstGeom prst="rect">
@@ -9247,7 +9665,7 @@
         </p:nvSpPr>
         <p:spPr>
           <a:xfrm>
-            <a:off x="3909441" y="2813050"/>
+            <a:off x="1681868" y="2684001"/>
             <a:ext cx="2296990" cy="139699"/>
           </a:xfrm>
           <a:prstGeom prst="rect">
@@ -9299,7 +9717,7 @@
         </p:nvSpPr>
         <p:spPr>
           <a:xfrm>
-            <a:off x="3921125" y="3035300"/>
+            <a:off x="1693552" y="2906251"/>
             <a:ext cx="374650" cy="139699"/>
           </a:xfrm>
           <a:prstGeom prst="rect">
@@ -9351,7 +9769,7 @@
         </p:nvSpPr>
         <p:spPr>
           <a:xfrm>
-            <a:off x="5611812" y="3035300"/>
+            <a:off x="3384239" y="2906251"/>
             <a:ext cx="374650" cy="139699"/>
           </a:xfrm>
           <a:prstGeom prst="rect">
@@ -9403,7 +9821,7 @@
         </p:nvSpPr>
         <p:spPr>
           <a:xfrm>
-            <a:off x="5611812" y="3198810"/>
+            <a:off x="3384239" y="3069761"/>
             <a:ext cx="374650" cy="139699"/>
           </a:xfrm>
           <a:prstGeom prst="rect">
@@ -9455,7 +9873,7 @@
         </p:nvSpPr>
         <p:spPr>
           <a:xfrm>
-            <a:off x="3921125" y="3198810"/>
+            <a:off x="1693552" y="3069761"/>
             <a:ext cx="374650" cy="139699"/>
           </a:xfrm>
           <a:prstGeom prst="rect">
@@ -9507,7 +9925,7 @@
         </p:nvSpPr>
         <p:spPr>
           <a:xfrm>
-            <a:off x="3921125" y="3367668"/>
+            <a:off x="1693552" y="3238619"/>
             <a:ext cx="374650" cy="139699"/>
           </a:xfrm>
           <a:prstGeom prst="rect">
@@ -9559,7 +9977,7 @@
         </p:nvSpPr>
         <p:spPr>
           <a:xfrm>
-            <a:off x="3233737" y="3658181"/>
+            <a:off x="1006164" y="3529132"/>
             <a:ext cx="2954215" cy="139699"/>
           </a:xfrm>
           <a:prstGeom prst="rect">
@@ -9611,7 +10029,7 @@
         </p:nvSpPr>
         <p:spPr>
           <a:xfrm>
-            <a:off x="3233737" y="3967744"/>
+            <a:off x="1006164" y="3838695"/>
             <a:ext cx="2954215" cy="139699"/>
           </a:xfrm>
           <a:prstGeom prst="rect">
@@ -9663,7 +10081,7 @@
         </p:nvSpPr>
         <p:spPr>
           <a:xfrm>
-            <a:off x="3234030" y="4272544"/>
+            <a:off x="1006457" y="4143495"/>
             <a:ext cx="2953922" cy="139699"/>
           </a:xfrm>
           <a:prstGeom prst="rect">
@@ -9715,7 +10133,7 @@
         </p:nvSpPr>
         <p:spPr>
           <a:xfrm>
-            <a:off x="5233988" y="4511997"/>
+            <a:off x="3006415" y="4382948"/>
             <a:ext cx="452437" cy="145727"/>
           </a:xfrm>
           <a:prstGeom prst="rect">
@@ -9767,7 +10185,7 @@
         </p:nvSpPr>
         <p:spPr>
           <a:xfrm>
-            <a:off x="5729287" y="4511997"/>
+            <a:off x="3501714" y="4382948"/>
             <a:ext cx="457199" cy="145728"/>
           </a:xfrm>
           <a:prstGeom prst="rect">

</xml_diff>

<commit_message>
- Updated User Manual - Added PicCoordLogger.exe (for User Manual development) - Updated Tabindices for F_GEN controls - Disabled distance correction for coasting to avoid engine leaving coasting operation
</commit_message>
<xml_diff>
--- a/User Manual Source/material User Manual.pptx
+++ b/User Manual Source/material User Manual.pptx
@@ -15,8 +15,15 @@
     <p:sldId id="262" r:id="rId9"/>
     <p:sldId id="265" r:id="rId10"/>
     <p:sldId id="267" r:id="rId11"/>
-    <p:sldId id="294" r:id="rId12"/>
-    <p:sldId id="298" r:id="rId13"/>
+    <p:sldId id="304" r:id="rId12"/>
+    <p:sldId id="305" r:id="rId13"/>
+    <p:sldId id="298" r:id="rId14"/>
+    <p:sldId id="294" r:id="rId15"/>
+    <p:sldId id="302" r:id="rId16"/>
+    <p:sldId id="303" r:id="rId17"/>
+    <p:sldId id="299" r:id="rId18"/>
+    <p:sldId id="300" r:id="rId19"/>
+    <p:sldId id="301" r:id="rId20"/>
   </p:sldIdLst>
   <p:sldSz cx="9144000" cy="6858000" type="screen4x3"/>
   <p:notesSz cx="6858000" cy="9144000"/>
@@ -299,7 +306,7 @@
           <a:p>
             <a:fld id="{11A2203D-8DA4-4655-BF9E-AA17BDE25312}" type="datetimeFigureOut">
               <a:rPr lang="en-GB" smtClean="0"/>
-              <a:t>20/03/2013</a:t>
+              <a:t>29/04/2013</a:t>
             </a:fld>
             <a:endParaRPr lang="en-GB"/>
           </a:p>
@@ -469,7 +476,7 @@
           <a:p>
             <a:fld id="{11A2203D-8DA4-4655-BF9E-AA17BDE25312}" type="datetimeFigureOut">
               <a:rPr lang="en-GB" smtClean="0"/>
-              <a:t>20/03/2013</a:t>
+              <a:t>29/04/2013</a:t>
             </a:fld>
             <a:endParaRPr lang="en-GB"/>
           </a:p>
@@ -649,7 +656,7 @@
           <a:p>
             <a:fld id="{11A2203D-8DA4-4655-BF9E-AA17BDE25312}" type="datetimeFigureOut">
               <a:rPr lang="en-GB" smtClean="0"/>
-              <a:t>20/03/2013</a:t>
+              <a:t>29/04/2013</a:t>
             </a:fld>
             <a:endParaRPr lang="en-GB"/>
           </a:p>
@@ -819,7 +826,7 @@
           <a:p>
             <a:fld id="{11A2203D-8DA4-4655-BF9E-AA17BDE25312}" type="datetimeFigureOut">
               <a:rPr lang="en-GB" smtClean="0"/>
-              <a:t>20/03/2013</a:t>
+              <a:t>29/04/2013</a:t>
             </a:fld>
             <a:endParaRPr lang="en-GB"/>
           </a:p>
@@ -1065,7 +1072,7 @@
           <a:p>
             <a:fld id="{11A2203D-8DA4-4655-BF9E-AA17BDE25312}" type="datetimeFigureOut">
               <a:rPr lang="en-GB" smtClean="0"/>
-              <a:t>20/03/2013</a:t>
+              <a:t>29/04/2013</a:t>
             </a:fld>
             <a:endParaRPr lang="en-GB"/>
           </a:p>
@@ -1353,7 +1360,7 @@
           <a:p>
             <a:fld id="{11A2203D-8DA4-4655-BF9E-AA17BDE25312}" type="datetimeFigureOut">
               <a:rPr lang="en-GB" smtClean="0"/>
-              <a:t>20/03/2013</a:t>
+              <a:t>29/04/2013</a:t>
             </a:fld>
             <a:endParaRPr lang="en-GB"/>
           </a:p>
@@ -1775,7 +1782,7 @@
           <a:p>
             <a:fld id="{11A2203D-8DA4-4655-BF9E-AA17BDE25312}" type="datetimeFigureOut">
               <a:rPr lang="en-GB" smtClean="0"/>
-              <a:t>20/03/2013</a:t>
+              <a:t>29/04/2013</a:t>
             </a:fld>
             <a:endParaRPr lang="en-GB"/>
           </a:p>
@@ -1893,7 +1900,7 @@
           <a:p>
             <a:fld id="{11A2203D-8DA4-4655-BF9E-AA17BDE25312}" type="datetimeFigureOut">
               <a:rPr lang="en-GB" smtClean="0"/>
-              <a:t>20/03/2013</a:t>
+              <a:t>29/04/2013</a:t>
             </a:fld>
             <a:endParaRPr lang="en-GB"/>
           </a:p>
@@ -1988,7 +1995,7 @@
           <a:p>
             <a:fld id="{11A2203D-8DA4-4655-BF9E-AA17BDE25312}" type="datetimeFigureOut">
               <a:rPr lang="en-GB" smtClean="0"/>
-              <a:t>20/03/2013</a:t>
+              <a:t>29/04/2013</a:t>
             </a:fld>
             <a:endParaRPr lang="en-GB"/>
           </a:p>
@@ -2265,7 +2272,7 @@
           <a:p>
             <a:fld id="{11A2203D-8DA4-4655-BF9E-AA17BDE25312}" type="datetimeFigureOut">
               <a:rPr lang="en-GB" smtClean="0"/>
-              <a:t>20/03/2013</a:t>
+              <a:t>29/04/2013</a:t>
             </a:fld>
             <a:endParaRPr lang="en-GB"/>
           </a:p>
@@ -2518,7 +2525,7 @@
           <a:p>
             <a:fld id="{11A2203D-8DA4-4655-BF9E-AA17BDE25312}" type="datetimeFigureOut">
               <a:rPr lang="en-GB" smtClean="0"/>
-              <a:t>20/03/2013</a:t>
+              <a:t>29/04/2013</a:t>
             </a:fld>
             <a:endParaRPr lang="en-GB"/>
           </a:p>
@@ -2734,7 +2741,7 @@
           <a:p>
             <a:fld id="{11A2203D-8DA4-4655-BF9E-AA17BDE25312}" type="datetimeFigureOut">
               <a:rPr lang="en-GB" smtClean="0"/>
-              <a:t>20/03/2013</a:t>
+              <a:t>29/04/2013</a:t>
             </a:fld>
             <a:endParaRPr lang="en-GB"/>
           </a:p>
@@ -5003,10 +5010,337 @@
           <a:chExt cx="0" cy="0"/>
         </a:xfrm>
       </p:grpSpPr>
+      <p:pic>
+        <p:nvPicPr>
+          <p:cNvPr id="1028" name="Picture 4"/>
+          <p:cNvPicPr>
+            <a:picLocks noChangeAspect="1" noChangeArrowheads="1"/>
+          </p:cNvPicPr>
+          <p:nvPr/>
+        </p:nvPicPr>
+        <p:blipFill>
+          <a:blip r:embed="rId2">
+            <a:extLst>
+              <a:ext uri="{28A0092B-C50C-407E-A947-70E740481C1C}">
+                <a14:useLocalDpi xmlns:a14="http://schemas.microsoft.com/office/drawing/2010/main" val="0"/>
+              </a:ext>
+            </a:extLst>
+          </a:blip>
+          <a:srcRect/>
+          <a:stretch>
+            <a:fillRect/>
+          </a:stretch>
+        </p:blipFill>
+        <p:spPr bwMode="auto">
+          <a:xfrm>
+            <a:off x="1115616" y="836712"/>
+            <a:ext cx="5105400" cy="2552700"/>
+          </a:xfrm>
+          <a:prstGeom prst="rect">
+            <a:avLst/>
+          </a:prstGeom>
+          <a:noFill/>
+          <a:ln>
+            <a:noFill/>
+          </a:ln>
+          <a:extLst>
+            <a:ext uri="{909E8E84-426E-40DD-AFC4-6F175D3DCCD1}">
+              <a14:hiddenFill xmlns:a14="http://schemas.microsoft.com/office/drawing/2010/main">
+                <a:solidFill>
+                  <a:schemeClr val="accent1"/>
+                </a:solidFill>
+              </a14:hiddenFill>
+            </a:ext>
+            <a:ext uri="{91240B29-F687-4F45-9708-019B960494DF}">
+              <a14:hiddenLine xmlns:a14="http://schemas.microsoft.com/office/drawing/2010/main" w="9525">
+                <a:solidFill>
+                  <a:schemeClr val="tx1"/>
+                </a:solidFill>
+                <a:miter lim="800000"/>
+                <a:headEnd/>
+                <a:tailEnd/>
+              </a14:hiddenLine>
+            </a:ext>
+          </a:extLst>
+        </p:spPr>
+      </p:pic>
+      <p:pic>
+        <p:nvPicPr>
+          <p:cNvPr id="1030" name="Picture 6"/>
+          <p:cNvPicPr>
+            <a:picLocks noChangeAspect="1" noChangeArrowheads="1"/>
+          </p:cNvPicPr>
+          <p:nvPr/>
+        </p:nvPicPr>
+        <p:blipFill>
+          <a:blip r:embed="rId3">
+            <a:extLst>
+              <a:ext uri="{28A0092B-C50C-407E-A947-70E740481C1C}">
+                <a14:useLocalDpi xmlns:a14="http://schemas.microsoft.com/office/drawing/2010/main" val="0"/>
+              </a:ext>
+            </a:extLst>
+          </a:blip>
+          <a:srcRect/>
+          <a:stretch>
+            <a:fillRect/>
+          </a:stretch>
+        </p:blipFill>
+        <p:spPr bwMode="auto">
+          <a:xfrm>
+            <a:off x="1115616" y="3047206"/>
+            <a:ext cx="4780359" cy="2686050"/>
+          </a:xfrm>
+          <a:prstGeom prst="rect">
+            <a:avLst/>
+          </a:prstGeom>
+          <a:noFill/>
+          <a:ln>
+            <a:noFill/>
+          </a:ln>
+          <a:extLst>
+            <a:ext uri="{909E8E84-426E-40DD-AFC4-6F175D3DCCD1}">
+              <a14:hiddenFill xmlns:a14="http://schemas.microsoft.com/office/drawing/2010/main">
+                <a:solidFill>
+                  <a:schemeClr val="accent1"/>
+                </a:solidFill>
+              </a14:hiddenFill>
+            </a:ext>
+            <a:ext uri="{91240B29-F687-4F45-9708-019B960494DF}">
+              <a14:hiddenLine xmlns:a14="http://schemas.microsoft.com/office/drawing/2010/main" w="9525">
+                <a:solidFill>
+                  <a:schemeClr val="tx1"/>
+                </a:solidFill>
+                <a:miter lim="800000"/>
+                <a:headEnd/>
+                <a:tailEnd/>
+              </a14:hiddenLine>
+            </a:ext>
+          </a:extLst>
+        </p:spPr>
+      </p:pic>
+      <p:cxnSp>
+        <p:nvCxnSpPr>
+          <p:cNvPr id="5" name="Gerade Verbindung mit Pfeil 4"/>
+          <p:cNvCxnSpPr/>
+          <p:nvPr/>
+        </p:nvCxnSpPr>
+        <p:spPr>
+          <a:xfrm flipH="1" flipV="1">
+            <a:off x="4023475" y="1916832"/>
+            <a:ext cx="188485" cy="936104"/>
+          </a:xfrm>
+          <a:prstGeom prst="straightConnector1">
+            <a:avLst/>
+          </a:prstGeom>
+          <a:ln w="19050">
+            <a:solidFill>
+              <a:srgbClr val="FF0000"/>
+            </a:solidFill>
+            <a:tailEnd type="arrow"/>
+          </a:ln>
+        </p:spPr>
+        <p:style>
+          <a:lnRef idx="1">
+            <a:schemeClr val="accent1"/>
+          </a:lnRef>
+          <a:fillRef idx="0">
+            <a:schemeClr val="accent1"/>
+          </a:fillRef>
+          <a:effectRef idx="0">
+            <a:schemeClr val="accent1"/>
+          </a:effectRef>
+          <a:fontRef idx="minor">
+            <a:schemeClr val="tx1"/>
+          </a:fontRef>
+        </p:style>
+      </p:cxnSp>
+      <p:cxnSp>
+        <p:nvCxnSpPr>
+          <p:cNvPr id="14" name="Gerade Verbindung mit Pfeil 13"/>
+          <p:cNvCxnSpPr/>
+          <p:nvPr/>
+        </p:nvCxnSpPr>
+        <p:spPr>
+          <a:xfrm flipH="1">
+            <a:off x="4045443" y="3645024"/>
+            <a:ext cx="310533" cy="608171"/>
+          </a:xfrm>
+          <a:prstGeom prst="straightConnector1">
+            <a:avLst/>
+          </a:prstGeom>
+          <a:ln w="19050">
+            <a:solidFill>
+              <a:srgbClr val="FF0000"/>
+            </a:solidFill>
+            <a:tailEnd type="arrow"/>
+          </a:ln>
+        </p:spPr>
+        <p:style>
+          <a:lnRef idx="1">
+            <a:schemeClr val="accent1"/>
+          </a:lnRef>
+          <a:fillRef idx="0">
+            <a:schemeClr val="accent1"/>
+          </a:fillRef>
+          <a:effectRef idx="0">
+            <a:schemeClr val="accent1"/>
+          </a:effectRef>
+          <a:fontRef idx="minor">
+            <a:schemeClr val="tx1"/>
+          </a:fontRef>
+        </p:style>
+      </p:cxnSp>
+      <p:sp>
+        <p:nvSpPr>
+          <p:cNvPr id="19" name="Geschweifte Klammer rechts 18"/>
+          <p:cNvSpPr/>
+          <p:nvPr/>
+        </p:nvSpPr>
+        <p:spPr>
+          <a:xfrm rot="5400000">
+            <a:off x="3771448" y="36160"/>
+            <a:ext cx="504055" cy="3113273"/>
+          </a:xfrm>
+          <a:prstGeom prst="rightBrace">
+            <a:avLst/>
+          </a:prstGeom>
+          <a:ln w="19050">
+            <a:solidFill>
+              <a:srgbClr val="FF0000"/>
+            </a:solidFill>
+          </a:ln>
+        </p:spPr>
+        <p:style>
+          <a:lnRef idx="1">
+            <a:schemeClr val="accent1"/>
+          </a:lnRef>
+          <a:fillRef idx="0">
+            <a:schemeClr val="accent1"/>
+          </a:fillRef>
+          <a:effectRef idx="0">
+            <a:schemeClr val="accent1"/>
+          </a:effectRef>
+          <a:fontRef idx="minor">
+            <a:schemeClr val="tx1"/>
+          </a:fontRef>
+        </p:style>
+        <p:txBody>
+          <a:bodyPr rtlCol="0" anchor="ctr"/>
+          <a:lstStyle/>
+          <a:p>
+            <a:pPr algn="ctr"/>
+            <a:endParaRPr lang="en-GB"/>
+          </a:p>
+        </p:txBody>
+      </p:sp>
+      <p:sp>
+        <p:nvSpPr>
+          <p:cNvPr id="26" name="Geschweifte Klammer rechts 25"/>
+          <p:cNvSpPr/>
+          <p:nvPr/>
+        </p:nvSpPr>
+        <p:spPr>
+          <a:xfrm rot="16200000">
+            <a:off x="3771448" y="3011182"/>
+            <a:ext cx="504055" cy="3113273"/>
+          </a:xfrm>
+          <a:prstGeom prst="rightBrace">
+            <a:avLst/>
+          </a:prstGeom>
+          <a:ln w="19050">
+            <a:solidFill>
+              <a:srgbClr val="FF0000"/>
+            </a:solidFill>
+          </a:ln>
+        </p:spPr>
+        <p:style>
+          <a:lnRef idx="1">
+            <a:schemeClr val="accent1"/>
+          </a:lnRef>
+          <a:fillRef idx="0">
+            <a:schemeClr val="accent1"/>
+          </a:fillRef>
+          <a:effectRef idx="0">
+            <a:schemeClr val="accent1"/>
+          </a:effectRef>
+          <a:fontRef idx="minor">
+            <a:schemeClr val="tx1"/>
+          </a:fontRef>
+        </p:style>
+        <p:txBody>
+          <a:bodyPr rtlCol="0" anchor="ctr"/>
+          <a:lstStyle/>
+          <a:p>
+            <a:pPr algn="ctr"/>
+            <a:endParaRPr lang="en-GB"/>
+          </a:p>
+        </p:txBody>
+      </p:sp>
+      <p:sp>
+        <p:nvSpPr>
+          <p:cNvPr id="2" name="Textfeld 1"/>
+          <p:cNvSpPr txBox="1"/>
+          <p:nvPr/>
+        </p:nvSpPr>
+        <p:spPr>
+          <a:xfrm>
+            <a:off x="3668316" y="2885103"/>
+            <a:ext cx="3135932" cy="646331"/>
+          </a:xfrm>
+          <a:prstGeom prst="rect">
+            <a:avLst/>
+          </a:prstGeom>
+          <a:solidFill>
+            <a:schemeClr val="bg1"/>
+          </a:solidFill>
+          <a:ln>
+            <a:solidFill>
+              <a:schemeClr val="tx1"/>
+            </a:solidFill>
+          </a:ln>
+        </p:spPr>
+        <p:txBody>
+          <a:bodyPr wrap="square" rtlCol="0">
+            <a:spAutoFit/>
+          </a:bodyPr>
+          <a:lstStyle/>
+          <a:p>
+            <a:r>
+              <a:rPr lang="en-GB" b="1" dirty="0" smtClean="0">
+                <a:solidFill>
+                  <a:srgbClr val="FF0000"/>
+                </a:solidFill>
+              </a:rPr>
+              <a:t>Coasting with Brakes applied if </a:t>
+            </a:r>
+            <a:r>
+              <a:rPr lang="en-GB" b="1" dirty="0" err="1" smtClean="0">
+                <a:solidFill>
+                  <a:srgbClr val="FF0000"/>
+                </a:solidFill>
+              </a:rPr>
+              <a:t>Overspeed</a:t>
+            </a:r>
+            <a:r>
+              <a:rPr lang="en-GB" b="1" dirty="0" smtClean="0">
+                <a:solidFill>
+                  <a:srgbClr val="FF0000"/>
+                </a:solidFill>
+              </a:rPr>
+              <a:t> is reached</a:t>
+            </a:r>
+            <a:endParaRPr lang="en-GB" b="1" dirty="0">
+              <a:solidFill>
+                <a:srgbClr val="FF0000"/>
+              </a:solidFill>
+            </a:endParaRPr>
+          </a:p>
+        </p:txBody>
+      </p:sp>
     </p:spTree>
     <p:extLst>
       <p:ext uri="{BB962C8B-B14F-4D97-AF65-F5344CB8AC3E}">
-        <p14:creationId xmlns:p14="http://schemas.microsoft.com/office/powerpoint/2010/main" val="4265253464"/>
+        <p14:creationId xmlns:p14="http://schemas.microsoft.com/office/powerpoint/2010/main" val="1910720409"/>
       </p:ext>
     </p:extLst>
   </p:cSld>
@@ -5033,10 +5367,3876 @@
           <a:chExt cx="0" cy="0"/>
         </a:xfrm>
       </p:grpSpPr>
+      <p:pic>
+        <p:nvPicPr>
+          <p:cNvPr id="2050" name="Picture 2"/>
+          <p:cNvPicPr>
+            <a:picLocks noChangeAspect="1" noChangeArrowheads="1"/>
+          </p:cNvPicPr>
+          <p:nvPr/>
+        </p:nvPicPr>
+        <p:blipFill>
+          <a:blip r:embed="rId2">
+            <a:extLst>
+              <a:ext uri="{28A0092B-C50C-407E-A947-70E740481C1C}">
+                <a14:useLocalDpi xmlns:a14="http://schemas.microsoft.com/office/drawing/2010/main" val="0"/>
+              </a:ext>
+            </a:extLst>
+          </a:blip>
+          <a:srcRect/>
+          <a:stretch>
+            <a:fillRect/>
+          </a:stretch>
+        </p:blipFill>
+        <p:spPr bwMode="auto">
+          <a:xfrm>
+            <a:off x="1115616" y="836712"/>
+            <a:ext cx="5105400" cy="2552700"/>
+          </a:xfrm>
+          <a:prstGeom prst="rect">
+            <a:avLst/>
+          </a:prstGeom>
+          <a:noFill/>
+          <a:ln>
+            <a:noFill/>
+          </a:ln>
+          <a:extLst>
+            <a:ext uri="{909E8E84-426E-40DD-AFC4-6F175D3DCCD1}">
+              <a14:hiddenFill xmlns:a14="http://schemas.microsoft.com/office/drawing/2010/main">
+                <a:solidFill>
+                  <a:schemeClr val="accent1"/>
+                </a:solidFill>
+              </a14:hiddenFill>
+            </a:ext>
+            <a:ext uri="{91240B29-F687-4F45-9708-019B960494DF}">
+              <a14:hiddenLine xmlns:a14="http://schemas.microsoft.com/office/drawing/2010/main" w="9525">
+                <a:solidFill>
+                  <a:schemeClr val="tx1"/>
+                </a:solidFill>
+                <a:miter lim="800000"/>
+                <a:headEnd/>
+                <a:tailEnd/>
+              </a14:hiddenLine>
+            </a:ext>
+          </a:extLst>
+        </p:spPr>
+      </p:pic>
+      <p:pic>
+        <p:nvPicPr>
+          <p:cNvPr id="2051" name="Picture 3"/>
+          <p:cNvPicPr>
+            <a:picLocks noChangeAspect="1" noChangeArrowheads="1"/>
+          </p:cNvPicPr>
+          <p:nvPr/>
+        </p:nvPicPr>
+        <p:blipFill>
+          <a:blip r:embed="rId3">
+            <a:extLst>
+              <a:ext uri="{28A0092B-C50C-407E-A947-70E740481C1C}">
+                <a14:useLocalDpi xmlns:a14="http://schemas.microsoft.com/office/drawing/2010/main" val="0"/>
+              </a:ext>
+            </a:extLst>
+          </a:blip>
+          <a:srcRect/>
+          <a:stretch>
+            <a:fillRect/>
+          </a:stretch>
+        </p:blipFill>
+        <p:spPr bwMode="auto">
+          <a:xfrm>
+            <a:off x="1115616" y="3047206"/>
+            <a:ext cx="4838700" cy="2686050"/>
+          </a:xfrm>
+          <a:prstGeom prst="rect">
+            <a:avLst/>
+          </a:prstGeom>
+          <a:noFill/>
+          <a:ln>
+            <a:noFill/>
+          </a:ln>
+          <a:extLst>
+            <a:ext uri="{909E8E84-426E-40DD-AFC4-6F175D3DCCD1}">
+              <a14:hiddenFill xmlns:a14="http://schemas.microsoft.com/office/drawing/2010/main">
+                <a:solidFill>
+                  <a:schemeClr val="accent1"/>
+                </a:solidFill>
+              </a14:hiddenFill>
+            </a:ext>
+            <a:ext uri="{91240B29-F687-4F45-9708-019B960494DF}">
+              <a14:hiddenLine xmlns:a14="http://schemas.microsoft.com/office/drawing/2010/main" w="9525">
+                <a:solidFill>
+                  <a:schemeClr val="tx1"/>
+                </a:solidFill>
+                <a:miter lim="800000"/>
+                <a:headEnd/>
+                <a:tailEnd/>
+              </a14:hiddenLine>
+            </a:ext>
+          </a:extLst>
+        </p:spPr>
+      </p:pic>
+      <p:cxnSp>
+        <p:nvCxnSpPr>
+          <p:cNvPr id="5" name="Gerade Verbindung mit Pfeil 4"/>
+          <p:cNvCxnSpPr/>
+          <p:nvPr/>
+        </p:nvCxnSpPr>
+        <p:spPr>
+          <a:xfrm flipV="1">
+            <a:off x="3203848" y="1916832"/>
+            <a:ext cx="0" cy="936104"/>
+          </a:xfrm>
+          <a:prstGeom prst="straightConnector1">
+            <a:avLst/>
+          </a:prstGeom>
+          <a:ln w="19050">
+            <a:solidFill>
+              <a:srgbClr val="FF0000"/>
+            </a:solidFill>
+            <a:tailEnd type="arrow"/>
+          </a:ln>
+        </p:spPr>
+        <p:style>
+          <a:lnRef idx="1">
+            <a:schemeClr val="accent1"/>
+          </a:lnRef>
+          <a:fillRef idx="0">
+            <a:schemeClr val="accent1"/>
+          </a:fillRef>
+          <a:effectRef idx="0">
+            <a:schemeClr val="accent1"/>
+          </a:effectRef>
+          <a:fontRef idx="minor">
+            <a:schemeClr val="tx1"/>
+          </a:fontRef>
+        </p:style>
+      </p:cxnSp>
+      <p:cxnSp>
+        <p:nvCxnSpPr>
+          <p:cNvPr id="14" name="Gerade Verbindung mit Pfeil 13"/>
+          <p:cNvCxnSpPr/>
+          <p:nvPr/>
+        </p:nvCxnSpPr>
+        <p:spPr>
+          <a:xfrm>
+            <a:off x="3232554" y="3656227"/>
+            <a:ext cx="0" cy="608171"/>
+          </a:xfrm>
+          <a:prstGeom prst="straightConnector1">
+            <a:avLst/>
+          </a:prstGeom>
+          <a:ln w="19050">
+            <a:solidFill>
+              <a:srgbClr val="FF0000"/>
+            </a:solidFill>
+            <a:tailEnd type="arrow"/>
+          </a:ln>
+        </p:spPr>
+        <p:style>
+          <a:lnRef idx="1">
+            <a:schemeClr val="accent1"/>
+          </a:lnRef>
+          <a:fillRef idx="0">
+            <a:schemeClr val="accent1"/>
+          </a:fillRef>
+          <a:effectRef idx="0">
+            <a:schemeClr val="accent1"/>
+          </a:effectRef>
+          <a:fontRef idx="minor">
+            <a:schemeClr val="tx1"/>
+          </a:fontRef>
+        </p:style>
+      </p:cxnSp>
+      <p:sp>
+        <p:nvSpPr>
+          <p:cNvPr id="19" name="Geschweifte Klammer rechts 18"/>
+          <p:cNvSpPr/>
+          <p:nvPr/>
+        </p:nvSpPr>
+        <p:spPr>
+          <a:xfrm rot="5400000">
+            <a:off x="2968028" y="1144539"/>
+            <a:ext cx="504055" cy="896516"/>
+          </a:xfrm>
+          <a:prstGeom prst="rightBrace">
+            <a:avLst/>
+          </a:prstGeom>
+          <a:ln w="19050">
+            <a:solidFill>
+              <a:srgbClr val="FF0000"/>
+            </a:solidFill>
+          </a:ln>
+        </p:spPr>
+        <p:style>
+          <a:lnRef idx="1">
+            <a:schemeClr val="accent1"/>
+          </a:lnRef>
+          <a:fillRef idx="0">
+            <a:schemeClr val="accent1"/>
+          </a:fillRef>
+          <a:effectRef idx="0">
+            <a:schemeClr val="accent1"/>
+          </a:effectRef>
+          <a:fontRef idx="minor">
+            <a:schemeClr val="tx1"/>
+          </a:fontRef>
+        </p:style>
+        <p:txBody>
+          <a:bodyPr rtlCol="0" anchor="ctr"/>
+          <a:lstStyle/>
+          <a:p>
+            <a:pPr algn="ctr"/>
+            <a:endParaRPr lang="en-GB"/>
+          </a:p>
+        </p:txBody>
+      </p:sp>
+      <p:sp>
+        <p:nvSpPr>
+          <p:cNvPr id="26" name="Geschweifte Klammer rechts 25"/>
+          <p:cNvSpPr/>
+          <p:nvPr/>
+        </p:nvSpPr>
+        <p:spPr>
+          <a:xfrm rot="16200000">
+            <a:off x="2968030" y="4119559"/>
+            <a:ext cx="504055" cy="896516"/>
+          </a:xfrm>
+          <a:prstGeom prst="rightBrace">
+            <a:avLst/>
+          </a:prstGeom>
+          <a:ln w="19050">
+            <a:solidFill>
+              <a:srgbClr val="FF0000"/>
+            </a:solidFill>
+          </a:ln>
+        </p:spPr>
+        <p:style>
+          <a:lnRef idx="1">
+            <a:schemeClr val="accent1"/>
+          </a:lnRef>
+          <a:fillRef idx="0">
+            <a:schemeClr val="accent1"/>
+          </a:fillRef>
+          <a:effectRef idx="0">
+            <a:schemeClr val="accent1"/>
+          </a:effectRef>
+          <a:fontRef idx="minor">
+            <a:schemeClr val="tx1"/>
+          </a:fontRef>
+        </p:style>
+        <p:txBody>
+          <a:bodyPr rtlCol="0" anchor="ctr"/>
+          <a:lstStyle/>
+          <a:p>
+            <a:pPr algn="ctr"/>
+            <a:endParaRPr lang="en-GB"/>
+          </a:p>
+        </p:txBody>
+      </p:sp>
+      <p:sp>
+        <p:nvSpPr>
+          <p:cNvPr id="11" name="Textfeld 10"/>
+          <p:cNvSpPr txBox="1"/>
+          <p:nvPr/>
+        </p:nvSpPr>
+        <p:spPr>
+          <a:xfrm>
+            <a:off x="4850879" y="2899430"/>
+            <a:ext cx="1479748" cy="369332"/>
+          </a:xfrm>
+          <a:prstGeom prst="rect">
+            <a:avLst/>
+          </a:prstGeom>
+          <a:solidFill>
+            <a:schemeClr val="bg1"/>
+          </a:solidFill>
+          <a:ln>
+            <a:solidFill>
+              <a:schemeClr val="tx1"/>
+            </a:solidFill>
+          </a:ln>
+        </p:spPr>
+        <p:txBody>
+          <a:bodyPr wrap="square" rtlCol="0">
+            <a:spAutoFit/>
+          </a:bodyPr>
+          <a:lstStyle/>
+          <a:p>
+            <a:r>
+              <a:rPr lang="en-GB" b="1" dirty="0" smtClean="0">
+                <a:solidFill>
+                  <a:srgbClr val="FF0000"/>
+                </a:solidFill>
+              </a:rPr>
+              <a:t>Engine idling</a:t>
+            </a:r>
+            <a:endParaRPr lang="en-GB" b="1" dirty="0">
+              <a:solidFill>
+                <a:srgbClr val="FF0000"/>
+              </a:solidFill>
+            </a:endParaRPr>
+          </a:p>
+        </p:txBody>
+      </p:sp>
+      <p:sp>
+        <p:nvSpPr>
+          <p:cNvPr id="13" name="Textfeld 12"/>
+          <p:cNvSpPr txBox="1"/>
+          <p:nvPr/>
+        </p:nvSpPr>
+        <p:spPr>
+          <a:xfrm>
+            <a:off x="2571986" y="2926090"/>
+            <a:ext cx="2144030" cy="646331"/>
+          </a:xfrm>
+          <a:prstGeom prst="rect">
+            <a:avLst/>
+          </a:prstGeom>
+          <a:solidFill>
+            <a:schemeClr val="bg1"/>
+          </a:solidFill>
+          <a:ln>
+            <a:solidFill>
+              <a:schemeClr val="tx1"/>
+            </a:solidFill>
+          </a:ln>
+        </p:spPr>
+        <p:txBody>
+          <a:bodyPr wrap="square" rtlCol="0">
+            <a:spAutoFit/>
+          </a:bodyPr>
+          <a:lstStyle/>
+          <a:p>
+            <a:r>
+              <a:rPr lang="en-GB" b="1" dirty="0" err="1" smtClean="0">
+                <a:solidFill>
+                  <a:srgbClr val="FF0000"/>
+                </a:solidFill>
+              </a:rPr>
+              <a:t>Overspeed</a:t>
+            </a:r>
+            <a:r>
+              <a:rPr lang="en-GB" b="1" dirty="0" smtClean="0">
+                <a:solidFill>
+                  <a:srgbClr val="FF0000"/>
+                </a:solidFill>
+              </a:rPr>
+              <a:t> reached:</a:t>
+            </a:r>
+          </a:p>
+          <a:p>
+            <a:r>
+              <a:rPr lang="en-GB" b="1" dirty="0" smtClean="0">
+                <a:solidFill>
+                  <a:srgbClr val="FF0000"/>
+                </a:solidFill>
+              </a:rPr>
+              <a:t>Coasting &amp; Braking</a:t>
+            </a:r>
+            <a:endParaRPr lang="en-GB" b="1" dirty="0">
+              <a:solidFill>
+                <a:srgbClr val="FF0000"/>
+              </a:solidFill>
+            </a:endParaRPr>
+          </a:p>
+        </p:txBody>
+      </p:sp>
+      <p:sp>
+        <p:nvSpPr>
+          <p:cNvPr id="15" name="Geschweifte Klammer rechts 14"/>
+          <p:cNvSpPr/>
+          <p:nvPr/>
+        </p:nvSpPr>
+        <p:spPr>
+          <a:xfrm rot="16200000">
+            <a:off x="4377508" y="3602414"/>
+            <a:ext cx="504055" cy="1922439"/>
+          </a:xfrm>
+          <a:prstGeom prst="rightBrace">
+            <a:avLst/>
+          </a:prstGeom>
+          <a:ln w="19050">
+            <a:solidFill>
+              <a:srgbClr val="FF0000"/>
+            </a:solidFill>
+          </a:ln>
+        </p:spPr>
+        <p:style>
+          <a:lnRef idx="1">
+            <a:schemeClr val="accent1"/>
+          </a:lnRef>
+          <a:fillRef idx="0">
+            <a:schemeClr val="accent1"/>
+          </a:fillRef>
+          <a:effectRef idx="0">
+            <a:schemeClr val="accent1"/>
+          </a:effectRef>
+          <a:fontRef idx="minor">
+            <a:schemeClr val="tx1"/>
+          </a:fontRef>
+        </p:style>
+        <p:txBody>
+          <a:bodyPr rtlCol="0" anchor="ctr"/>
+          <a:lstStyle/>
+          <a:p>
+            <a:pPr algn="ctr"/>
+            <a:endParaRPr lang="en-GB"/>
+          </a:p>
+        </p:txBody>
+      </p:sp>
+      <p:sp>
+        <p:nvSpPr>
+          <p:cNvPr id="16" name="Geschweifte Klammer rechts 15"/>
+          <p:cNvSpPr/>
+          <p:nvPr/>
+        </p:nvSpPr>
+        <p:spPr>
+          <a:xfrm rot="5400000">
+            <a:off x="4377508" y="613275"/>
+            <a:ext cx="504055" cy="1922439"/>
+          </a:xfrm>
+          <a:prstGeom prst="rightBrace">
+            <a:avLst/>
+          </a:prstGeom>
+          <a:ln w="19050">
+            <a:solidFill>
+              <a:srgbClr val="FF0000"/>
+            </a:solidFill>
+          </a:ln>
+        </p:spPr>
+        <p:style>
+          <a:lnRef idx="1">
+            <a:schemeClr val="accent1"/>
+          </a:lnRef>
+          <a:fillRef idx="0">
+            <a:schemeClr val="accent1"/>
+          </a:fillRef>
+          <a:effectRef idx="0">
+            <a:schemeClr val="accent1"/>
+          </a:effectRef>
+          <a:fontRef idx="minor">
+            <a:schemeClr val="tx1"/>
+          </a:fontRef>
+        </p:style>
+        <p:txBody>
+          <a:bodyPr rtlCol="0" anchor="ctr"/>
+          <a:lstStyle/>
+          <a:p>
+            <a:pPr algn="ctr"/>
+            <a:endParaRPr lang="en-GB"/>
+          </a:p>
+        </p:txBody>
+      </p:sp>
+      <p:cxnSp>
+        <p:nvCxnSpPr>
+          <p:cNvPr id="17" name="Gerade Verbindung mit Pfeil 16"/>
+          <p:cNvCxnSpPr/>
+          <p:nvPr/>
+        </p:nvCxnSpPr>
+        <p:spPr>
+          <a:xfrm flipH="1">
+            <a:off x="4629535" y="3326990"/>
+            <a:ext cx="685047" cy="937409"/>
+          </a:xfrm>
+          <a:prstGeom prst="straightConnector1">
+            <a:avLst/>
+          </a:prstGeom>
+          <a:ln w="19050">
+            <a:solidFill>
+              <a:srgbClr val="FF0000"/>
+            </a:solidFill>
+            <a:tailEnd type="arrow"/>
+          </a:ln>
+        </p:spPr>
+        <p:style>
+          <a:lnRef idx="1">
+            <a:schemeClr val="accent1"/>
+          </a:lnRef>
+          <a:fillRef idx="0">
+            <a:schemeClr val="accent1"/>
+          </a:fillRef>
+          <a:effectRef idx="0">
+            <a:schemeClr val="accent1"/>
+          </a:effectRef>
+          <a:fontRef idx="minor">
+            <a:schemeClr val="tx1"/>
+          </a:fontRef>
+        </p:style>
+      </p:cxnSp>
+      <p:cxnSp>
+        <p:nvCxnSpPr>
+          <p:cNvPr id="20" name="Gerade Verbindung mit Pfeil 19"/>
+          <p:cNvCxnSpPr/>
+          <p:nvPr/>
+        </p:nvCxnSpPr>
+        <p:spPr>
+          <a:xfrm flipH="1" flipV="1">
+            <a:off x="4650226" y="1844824"/>
+            <a:ext cx="425830" cy="936104"/>
+          </a:xfrm>
+          <a:prstGeom prst="straightConnector1">
+            <a:avLst/>
+          </a:prstGeom>
+          <a:ln w="19050">
+            <a:solidFill>
+              <a:srgbClr val="FF0000"/>
+            </a:solidFill>
+            <a:tailEnd type="arrow"/>
+          </a:ln>
+        </p:spPr>
+        <p:style>
+          <a:lnRef idx="1">
+            <a:schemeClr val="accent1"/>
+          </a:lnRef>
+          <a:fillRef idx="0">
+            <a:schemeClr val="accent1"/>
+          </a:fillRef>
+          <a:effectRef idx="0">
+            <a:schemeClr val="accent1"/>
+          </a:effectRef>
+          <a:fontRef idx="minor">
+            <a:schemeClr val="tx1"/>
+          </a:fontRef>
+        </p:style>
+      </p:cxnSp>
+    </p:spTree>
+    <p:extLst>
+      <p:ext uri="{BB962C8B-B14F-4D97-AF65-F5344CB8AC3E}">
+        <p14:creationId xmlns:p14="http://schemas.microsoft.com/office/powerpoint/2010/main" val="1450585576"/>
+      </p:ext>
+    </p:extLst>
+  </p:cSld>
+  <p:clrMapOvr>
+    <a:masterClrMapping/>
+  </p:clrMapOvr>
+</p:sld>
+</file>
+
+<file path=ppt/slides/slide13.xml><?xml version="1.0" encoding="utf-8"?>
+<p:sld xmlns:a="http://schemas.openxmlformats.org/drawingml/2006/main" xmlns:r="http://schemas.openxmlformats.org/officeDocument/2006/relationships" xmlns:p="http://schemas.openxmlformats.org/presentationml/2006/main">
+  <p:cSld>
+    <p:spTree>
+      <p:nvGrpSpPr>
+        <p:cNvPr id="1" name=""/>
+        <p:cNvGrpSpPr/>
+        <p:nvPr/>
+      </p:nvGrpSpPr>
+      <p:grpSpPr>
+        <a:xfrm>
+          <a:off x="0" y="0"/>
+          <a:ext cx="0" cy="0"/>
+          <a:chOff x="0" y="0"/>
+          <a:chExt cx="0" cy="0"/>
+        </a:xfrm>
+      </p:grpSpPr>
+      <p:grpSp>
+        <p:nvGrpSpPr>
+          <p:cNvPr id="2" name="Gruppieren 1"/>
+          <p:cNvGrpSpPr/>
+          <p:nvPr/>
+        </p:nvGrpSpPr>
+        <p:grpSpPr>
+          <a:xfrm>
+            <a:off x="1661789" y="1561418"/>
+            <a:ext cx="4719299" cy="2995656"/>
+            <a:chOff x="1398172" y="1297893"/>
+            <a:chExt cx="6558204" cy="4162932"/>
+          </a:xfrm>
+        </p:grpSpPr>
+        <p:cxnSp>
+          <p:nvCxnSpPr>
+            <p:cNvPr id="3" name="Gerade Verbindung mit Pfeil 2"/>
+            <p:cNvCxnSpPr/>
+            <p:nvPr/>
+          </p:nvCxnSpPr>
+          <p:spPr>
+            <a:xfrm flipV="1">
+              <a:off x="2118252" y="2233997"/>
+              <a:ext cx="0" cy="2808312"/>
+            </a:xfrm>
+            <a:prstGeom prst="straightConnector1">
+              <a:avLst/>
+            </a:prstGeom>
+            <a:ln w="19050">
+              <a:solidFill>
+                <a:schemeClr val="tx1"/>
+              </a:solidFill>
+              <a:tailEnd type="arrow"/>
+            </a:ln>
+          </p:spPr>
+          <p:style>
+            <a:lnRef idx="1">
+              <a:schemeClr val="accent1"/>
+            </a:lnRef>
+            <a:fillRef idx="0">
+              <a:schemeClr val="accent1"/>
+            </a:fillRef>
+            <a:effectRef idx="0">
+              <a:schemeClr val="accent1"/>
+            </a:effectRef>
+            <a:fontRef idx="minor">
+              <a:schemeClr val="tx1"/>
+            </a:fontRef>
+          </p:style>
+        </p:cxnSp>
+        <p:cxnSp>
+          <p:nvCxnSpPr>
+            <p:cNvPr id="4" name="Gerade Verbindung mit Pfeil 3"/>
+            <p:cNvCxnSpPr/>
+            <p:nvPr/>
+          </p:nvCxnSpPr>
+          <p:spPr>
+            <a:xfrm>
+              <a:off x="2118252" y="5039465"/>
+              <a:ext cx="4752528" cy="0"/>
+            </a:xfrm>
+            <a:prstGeom prst="straightConnector1">
+              <a:avLst/>
+            </a:prstGeom>
+            <a:ln w="19050">
+              <a:solidFill>
+                <a:schemeClr val="tx1"/>
+              </a:solidFill>
+              <a:tailEnd type="arrow"/>
+            </a:ln>
+          </p:spPr>
+          <p:style>
+            <a:lnRef idx="1">
+              <a:schemeClr val="accent1"/>
+            </a:lnRef>
+            <a:fillRef idx="0">
+              <a:schemeClr val="accent1"/>
+            </a:fillRef>
+            <a:effectRef idx="0">
+              <a:schemeClr val="accent1"/>
+            </a:effectRef>
+            <a:fontRef idx="minor">
+              <a:schemeClr val="tx1"/>
+            </a:fontRef>
+          </p:style>
+        </p:cxnSp>
+        <p:sp>
+          <p:nvSpPr>
+            <p:cNvPr id="5" name="Textfeld 4"/>
+            <p:cNvSpPr txBox="1"/>
+            <p:nvPr/>
+          </p:nvSpPr>
+          <p:spPr>
+            <a:xfrm>
+              <a:off x="1398172" y="2049332"/>
+              <a:ext cx="720080" cy="384933"/>
+            </a:xfrm>
+            <a:prstGeom prst="rect">
+              <a:avLst/>
+            </a:prstGeom>
+            <a:noFill/>
+          </p:spPr>
+          <p:txBody>
+            <a:bodyPr wrap="square" rtlCol="0">
+              <a:spAutoFit/>
+            </a:bodyPr>
+            <a:lstStyle/>
+            <a:p>
+              <a:pPr algn="ctr"/>
+              <a:r>
+                <a:rPr lang="de-AT" sz="1200" b="1" smtClean="0"/>
+                <a:t>V</a:t>
+              </a:r>
+              <a:endParaRPr lang="de-AT" sz="1200" b="1"/>
+            </a:p>
+          </p:txBody>
+        </p:sp>
+        <p:sp>
+          <p:nvSpPr>
+            <p:cNvPr id="6" name="Textfeld 5"/>
+            <p:cNvSpPr txBox="1"/>
+            <p:nvPr/>
+          </p:nvSpPr>
+          <p:spPr>
+            <a:xfrm>
+              <a:off x="6222707" y="5075892"/>
+              <a:ext cx="1008112" cy="384933"/>
+            </a:xfrm>
+            <a:prstGeom prst="rect">
+              <a:avLst/>
+            </a:prstGeom>
+            <a:noFill/>
+          </p:spPr>
+          <p:txBody>
+            <a:bodyPr wrap="square" rtlCol="0">
+              <a:spAutoFit/>
+            </a:bodyPr>
+            <a:lstStyle/>
+            <a:p>
+              <a:pPr algn="ctr"/>
+              <a:r>
+                <a:rPr lang="de-AT" sz="1200" b="1" smtClean="0"/>
+                <a:t>time</a:t>
+              </a:r>
+              <a:endParaRPr lang="de-AT" sz="1200" b="1"/>
+            </a:p>
+          </p:txBody>
+        </p:sp>
+        <p:cxnSp>
+          <p:nvCxnSpPr>
+            <p:cNvPr id="7" name="Gerade Verbindung 6"/>
+            <p:cNvCxnSpPr/>
+            <p:nvPr/>
+          </p:nvCxnSpPr>
+          <p:spPr>
+            <a:xfrm>
+              <a:off x="2478292" y="2666045"/>
+              <a:ext cx="3024336" cy="0"/>
+            </a:xfrm>
+            <a:prstGeom prst="line">
+              <a:avLst/>
+            </a:prstGeom>
+            <a:ln w="19050"/>
+          </p:spPr>
+          <p:style>
+            <a:lnRef idx="1">
+              <a:schemeClr val="accent1"/>
+            </a:lnRef>
+            <a:fillRef idx="0">
+              <a:schemeClr val="accent1"/>
+            </a:fillRef>
+            <a:effectRef idx="0">
+              <a:schemeClr val="accent1"/>
+            </a:effectRef>
+            <a:fontRef idx="minor">
+              <a:schemeClr val="tx1"/>
+            </a:fontRef>
+          </p:style>
+        </p:cxnSp>
+        <p:cxnSp>
+          <p:nvCxnSpPr>
+            <p:cNvPr id="8" name="Gerade Verbindung 7"/>
+            <p:cNvCxnSpPr/>
+            <p:nvPr/>
+          </p:nvCxnSpPr>
+          <p:spPr>
+            <a:xfrm>
+              <a:off x="5502628" y="4394237"/>
+              <a:ext cx="1296144" cy="0"/>
+            </a:xfrm>
+            <a:prstGeom prst="line">
+              <a:avLst/>
+            </a:prstGeom>
+            <a:ln w="19050"/>
+          </p:spPr>
+          <p:style>
+            <a:lnRef idx="1">
+              <a:schemeClr val="accent1"/>
+            </a:lnRef>
+            <a:fillRef idx="0">
+              <a:schemeClr val="accent1"/>
+            </a:fillRef>
+            <a:effectRef idx="0">
+              <a:schemeClr val="accent1"/>
+            </a:effectRef>
+            <a:fontRef idx="minor">
+              <a:schemeClr val="tx1"/>
+            </a:fontRef>
+          </p:style>
+        </p:cxnSp>
+        <p:cxnSp>
+          <p:nvCxnSpPr>
+            <p:cNvPr id="9" name="Gerade Verbindung 8"/>
+            <p:cNvCxnSpPr/>
+            <p:nvPr/>
+          </p:nvCxnSpPr>
+          <p:spPr>
+            <a:xfrm flipV="1">
+              <a:off x="5502628" y="2666045"/>
+              <a:ext cx="0" cy="1728192"/>
+            </a:xfrm>
+            <a:prstGeom prst="line">
+              <a:avLst/>
+            </a:prstGeom>
+            <a:ln w="19050"/>
+          </p:spPr>
+          <p:style>
+            <a:lnRef idx="1">
+              <a:schemeClr val="accent1"/>
+            </a:lnRef>
+            <a:fillRef idx="0">
+              <a:schemeClr val="accent1"/>
+            </a:fillRef>
+            <a:effectRef idx="0">
+              <a:schemeClr val="accent1"/>
+            </a:effectRef>
+            <a:fontRef idx="minor">
+              <a:schemeClr val="tx1"/>
+            </a:fontRef>
+          </p:style>
+        </p:cxnSp>
+        <p:sp>
+          <p:nvSpPr>
+            <p:cNvPr id="10" name="Textfeld 9"/>
+            <p:cNvSpPr txBox="1"/>
+            <p:nvPr/>
+          </p:nvSpPr>
+          <p:spPr>
+            <a:xfrm>
+              <a:off x="2118253" y="2378013"/>
+              <a:ext cx="908396" cy="363548"/>
+            </a:xfrm>
+            <a:prstGeom prst="rect">
+              <a:avLst/>
+            </a:prstGeom>
+            <a:noFill/>
+          </p:spPr>
+          <p:txBody>
+            <a:bodyPr wrap="square" rtlCol="0">
+              <a:spAutoFit/>
+            </a:bodyPr>
+            <a:lstStyle/>
+            <a:p>
+              <a:pPr algn="ctr"/>
+              <a:r>
+                <a:rPr lang="de-AT" sz="1100" dirty="0" smtClean="0">
+                  <a:solidFill>
+                    <a:srgbClr val="0070C0"/>
+                  </a:solidFill>
+                </a:rPr>
+                <a:t>Vset</a:t>
+              </a:r>
+              <a:r>
+                <a:rPr lang="de-AT" sz="1100" baseline="-25000" dirty="0" smtClean="0">
+                  <a:solidFill>
+                    <a:srgbClr val="0070C0"/>
+                  </a:solidFill>
+                </a:rPr>
+                <a:t>1</a:t>
+              </a:r>
+              <a:endParaRPr lang="de-AT" sz="1100" baseline="-25000" dirty="0">
+                <a:solidFill>
+                  <a:srgbClr val="0070C0"/>
+                </a:solidFill>
+              </a:endParaRPr>
+            </a:p>
+          </p:txBody>
+        </p:sp>
+        <p:sp>
+          <p:nvSpPr>
+            <p:cNvPr id="11" name="Textfeld 10"/>
+            <p:cNvSpPr txBox="1"/>
+            <p:nvPr/>
+          </p:nvSpPr>
+          <p:spPr>
+            <a:xfrm>
+              <a:off x="6222707" y="4106205"/>
+              <a:ext cx="1008112" cy="363548"/>
+            </a:xfrm>
+            <a:prstGeom prst="rect">
+              <a:avLst/>
+            </a:prstGeom>
+            <a:noFill/>
+          </p:spPr>
+          <p:txBody>
+            <a:bodyPr wrap="square" rtlCol="0">
+              <a:spAutoFit/>
+            </a:bodyPr>
+            <a:lstStyle/>
+            <a:p>
+              <a:pPr algn="ctr"/>
+              <a:r>
+                <a:rPr lang="de-AT" sz="1100" dirty="0" smtClean="0">
+                  <a:solidFill>
+                    <a:srgbClr val="0070C0"/>
+                  </a:solidFill>
+                </a:rPr>
+                <a:t>Vset</a:t>
+              </a:r>
+              <a:r>
+                <a:rPr lang="de-AT" sz="1100" baseline="-25000" dirty="0" smtClean="0">
+                  <a:solidFill>
+                    <a:srgbClr val="0070C0"/>
+                  </a:solidFill>
+                </a:rPr>
+                <a:t>2</a:t>
+              </a:r>
+              <a:endParaRPr lang="de-AT" sz="1100" baseline="-25000" dirty="0">
+                <a:solidFill>
+                  <a:srgbClr val="0070C0"/>
+                </a:solidFill>
+              </a:endParaRPr>
+            </a:p>
+          </p:txBody>
+        </p:sp>
+        <p:cxnSp>
+          <p:nvCxnSpPr>
+            <p:cNvPr id="12" name="Gerade Verbindung 11"/>
+            <p:cNvCxnSpPr/>
+            <p:nvPr/>
+          </p:nvCxnSpPr>
+          <p:spPr>
+            <a:xfrm>
+              <a:off x="4206484" y="2677711"/>
+              <a:ext cx="1290495" cy="1716526"/>
+            </a:xfrm>
+            <a:prstGeom prst="line">
+              <a:avLst/>
+            </a:prstGeom>
+            <a:ln w="19050">
+              <a:solidFill>
+                <a:schemeClr val="accent2"/>
+              </a:solidFill>
+              <a:prstDash val="dash"/>
+            </a:ln>
+          </p:spPr>
+          <p:style>
+            <a:lnRef idx="1">
+              <a:schemeClr val="accent1"/>
+            </a:lnRef>
+            <a:fillRef idx="0">
+              <a:schemeClr val="accent1"/>
+            </a:fillRef>
+            <a:effectRef idx="0">
+              <a:schemeClr val="accent1"/>
+            </a:effectRef>
+            <a:fontRef idx="minor">
+              <a:schemeClr val="tx1"/>
+            </a:fontRef>
+          </p:style>
+        </p:cxnSp>
+        <p:sp>
+          <p:nvSpPr>
+            <p:cNvPr id="13" name="Textfeld 12"/>
+            <p:cNvSpPr txBox="1"/>
+            <p:nvPr/>
+          </p:nvSpPr>
+          <p:spPr>
+            <a:xfrm>
+              <a:off x="5245737" y="2874712"/>
+              <a:ext cx="2710639" cy="834022"/>
+            </a:xfrm>
+            <a:prstGeom prst="rect">
+              <a:avLst/>
+            </a:prstGeom>
+            <a:noFill/>
+          </p:spPr>
+          <p:txBody>
+            <a:bodyPr wrap="square" rtlCol="0">
+              <a:spAutoFit/>
+            </a:bodyPr>
+            <a:lstStyle/>
+            <a:p>
+              <a:pPr algn="ctr"/>
+              <a:r>
+                <a:rPr lang="de-AT" sz="1100" smtClean="0">
+                  <a:solidFill>
+                    <a:schemeClr val="accent2"/>
+                  </a:solidFill>
+                </a:rPr>
+                <a:t>Deceleration according to </a:t>
+              </a:r>
+              <a:r>
+                <a:rPr lang="de-AT" sz="1100" b="1" smtClean="0">
+                  <a:solidFill>
+                    <a:schemeClr val="accent2"/>
+                  </a:solidFill>
+                </a:rPr>
+                <a:t>a</a:t>
+              </a:r>
+              <a:r>
+                <a:rPr lang="de-AT" sz="1100" b="1" baseline="-25000" smtClean="0">
+                  <a:solidFill>
+                    <a:schemeClr val="accent2"/>
+                  </a:solidFill>
+                </a:rPr>
+                <a:t>brake</a:t>
+              </a:r>
+              <a:r>
+                <a:rPr lang="de-AT" sz="1100" b="1" smtClean="0">
+                  <a:solidFill>
+                    <a:schemeClr val="accent2"/>
+                  </a:solidFill>
+                </a:rPr>
+                <a:t>=f(v)-curve</a:t>
+              </a:r>
+              <a:r>
+                <a:rPr lang="de-AT" sz="1100" smtClean="0">
+                  <a:solidFill>
+                    <a:schemeClr val="accent2"/>
+                  </a:solidFill>
+                </a:rPr>
+                <a:t/>
+              </a:r>
+              <a:br>
+                <a:rPr lang="de-AT" sz="1100" smtClean="0">
+                  <a:solidFill>
+                    <a:schemeClr val="accent2"/>
+                  </a:solidFill>
+                </a:rPr>
+              </a:br>
+              <a:r>
+                <a:rPr lang="de-AT" sz="1100" smtClean="0">
+                  <a:solidFill>
+                    <a:schemeClr val="accent2"/>
+                  </a:solidFill>
+                </a:rPr>
+                <a:t> e.g. = -1m/s²</a:t>
+              </a:r>
+              <a:endParaRPr lang="de-AT" sz="1100" baseline="-25000">
+                <a:solidFill>
+                  <a:schemeClr val="accent2"/>
+                </a:solidFill>
+              </a:endParaRPr>
+            </a:p>
+          </p:txBody>
+        </p:sp>
+        <p:cxnSp>
+          <p:nvCxnSpPr>
+            <p:cNvPr id="14" name="Gerade Verbindung mit Pfeil 13"/>
+            <p:cNvCxnSpPr/>
+            <p:nvPr/>
+          </p:nvCxnSpPr>
+          <p:spPr>
+            <a:xfrm flipH="1">
+              <a:off x="4838552" y="3257916"/>
+              <a:ext cx="1058710" cy="242455"/>
+            </a:xfrm>
+            <a:prstGeom prst="straightConnector1">
+              <a:avLst/>
+            </a:prstGeom>
+            <a:ln w="9525">
+              <a:solidFill>
+                <a:schemeClr val="accent2"/>
+              </a:solidFill>
+              <a:tailEnd type="arrow"/>
+            </a:ln>
+          </p:spPr>
+          <p:style>
+            <a:lnRef idx="1">
+              <a:schemeClr val="accent1"/>
+            </a:lnRef>
+            <a:fillRef idx="0">
+              <a:schemeClr val="accent1"/>
+            </a:fillRef>
+            <a:effectRef idx="0">
+              <a:schemeClr val="accent1"/>
+            </a:effectRef>
+            <a:fontRef idx="minor">
+              <a:schemeClr val="tx1"/>
+            </a:fontRef>
+          </p:style>
+        </p:cxnSp>
+        <p:cxnSp>
+          <p:nvCxnSpPr>
+            <p:cNvPr id="15" name="Gerade Verbindung mit Pfeil 14"/>
+            <p:cNvCxnSpPr/>
+            <p:nvPr/>
+          </p:nvCxnSpPr>
+          <p:spPr>
+            <a:xfrm flipH="1">
+              <a:off x="3026648" y="2306005"/>
+              <a:ext cx="2466744" cy="0"/>
+            </a:xfrm>
+            <a:prstGeom prst="straightConnector1">
+              <a:avLst/>
+            </a:prstGeom>
+            <a:ln w="19050">
+              <a:solidFill>
+                <a:schemeClr val="tx1"/>
+              </a:solidFill>
+              <a:tailEnd type="arrow"/>
+            </a:ln>
+          </p:spPr>
+          <p:style>
+            <a:lnRef idx="1">
+              <a:schemeClr val="accent1"/>
+            </a:lnRef>
+            <a:fillRef idx="0">
+              <a:schemeClr val="accent1"/>
+            </a:fillRef>
+            <a:effectRef idx="0">
+              <a:schemeClr val="accent1"/>
+            </a:effectRef>
+            <a:fontRef idx="minor">
+              <a:schemeClr val="tx1"/>
+            </a:fontRef>
+          </p:style>
+        </p:cxnSp>
+        <p:cxnSp>
+          <p:nvCxnSpPr>
+            <p:cNvPr id="16" name="Gerade Verbindung mit Pfeil 15"/>
+            <p:cNvCxnSpPr/>
+            <p:nvPr/>
+          </p:nvCxnSpPr>
+          <p:spPr>
+            <a:xfrm flipV="1">
+              <a:off x="5502628" y="1714201"/>
+              <a:ext cx="0" cy="944488"/>
+            </a:xfrm>
+            <a:prstGeom prst="straightConnector1">
+              <a:avLst/>
+            </a:prstGeom>
+            <a:ln w="3175">
+              <a:solidFill>
+                <a:schemeClr val="tx1"/>
+              </a:solidFill>
+              <a:prstDash val="dash"/>
+              <a:tailEnd type="none"/>
+            </a:ln>
+          </p:spPr>
+          <p:style>
+            <a:lnRef idx="1">
+              <a:schemeClr val="accent1"/>
+            </a:lnRef>
+            <a:fillRef idx="0">
+              <a:schemeClr val="accent1"/>
+            </a:fillRef>
+            <a:effectRef idx="0">
+              <a:schemeClr val="accent1"/>
+            </a:effectRef>
+            <a:fontRef idx="minor">
+              <a:schemeClr val="tx1"/>
+            </a:fontRef>
+          </p:style>
+        </p:cxnSp>
+        <p:cxnSp>
+          <p:nvCxnSpPr>
+            <p:cNvPr id="17" name="Gerade Verbindung mit Pfeil 16"/>
+            <p:cNvCxnSpPr/>
+            <p:nvPr/>
+          </p:nvCxnSpPr>
+          <p:spPr>
+            <a:xfrm flipV="1">
+              <a:off x="3026648" y="1729434"/>
+              <a:ext cx="0" cy="944488"/>
+            </a:xfrm>
+            <a:prstGeom prst="straightConnector1">
+              <a:avLst/>
+            </a:prstGeom>
+            <a:ln w="3175">
+              <a:solidFill>
+                <a:schemeClr val="tx1"/>
+              </a:solidFill>
+              <a:prstDash val="dash"/>
+              <a:tailEnd type="none"/>
+            </a:ln>
+          </p:spPr>
+          <p:style>
+            <a:lnRef idx="1">
+              <a:schemeClr val="accent1"/>
+            </a:lnRef>
+            <a:fillRef idx="0">
+              <a:schemeClr val="accent1"/>
+            </a:fillRef>
+            <a:effectRef idx="0">
+              <a:schemeClr val="accent1"/>
+            </a:effectRef>
+            <a:fontRef idx="minor">
+              <a:schemeClr val="tx1"/>
+            </a:fontRef>
+          </p:style>
+        </p:cxnSp>
+        <p:sp>
+          <p:nvSpPr>
+            <p:cNvPr id="18" name="Textfeld 17"/>
+            <p:cNvSpPr txBox="1"/>
+            <p:nvPr/>
+          </p:nvSpPr>
+          <p:spPr>
+            <a:xfrm>
+              <a:off x="2810624" y="1297893"/>
+              <a:ext cx="2880320" cy="1133415"/>
+            </a:xfrm>
+            <a:prstGeom prst="rect">
+              <a:avLst/>
+            </a:prstGeom>
+            <a:noFill/>
+          </p:spPr>
+          <p:txBody>
+            <a:bodyPr wrap="square" rtlCol="0">
+              <a:spAutoFit/>
+            </a:bodyPr>
+            <a:lstStyle/>
+            <a:p>
+              <a:pPr algn="ctr"/>
+              <a:r>
+                <a:rPr lang="de-AT" sz="1200" b="1" smtClean="0"/>
+                <a:t>T = </a:t>
+              </a:r>
+              <a:br>
+                <a:rPr lang="de-AT" sz="1200" b="1" smtClean="0"/>
+              </a:br>
+              <a:r>
+                <a:rPr lang="de-AT" sz="1200" b="1" smtClean="0"/>
+                <a:t>(vset</a:t>
+              </a:r>
+              <a:r>
+                <a:rPr lang="de-AT" sz="1200" b="1" baseline="-25000" smtClean="0"/>
+                <a:t>1</a:t>
+              </a:r>
+              <a:r>
+                <a:rPr lang="de-AT" sz="1200" b="1" smtClean="0"/>
+                <a:t>-vset</a:t>
+              </a:r>
+              <a:r>
+                <a:rPr lang="de-AT" sz="1200" b="1" baseline="-25000" smtClean="0"/>
+                <a:t>2</a:t>
+              </a:r>
+              <a:r>
+                <a:rPr lang="de-AT" sz="1200" b="1" smtClean="0"/>
+                <a:t>) / a</a:t>
+              </a:r>
+              <a:r>
+                <a:rPr lang="de-AT" sz="1200" b="1" baseline="-25000" smtClean="0"/>
+                <a:t>lookahead</a:t>
+              </a:r>
+              <a:r>
+                <a:rPr lang="de-AT" sz="1200" b="1" smtClean="0"/>
+                <a:t/>
+              </a:r>
+              <a:br>
+                <a:rPr lang="de-AT" sz="1200" b="1" smtClean="0"/>
+              </a:br>
+              <a:r>
+                <a:rPr lang="de-AT" sz="1100" smtClean="0"/>
+                <a:t>e.g. a</a:t>
+              </a:r>
+              <a:r>
+                <a:rPr lang="de-AT" sz="1100" baseline="-25000" smtClean="0"/>
+                <a:t>lookahead</a:t>
+              </a:r>
+              <a:r>
+                <a:rPr lang="de-AT" sz="1100" smtClean="0"/>
+                <a:t> = -0.5m/s²</a:t>
+              </a:r>
+            </a:p>
+            <a:p>
+              <a:pPr algn="ctr"/>
+              <a:endParaRPr lang="de-AT" sz="1200" b="1" baseline="-25000"/>
+            </a:p>
+          </p:txBody>
+        </p:sp>
+        <p:cxnSp>
+          <p:nvCxnSpPr>
+            <p:cNvPr id="19" name="Gerade Verbindung 18"/>
+            <p:cNvCxnSpPr/>
+            <p:nvPr/>
+          </p:nvCxnSpPr>
+          <p:spPr>
+            <a:xfrm>
+              <a:off x="3040590" y="2674180"/>
+              <a:ext cx="1435274" cy="371299"/>
+            </a:xfrm>
+            <a:prstGeom prst="line">
+              <a:avLst/>
+            </a:prstGeom>
+            <a:ln w="38100">
+              <a:solidFill>
+                <a:srgbClr val="FF0000"/>
+              </a:solidFill>
+              <a:prstDash val="solid"/>
+            </a:ln>
+          </p:spPr>
+          <p:style>
+            <a:lnRef idx="1">
+              <a:schemeClr val="accent1"/>
+            </a:lnRef>
+            <a:fillRef idx="0">
+              <a:schemeClr val="accent1"/>
+            </a:fillRef>
+            <a:effectRef idx="0">
+              <a:schemeClr val="accent1"/>
+            </a:effectRef>
+            <a:fontRef idx="minor">
+              <a:schemeClr val="tx1"/>
+            </a:fontRef>
+          </p:style>
+        </p:cxnSp>
+        <p:cxnSp>
+          <p:nvCxnSpPr>
+            <p:cNvPr id="20" name="Gerade Verbindung 19"/>
+            <p:cNvCxnSpPr/>
+            <p:nvPr/>
+          </p:nvCxnSpPr>
+          <p:spPr>
+            <a:xfrm>
+              <a:off x="4458512" y="3045479"/>
+              <a:ext cx="1005645" cy="1348510"/>
+            </a:xfrm>
+            <a:prstGeom prst="line">
+              <a:avLst/>
+            </a:prstGeom>
+            <a:ln w="38100">
+              <a:solidFill>
+                <a:srgbClr val="FF0000"/>
+              </a:solidFill>
+              <a:prstDash val="solid"/>
+            </a:ln>
+          </p:spPr>
+          <p:style>
+            <a:lnRef idx="1">
+              <a:schemeClr val="accent1"/>
+            </a:lnRef>
+            <a:fillRef idx="0">
+              <a:schemeClr val="accent1"/>
+            </a:fillRef>
+            <a:effectRef idx="0">
+              <a:schemeClr val="accent1"/>
+            </a:effectRef>
+            <a:fontRef idx="minor">
+              <a:schemeClr val="tx1"/>
+            </a:fontRef>
+          </p:style>
+        </p:cxnSp>
+        <p:cxnSp>
+          <p:nvCxnSpPr>
+            <p:cNvPr id="21" name="Gerade Verbindung 20"/>
+            <p:cNvCxnSpPr/>
+            <p:nvPr/>
+          </p:nvCxnSpPr>
+          <p:spPr>
+            <a:xfrm>
+              <a:off x="5464157" y="4414753"/>
+              <a:ext cx="1330266" cy="0"/>
+            </a:xfrm>
+            <a:prstGeom prst="line">
+              <a:avLst/>
+            </a:prstGeom>
+            <a:ln w="38100">
+              <a:solidFill>
+                <a:srgbClr val="FF0000"/>
+              </a:solidFill>
+              <a:prstDash val="solid"/>
+            </a:ln>
+          </p:spPr>
+          <p:style>
+            <a:lnRef idx="1">
+              <a:schemeClr val="accent1"/>
+            </a:lnRef>
+            <a:fillRef idx="0">
+              <a:schemeClr val="accent1"/>
+            </a:fillRef>
+            <a:effectRef idx="0">
+              <a:schemeClr val="accent1"/>
+            </a:effectRef>
+            <a:fontRef idx="minor">
+              <a:schemeClr val="tx1"/>
+            </a:fontRef>
+          </p:style>
+        </p:cxnSp>
+        <p:cxnSp>
+          <p:nvCxnSpPr>
+            <p:cNvPr id="22" name="Gerade Verbindung 21"/>
+            <p:cNvCxnSpPr/>
+            <p:nvPr/>
+          </p:nvCxnSpPr>
+          <p:spPr>
+            <a:xfrm flipV="1">
+              <a:off x="2120592" y="2686947"/>
+              <a:ext cx="919998" cy="7551"/>
+            </a:xfrm>
+            <a:prstGeom prst="line">
+              <a:avLst/>
+            </a:prstGeom>
+            <a:ln w="38100">
+              <a:solidFill>
+                <a:srgbClr val="FF0000"/>
+              </a:solidFill>
+              <a:prstDash val="solid"/>
+            </a:ln>
+          </p:spPr>
+          <p:style>
+            <a:lnRef idx="1">
+              <a:schemeClr val="accent1"/>
+            </a:lnRef>
+            <a:fillRef idx="0">
+              <a:schemeClr val="accent1"/>
+            </a:fillRef>
+            <a:effectRef idx="0">
+              <a:schemeClr val="accent1"/>
+            </a:effectRef>
+            <a:fontRef idx="minor">
+              <a:schemeClr val="tx1"/>
+            </a:fontRef>
+          </p:style>
+        </p:cxnSp>
+        <p:sp>
+          <p:nvSpPr>
+            <p:cNvPr id="23" name="Textfeld 22"/>
+            <p:cNvSpPr txBox="1"/>
+            <p:nvPr/>
+          </p:nvSpPr>
+          <p:spPr>
+            <a:xfrm>
+              <a:off x="2900285" y="4169502"/>
+              <a:ext cx="1705063" cy="898178"/>
+            </a:xfrm>
+            <a:prstGeom prst="rect">
+              <a:avLst/>
+            </a:prstGeom>
+            <a:noFill/>
+          </p:spPr>
+          <p:txBody>
+            <a:bodyPr wrap="square" rtlCol="0">
+              <a:spAutoFit/>
+            </a:bodyPr>
+            <a:lstStyle/>
+            <a:p>
+              <a:pPr algn="ctr"/>
+              <a:r>
+                <a:rPr lang="de-AT" sz="1200" smtClean="0">
+                  <a:solidFill>
+                    <a:srgbClr val="FF0000"/>
+                  </a:solidFill>
+                </a:rPr>
+                <a:t>resulting vehicle speed course</a:t>
+              </a:r>
+              <a:endParaRPr lang="de-AT" sz="1200" baseline="-25000">
+                <a:solidFill>
+                  <a:srgbClr val="FF0000"/>
+                </a:solidFill>
+              </a:endParaRPr>
+            </a:p>
+          </p:txBody>
+        </p:sp>
+        <p:cxnSp>
+          <p:nvCxnSpPr>
+            <p:cNvPr id="24" name="Gerade Verbindung mit Pfeil 23"/>
+            <p:cNvCxnSpPr>
+              <a:stCxn id="23" idx="0"/>
+            </p:cNvCxnSpPr>
+            <p:nvPr/>
+          </p:nvCxnSpPr>
+          <p:spPr>
+            <a:xfrm flipV="1">
+              <a:off x="3752817" y="3810551"/>
+              <a:ext cx="1240992" cy="358951"/>
+            </a:xfrm>
+            <a:prstGeom prst="straightConnector1">
+              <a:avLst/>
+            </a:prstGeom>
+            <a:ln w="9525">
+              <a:solidFill>
+                <a:srgbClr val="FF0000"/>
+              </a:solidFill>
+              <a:tailEnd type="arrow"/>
+            </a:ln>
+          </p:spPr>
+          <p:style>
+            <a:lnRef idx="1">
+              <a:schemeClr val="accent1"/>
+            </a:lnRef>
+            <a:fillRef idx="0">
+              <a:schemeClr val="accent1"/>
+            </a:fillRef>
+            <a:effectRef idx="0">
+              <a:schemeClr val="accent1"/>
+            </a:effectRef>
+            <a:fontRef idx="minor">
+              <a:schemeClr val="tx1"/>
+            </a:fontRef>
+          </p:style>
+        </p:cxnSp>
+        <p:sp>
+          <p:nvSpPr>
+            <p:cNvPr id="25" name="Textfeld 24"/>
+            <p:cNvSpPr txBox="1"/>
+            <p:nvPr/>
+          </p:nvSpPr>
+          <p:spPr>
+            <a:xfrm>
+              <a:off x="3104773" y="3070636"/>
+              <a:ext cx="1250068" cy="641556"/>
+            </a:xfrm>
+            <a:prstGeom prst="rect">
+              <a:avLst/>
+            </a:prstGeom>
+            <a:noFill/>
+          </p:spPr>
+          <p:txBody>
+            <a:bodyPr wrap="square" rtlCol="0">
+              <a:spAutoFit/>
+            </a:bodyPr>
+            <a:lstStyle/>
+            <a:p>
+              <a:pPr algn="ctr"/>
+              <a:r>
+                <a:rPr lang="de-AT" sz="1200" smtClean="0">
+                  <a:solidFill>
+                    <a:srgbClr val="FF0000"/>
+                  </a:solidFill>
+                </a:rPr>
+                <a:t>coasting phase</a:t>
+              </a:r>
+              <a:endParaRPr lang="de-AT" sz="1200" baseline="-25000">
+                <a:solidFill>
+                  <a:srgbClr val="FF0000"/>
+                </a:solidFill>
+              </a:endParaRPr>
+            </a:p>
+          </p:txBody>
+        </p:sp>
+        <p:cxnSp>
+          <p:nvCxnSpPr>
+            <p:cNvPr id="26" name="Gerade Verbindung mit Pfeil 25"/>
+            <p:cNvCxnSpPr/>
+            <p:nvPr/>
+          </p:nvCxnSpPr>
+          <p:spPr>
+            <a:xfrm flipV="1">
+              <a:off x="3026648" y="2695391"/>
+              <a:ext cx="0" cy="746679"/>
+            </a:xfrm>
+            <a:prstGeom prst="straightConnector1">
+              <a:avLst/>
+            </a:prstGeom>
+            <a:ln w="3175">
+              <a:solidFill>
+                <a:srgbClr val="FF0000"/>
+              </a:solidFill>
+              <a:prstDash val="dash"/>
+              <a:tailEnd type="none"/>
+            </a:ln>
+          </p:spPr>
+          <p:style>
+            <a:lnRef idx="1">
+              <a:schemeClr val="accent1"/>
+            </a:lnRef>
+            <a:fillRef idx="0">
+              <a:schemeClr val="accent1"/>
+            </a:fillRef>
+            <a:effectRef idx="0">
+              <a:schemeClr val="accent1"/>
+            </a:effectRef>
+            <a:fontRef idx="minor">
+              <a:schemeClr val="tx1"/>
+            </a:fontRef>
+          </p:style>
+        </p:cxnSp>
+        <p:cxnSp>
+          <p:nvCxnSpPr>
+            <p:cNvPr id="27" name="Gerade Verbindung mit Pfeil 26"/>
+            <p:cNvCxnSpPr/>
+            <p:nvPr/>
+          </p:nvCxnSpPr>
+          <p:spPr>
+            <a:xfrm flipV="1">
+              <a:off x="4449276" y="3054716"/>
+              <a:ext cx="8117" cy="387354"/>
+            </a:xfrm>
+            <a:prstGeom prst="straightConnector1">
+              <a:avLst/>
+            </a:prstGeom>
+            <a:ln w="3175">
+              <a:solidFill>
+                <a:srgbClr val="FF0000"/>
+              </a:solidFill>
+              <a:prstDash val="dash"/>
+              <a:tailEnd type="none"/>
+            </a:ln>
+          </p:spPr>
+          <p:style>
+            <a:lnRef idx="1">
+              <a:schemeClr val="accent1"/>
+            </a:lnRef>
+            <a:fillRef idx="0">
+              <a:schemeClr val="accent1"/>
+            </a:fillRef>
+            <a:effectRef idx="0">
+              <a:schemeClr val="accent1"/>
+            </a:effectRef>
+            <a:fontRef idx="minor">
+              <a:schemeClr val="tx1"/>
+            </a:fontRef>
+          </p:style>
+        </p:cxnSp>
+        <p:cxnSp>
+          <p:nvCxnSpPr>
+            <p:cNvPr id="28" name="Gerade Verbindung mit Pfeil 27"/>
+            <p:cNvCxnSpPr/>
+            <p:nvPr/>
+          </p:nvCxnSpPr>
+          <p:spPr>
+            <a:xfrm>
+              <a:off x="3022291" y="3363023"/>
+              <a:ext cx="1426985" cy="0"/>
+            </a:xfrm>
+            <a:prstGeom prst="straightConnector1">
+              <a:avLst/>
+            </a:prstGeom>
+            <a:ln w="9525">
+              <a:solidFill>
+                <a:srgbClr val="FF0000"/>
+              </a:solidFill>
+              <a:headEnd type="arrow"/>
+              <a:tailEnd type="arrow"/>
+            </a:ln>
+          </p:spPr>
+          <p:style>
+            <a:lnRef idx="1">
+              <a:schemeClr val="accent1"/>
+            </a:lnRef>
+            <a:fillRef idx="0">
+              <a:schemeClr val="accent1"/>
+            </a:fillRef>
+            <a:effectRef idx="0">
+              <a:schemeClr val="accent1"/>
+            </a:effectRef>
+            <a:fontRef idx="minor">
+              <a:schemeClr val="tx1"/>
+            </a:fontRef>
+          </p:style>
+        </p:cxnSp>
+      </p:grpSp>
     </p:spTree>
     <p:extLst>
       <p:ext uri="{BB962C8B-B14F-4D97-AF65-F5344CB8AC3E}">
         <p14:creationId xmlns:p14="http://schemas.microsoft.com/office/powerpoint/2010/main" val="2520766412"/>
+      </p:ext>
+    </p:extLst>
+  </p:cSld>
+  <p:clrMapOvr>
+    <a:masterClrMapping/>
+  </p:clrMapOvr>
+</p:sld>
+</file>
+
+<file path=ppt/slides/slide14.xml><?xml version="1.0" encoding="utf-8"?>
+<p:sld xmlns:a="http://schemas.openxmlformats.org/drawingml/2006/main" xmlns:r="http://schemas.openxmlformats.org/officeDocument/2006/relationships" xmlns:p="http://schemas.openxmlformats.org/presentationml/2006/main">
+  <p:cSld>
+    <p:spTree>
+      <p:nvGrpSpPr>
+        <p:cNvPr id="1" name=""/>
+        <p:cNvGrpSpPr/>
+        <p:nvPr/>
+      </p:nvGrpSpPr>
+      <p:grpSpPr>
+        <a:xfrm>
+          <a:off x="0" y="0"/>
+          <a:ext cx="0" cy="0"/>
+          <a:chOff x="0" y="0"/>
+          <a:chExt cx="0" cy="0"/>
+        </a:xfrm>
+      </p:grpSpPr>
+      <p:pic>
+        <p:nvPicPr>
+          <p:cNvPr id="2" name="Picture 4"/>
+          <p:cNvPicPr>
+            <a:picLocks noChangeAspect="1" noChangeArrowheads="1"/>
+          </p:cNvPicPr>
+          <p:nvPr/>
+        </p:nvPicPr>
+        <p:blipFill>
+          <a:blip r:embed="rId2" cstate="print">
+            <a:extLst>
+              <a:ext uri="{28A0092B-C50C-407E-A947-70E740481C1C}">
+                <a14:useLocalDpi xmlns:a14="http://schemas.microsoft.com/office/drawing/2010/main" val="0"/>
+              </a:ext>
+            </a:extLst>
+          </a:blip>
+          <a:srcRect/>
+          <a:stretch>
+            <a:fillRect/>
+          </a:stretch>
+        </p:blipFill>
+        <p:spPr bwMode="auto">
+          <a:xfrm>
+            <a:off x="3332176" y="3512481"/>
+            <a:ext cx="818912" cy="676361"/>
+          </a:xfrm>
+          <a:prstGeom prst="rect">
+            <a:avLst/>
+          </a:prstGeom>
+          <a:noFill/>
+          <a:ln>
+            <a:noFill/>
+          </a:ln>
+          <a:effectLst/>
+          <a:extLst>
+            <a:ext uri="{909E8E84-426E-40DD-AFC4-6F175D3DCCD1}">
+              <a14:hiddenFill xmlns:a14="http://schemas.microsoft.com/office/drawing/2010/main">
+                <a:solidFill>
+                  <a:schemeClr val="accent1"/>
+                </a:solidFill>
+              </a14:hiddenFill>
+            </a:ext>
+            <a:ext uri="{91240B29-F687-4F45-9708-019B960494DF}">
+              <a14:hiddenLine xmlns:a14="http://schemas.microsoft.com/office/drawing/2010/main" w="9525">
+                <a:solidFill>
+                  <a:schemeClr val="tx1"/>
+                </a:solidFill>
+                <a:miter lim="800000"/>
+                <a:headEnd/>
+                <a:tailEnd/>
+              </a14:hiddenLine>
+            </a:ext>
+            <a:ext uri="{AF507438-7753-43E0-B8FC-AC1667EBCBE1}">
+              <a14:hiddenEffects xmlns:a14="http://schemas.microsoft.com/office/drawing/2010/main">
+                <a:effectLst>
+                  <a:outerShdw dist="35921" dir="2700000" algn="ctr" rotWithShape="0">
+                    <a:schemeClr val="bg2"/>
+                  </a:outerShdw>
+                </a:effectLst>
+              </a14:hiddenEffects>
+            </a:ext>
+          </a:extLst>
+        </p:spPr>
+      </p:pic>
+      <p:sp>
+        <p:nvSpPr>
+          <p:cNvPr id="3" name="Rechteck 2"/>
+          <p:cNvSpPr/>
+          <p:nvPr/>
+        </p:nvSpPr>
+        <p:spPr bwMode="auto">
+          <a:xfrm>
+            <a:off x="3216524" y="3430387"/>
+            <a:ext cx="974277" cy="828675"/>
+          </a:xfrm>
+          <a:prstGeom prst="rect">
+            <a:avLst/>
+          </a:prstGeom>
+          <a:noFill/>
+          <a:ln w="28575" cap="flat" cmpd="sng" algn="ctr">
+            <a:solidFill>
+              <a:srgbClr val="7183AB"/>
+            </a:solidFill>
+            <a:prstDash val="solid"/>
+            <a:round/>
+            <a:headEnd type="none" w="med" len="med"/>
+            <a:tailEnd type="triangle" w="med" len="med"/>
+          </a:ln>
+          <a:effectLst/>
+          <a:extLst/>
+        </p:spPr>
+        <p:txBody>
+          <a:bodyPr vert="horz" wrap="square" lIns="91440" tIns="45720" rIns="91440" bIns="45720" numCol="1" rtlCol="0" anchor="ctr" anchorCtr="0" compatLnSpc="1">
+            <a:prstTxWarp prst="textNoShape">
+              <a:avLst/>
+            </a:prstTxWarp>
+            <a:noAutofit/>
+          </a:bodyPr>
+          <a:lstStyle/>
+          <a:p>
+            <a:pPr marL="0" marR="0" indent="0" algn="ctr" defTabSz="914400" rtl="0" eaLnBrk="1" fontAlgn="base" latinLnBrk="0" hangingPunct="1">
+              <a:lnSpc>
+                <a:spcPct val="100000"/>
+              </a:lnSpc>
+              <a:spcBef>
+                <a:spcPct val="30000"/>
+              </a:spcBef>
+              <a:spcAft>
+                <a:spcPct val="0"/>
+              </a:spcAft>
+              <a:buClrTx/>
+              <a:buSzTx/>
+              <a:buFontTx/>
+              <a:buNone/>
+              <a:tabLst/>
+            </a:pPr>
+            <a:endParaRPr kumimoji="0" lang="en-GB" sz="2000" b="1" i="0" u="none" strike="noStrike" cap="none" normalizeH="0" baseline="0" smtClean="0">
+              <a:ln>
+                <a:noFill/>
+              </a:ln>
+              <a:solidFill>
+                <a:schemeClr val="tx1"/>
+              </a:solidFill>
+              <a:effectLst/>
+              <a:latin typeface="Arial" pitchFamily="34" charset="0"/>
+            </a:endParaRPr>
+          </a:p>
+        </p:txBody>
+      </p:sp>
+      <p:sp>
+        <p:nvSpPr>
+          <p:cNvPr id="4" name="Textfeld 3"/>
+          <p:cNvSpPr txBox="1"/>
+          <p:nvPr/>
+        </p:nvSpPr>
+        <p:spPr>
+          <a:xfrm>
+            <a:off x="3349186" y="4286972"/>
+            <a:ext cx="659426" cy="261610"/>
+          </a:xfrm>
+          <a:prstGeom prst="rect">
+            <a:avLst/>
+          </a:prstGeom>
+          <a:noFill/>
+          <a:ln>
+            <a:noFill/>
+          </a:ln>
+        </p:spPr>
+        <p:txBody>
+          <a:bodyPr wrap="square" rtlCol="0">
+            <a:spAutoFit/>
+          </a:bodyPr>
+          <a:lstStyle/>
+          <a:p>
+            <a:pPr algn="l"/>
+            <a:r>
+              <a:rPr lang="en-GB" sz="1100" b="0" smtClean="0"/>
+              <a:t>Engine</a:t>
+            </a:r>
+          </a:p>
+        </p:txBody>
+      </p:sp>
+      <p:pic>
+        <p:nvPicPr>
+          <p:cNvPr id="5" name="Picture 3"/>
+          <p:cNvPicPr>
+            <a:picLocks noChangeAspect="1" noChangeArrowheads="1"/>
+          </p:cNvPicPr>
+          <p:nvPr/>
+        </p:nvPicPr>
+        <p:blipFill rotWithShape="1">
+          <a:blip r:embed="rId3">
+            <a:extLst>
+              <a:ext uri="{28A0092B-C50C-407E-A947-70E740481C1C}">
+                <a14:useLocalDpi xmlns:a14="http://schemas.microsoft.com/office/drawing/2010/main" val="0"/>
+              </a:ext>
+            </a:extLst>
+          </a:blip>
+          <a:srcRect l="2248" t="2779" r="2674" b="2869"/>
+          <a:stretch/>
+        </p:blipFill>
+        <p:spPr bwMode="auto">
+          <a:xfrm>
+            <a:off x="192188" y="2211868"/>
+            <a:ext cx="2843642" cy="2444453"/>
+          </a:xfrm>
+          <a:prstGeom prst="rect">
+            <a:avLst/>
+          </a:prstGeom>
+          <a:noFill/>
+          <a:ln>
+            <a:noFill/>
+          </a:ln>
+          <a:extLst>
+            <a:ext uri="{909E8E84-426E-40DD-AFC4-6F175D3DCCD1}">
+              <a14:hiddenFill xmlns:a14="http://schemas.microsoft.com/office/drawing/2010/main">
+                <a:solidFill>
+                  <a:schemeClr val="accent1"/>
+                </a:solidFill>
+              </a14:hiddenFill>
+            </a:ext>
+            <a:ext uri="{91240B29-F687-4F45-9708-019B960494DF}">
+              <a14:hiddenLine xmlns:a14="http://schemas.microsoft.com/office/drawing/2010/main" w="9525">
+                <a:solidFill>
+                  <a:schemeClr val="tx1"/>
+                </a:solidFill>
+                <a:miter lim="800000"/>
+                <a:headEnd/>
+                <a:tailEnd/>
+              </a14:hiddenLine>
+            </a:ext>
+          </a:extLst>
+        </p:spPr>
+      </p:pic>
+      <p:pic>
+        <p:nvPicPr>
+          <p:cNvPr id="6" name="Picture 4"/>
+          <p:cNvPicPr>
+            <a:picLocks noChangeAspect="1" noChangeArrowheads="1"/>
+          </p:cNvPicPr>
+          <p:nvPr/>
+        </p:nvPicPr>
+        <p:blipFill>
+          <a:blip r:embed="rId4">
+            <a:extLst>
+              <a:ext uri="{28A0092B-C50C-407E-A947-70E740481C1C}">
+                <a14:useLocalDpi xmlns:a14="http://schemas.microsoft.com/office/drawing/2010/main" val="0"/>
+              </a:ext>
+            </a:extLst>
+          </a:blip>
+          <a:srcRect/>
+          <a:stretch>
+            <a:fillRect/>
+          </a:stretch>
+        </p:blipFill>
+        <p:spPr bwMode="auto">
+          <a:xfrm>
+            <a:off x="4212134" y="3289464"/>
+            <a:ext cx="4738141" cy="1181122"/>
+          </a:xfrm>
+          <a:prstGeom prst="rect">
+            <a:avLst/>
+          </a:prstGeom>
+          <a:noFill/>
+          <a:ln>
+            <a:noFill/>
+          </a:ln>
+          <a:extLst>
+            <a:ext uri="{909E8E84-426E-40DD-AFC4-6F175D3DCCD1}">
+              <a14:hiddenFill xmlns:a14="http://schemas.microsoft.com/office/drawing/2010/main">
+                <a:solidFill>
+                  <a:schemeClr val="accent1"/>
+                </a:solidFill>
+              </a14:hiddenFill>
+            </a:ext>
+            <a:ext uri="{91240B29-F687-4F45-9708-019B960494DF}">
+              <a14:hiddenLine xmlns:a14="http://schemas.microsoft.com/office/drawing/2010/main" w="9525">
+                <a:solidFill>
+                  <a:schemeClr val="tx1"/>
+                </a:solidFill>
+                <a:miter lim="800000"/>
+                <a:headEnd/>
+                <a:tailEnd/>
+              </a14:hiddenLine>
+            </a:ext>
+          </a:extLst>
+        </p:spPr>
+      </p:pic>
+      <p:sp>
+        <p:nvSpPr>
+          <p:cNvPr id="7" name="Pfeil nach unten 6"/>
+          <p:cNvSpPr/>
+          <p:nvPr/>
+        </p:nvSpPr>
+        <p:spPr bwMode="auto">
+          <a:xfrm>
+            <a:off x="8182810" y="2856121"/>
+            <a:ext cx="576064" cy="504056"/>
+          </a:xfrm>
+          <a:prstGeom prst="downArrow">
+            <a:avLst/>
+          </a:prstGeom>
+          <a:solidFill>
+            <a:srgbClr val="990000"/>
+          </a:solidFill>
+          <a:ln w="19050" cap="flat" cmpd="sng" algn="ctr">
+            <a:solidFill>
+              <a:schemeClr val="tx1"/>
+            </a:solidFill>
+            <a:prstDash val="solid"/>
+            <a:round/>
+            <a:headEnd type="none" w="med" len="med"/>
+            <a:tailEnd type="triangle" w="med" len="med"/>
+          </a:ln>
+          <a:effectLst/>
+          <a:extLst/>
+        </p:spPr>
+        <p:txBody>
+          <a:bodyPr vert="horz" wrap="square" lIns="91440" tIns="45720" rIns="91440" bIns="45720" numCol="1" rtlCol="0" anchor="ctr" anchorCtr="0" compatLnSpc="1">
+            <a:prstTxWarp prst="textNoShape">
+              <a:avLst/>
+            </a:prstTxWarp>
+            <a:spAutoFit/>
+          </a:bodyPr>
+          <a:lstStyle/>
+          <a:p>
+            <a:pPr marL="0" marR="0" indent="0" algn="ctr" defTabSz="914400" rtl="0" eaLnBrk="1" fontAlgn="base" latinLnBrk="0" hangingPunct="1">
+              <a:lnSpc>
+                <a:spcPct val="100000"/>
+              </a:lnSpc>
+              <a:spcBef>
+                <a:spcPct val="30000"/>
+              </a:spcBef>
+              <a:spcAft>
+                <a:spcPct val="0"/>
+              </a:spcAft>
+              <a:buClrTx/>
+              <a:buSzTx/>
+              <a:buFontTx/>
+              <a:buNone/>
+              <a:tabLst/>
+            </a:pPr>
+            <a:endParaRPr kumimoji="0" lang="en-GB" sz="2000" b="1" i="0" u="none" strike="noStrike" cap="none" normalizeH="0" baseline="0" smtClean="0">
+              <a:ln>
+                <a:noFill/>
+              </a:ln>
+              <a:solidFill>
+                <a:schemeClr val="tx1"/>
+              </a:solidFill>
+              <a:effectLst/>
+              <a:latin typeface="Arial" pitchFamily="34" charset="0"/>
+            </a:endParaRPr>
+          </a:p>
+        </p:txBody>
+      </p:sp>
+      <p:sp>
+        <p:nvSpPr>
+          <p:cNvPr id="8" name="Pfeil nach unten 7"/>
+          <p:cNvSpPr/>
+          <p:nvPr/>
+        </p:nvSpPr>
+        <p:spPr bwMode="auto">
+          <a:xfrm>
+            <a:off x="6387328" y="2859307"/>
+            <a:ext cx="576064" cy="504056"/>
+          </a:xfrm>
+          <a:prstGeom prst="downArrow">
+            <a:avLst/>
+          </a:prstGeom>
+          <a:solidFill>
+            <a:srgbClr val="990000"/>
+          </a:solidFill>
+          <a:ln w="19050" cap="flat" cmpd="sng" algn="ctr">
+            <a:solidFill>
+              <a:schemeClr val="tx1"/>
+            </a:solidFill>
+            <a:prstDash val="solid"/>
+            <a:round/>
+            <a:headEnd type="none" w="med" len="med"/>
+            <a:tailEnd type="triangle" w="med" len="med"/>
+          </a:ln>
+          <a:effectLst/>
+          <a:extLst/>
+        </p:spPr>
+        <p:txBody>
+          <a:bodyPr vert="horz" wrap="square" lIns="91440" tIns="45720" rIns="91440" bIns="45720" numCol="1" rtlCol="0" anchor="ctr" anchorCtr="0" compatLnSpc="1">
+            <a:prstTxWarp prst="textNoShape">
+              <a:avLst/>
+            </a:prstTxWarp>
+            <a:spAutoFit/>
+          </a:bodyPr>
+          <a:lstStyle/>
+          <a:p>
+            <a:pPr marL="0" marR="0" indent="0" algn="ctr" defTabSz="914400" rtl="0" eaLnBrk="1" fontAlgn="base" latinLnBrk="0" hangingPunct="1">
+              <a:lnSpc>
+                <a:spcPct val="100000"/>
+              </a:lnSpc>
+              <a:spcBef>
+                <a:spcPct val="30000"/>
+              </a:spcBef>
+              <a:spcAft>
+                <a:spcPct val="0"/>
+              </a:spcAft>
+              <a:buClrTx/>
+              <a:buSzTx/>
+              <a:buFontTx/>
+              <a:buNone/>
+              <a:tabLst/>
+            </a:pPr>
+            <a:endParaRPr kumimoji="0" lang="en-GB" sz="2000" b="1" i="0" u="none" strike="noStrike" cap="none" normalizeH="0" baseline="0" smtClean="0">
+              <a:ln>
+                <a:noFill/>
+              </a:ln>
+              <a:solidFill>
+                <a:schemeClr val="tx1"/>
+              </a:solidFill>
+              <a:effectLst/>
+              <a:latin typeface="Arial" pitchFamily="34" charset="0"/>
+            </a:endParaRPr>
+          </a:p>
+        </p:txBody>
+      </p:sp>
+      <p:sp>
+        <p:nvSpPr>
+          <p:cNvPr id="9" name="Textfeld 8"/>
+          <p:cNvSpPr txBox="1"/>
+          <p:nvPr/>
+        </p:nvSpPr>
+        <p:spPr>
+          <a:xfrm>
+            <a:off x="7966788" y="2394456"/>
+            <a:ext cx="1154392" cy="461665"/>
+          </a:xfrm>
+          <a:prstGeom prst="rect">
+            <a:avLst/>
+          </a:prstGeom>
+          <a:noFill/>
+          <a:ln>
+            <a:noFill/>
+          </a:ln>
+        </p:spPr>
+        <p:txBody>
+          <a:bodyPr wrap="square" rtlCol="0">
+            <a:noAutofit/>
+          </a:bodyPr>
+          <a:lstStyle/>
+          <a:p>
+            <a:pPr algn="l"/>
+            <a:r>
+              <a:rPr lang="en-GB" sz="1200" smtClean="0"/>
+              <a:t>Longitudinal dynamics</a:t>
+            </a:r>
+          </a:p>
+        </p:txBody>
+      </p:sp>
+      <p:sp>
+        <p:nvSpPr>
+          <p:cNvPr id="10" name="Pfeil nach unten 9"/>
+          <p:cNvSpPr/>
+          <p:nvPr/>
+        </p:nvSpPr>
+        <p:spPr bwMode="auto">
+          <a:xfrm>
+            <a:off x="4522764" y="2908444"/>
+            <a:ext cx="576064" cy="504056"/>
+          </a:xfrm>
+          <a:prstGeom prst="downArrow">
+            <a:avLst/>
+          </a:prstGeom>
+          <a:solidFill>
+            <a:srgbClr val="990000"/>
+          </a:solidFill>
+          <a:ln w="19050" cap="flat" cmpd="sng" algn="ctr">
+            <a:solidFill>
+              <a:schemeClr val="tx1"/>
+            </a:solidFill>
+            <a:prstDash val="solid"/>
+            <a:round/>
+            <a:headEnd type="none" w="med" len="med"/>
+            <a:tailEnd type="triangle" w="med" len="med"/>
+          </a:ln>
+          <a:effectLst/>
+          <a:extLst/>
+        </p:spPr>
+        <p:txBody>
+          <a:bodyPr vert="horz" wrap="square" lIns="91440" tIns="45720" rIns="91440" bIns="45720" numCol="1" rtlCol="0" anchor="ctr" anchorCtr="0" compatLnSpc="1">
+            <a:prstTxWarp prst="textNoShape">
+              <a:avLst/>
+            </a:prstTxWarp>
+            <a:spAutoFit/>
+          </a:bodyPr>
+          <a:lstStyle/>
+          <a:p>
+            <a:pPr marL="0" marR="0" indent="0" algn="ctr" defTabSz="914400" rtl="0" eaLnBrk="1" fontAlgn="base" latinLnBrk="0" hangingPunct="1">
+              <a:lnSpc>
+                <a:spcPct val="100000"/>
+              </a:lnSpc>
+              <a:spcBef>
+                <a:spcPct val="30000"/>
+              </a:spcBef>
+              <a:spcAft>
+                <a:spcPct val="0"/>
+              </a:spcAft>
+              <a:buClrTx/>
+              <a:buSzTx/>
+              <a:buFontTx/>
+              <a:buNone/>
+              <a:tabLst/>
+            </a:pPr>
+            <a:endParaRPr kumimoji="0" lang="en-GB" sz="2000" b="1" i="0" u="none" strike="noStrike" cap="none" normalizeH="0" baseline="0" smtClean="0">
+              <a:ln>
+                <a:noFill/>
+              </a:ln>
+              <a:solidFill>
+                <a:schemeClr val="tx1"/>
+              </a:solidFill>
+              <a:effectLst/>
+              <a:latin typeface="Arial" pitchFamily="34" charset="0"/>
+            </a:endParaRPr>
+          </a:p>
+        </p:txBody>
+      </p:sp>
+      <p:sp>
+        <p:nvSpPr>
+          <p:cNvPr id="11" name="Textfeld 10"/>
+          <p:cNvSpPr txBox="1"/>
+          <p:nvPr/>
+        </p:nvSpPr>
+        <p:spPr>
+          <a:xfrm>
+            <a:off x="6166587" y="2394456"/>
+            <a:ext cx="1224136" cy="461665"/>
+          </a:xfrm>
+          <a:prstGeom prst="rect">
+            <a:avLst/>
+          </a:prstGeom>
+          <a:noFill/>
+          <a:ln>
+            <a:noFill/>
+          </a:ln>
+        </p:spPr>
+        <p:txBody>
+          <a:bodyPr wrap="square" rtlCol="0">
+            <a:spAutoFit/>
+          </a:bodyPr>
+          <a:lstStyle/>
+          <a:p>
+            <a:pPr algn="l"/>
+            <a:r>
+              <a:rPr lang="en-GB" sz="1200" smtClean="0"/>
+              <a:t>Transmission losses added</a:t>
+            </a:r>
+          </a:p>
+        </p:txBody>
+      </p:sp>
+      <p:sp>
+        <p:nvSpPr>
+          <p:cNvPr id="12" name="Pfeil nach unten 11"/>
+          <p:cNvSpPr/>
+          <p:nvPr/>
+        </p:nvSpPr>
+        <p:spPr bwMode="auto">
+          <a:xfrm rot="5400000">
+            <a:off x="6560464" y="-37746"/>
+            <a:ext cx="195732" cy="4583889"/>
+          </a:xfrm>
+          <a:prstGeom prst="downArrow">
+            <a:avLst/>
+          </a:prstGeom>
+          <a:solidFill>
+            <a:srgbClr val="990000"/>
+          </a:solidFill>
+          <a:ln w="19050" cap="flat" cmpd="sng" algn="ctr">
+            <a:solidFill>
+              <a:schemeClr val="tx1"/>
+            </a:solidFill>
+            <a:prstDash val="solid"/>
+            <a:round/>
+            <a:headEnd type="none" w="med" len="med"/>
+            <a:tailEnd type="triangle" w="med" len="med"/>
+          </a:ln>
+          <a:effectLst/>
+          <a:extLst/>
+        </p:spPr>
+        <p:txBody>
+          <a:bodyPr vert="horz" wrap="square" lIns="91440" tIns="45720" rIns="91440" bIns="45720" numCol="1" rtlCol="0" anchor="ctr" anchorCtr="0" compatLnSpc="1">
+            <a:prstTxWarp prst="textNoShape">
+              <a:avLst/>
+            </a:prstTxWarp>
+            <a:noAutofit/>
+          </a:bodyPr>
+          <a:lstStyle/>
+          <a:p>
+            <a:pPr marL="0" marR="0" indent="0" algn="ctr" defTabSz="914400" rtl="0" eaLnBrk="1" fontAlgn="base" latinLnBrk="0" hangingPunct="1">
+              <a:lnSpc>
+                <a:spcPct val="100000"/>
+              </a:lnSpc>
+              <a:spcBef>
+                <a:spcPct val="30000"/>
+              </a:spcBef>
+              <a:spcAft>
+                <a:spcPct val="0"/>
+              </a:spcAft>
+              <a:buClrTx/>
+              <a:buSzTx/>
+              <a:buFontTx/>
+              <a:buNone/>
+              <a:tabLst/>
+            </a:pPr>
+            <a:endParaRPr kumimoji="0" lang="en-GB" sz="2000" b="1" i="0" u="none" strike="noStrike" cap="none" normalizeH="0" baseline="0" smtClean="0">
+              <a:ln>
+                <a:noFill/>
+              </a:ln>
+              <a:solidFill>
+                <a:schemeClr val="tx1"/>
+              </a:solidFill>
+              <a:effectLst/>
+              <a:latin typeface="Arial" pitchFamily="34" charset="0"/>
+            </a:endParaRPr>
+          </a:p>
+        </p:txBody>
+      </p:sp>
+      <p:sp>
+        <p:nvSpPr>
+          <p:cNvPr id="13" name="Textfeld 12"/>
+          <p:cNvSpPr txBox="1"/>
+          <p:nvPr/>
+        </p:nvSpPr>
+        <p:spPr>
+          <a:xfrm>
+            <a:off x="4726426" y="1848009"/>
+            <a:ext cx="4086375" cy="338554"/>
+          </a:xfrm>
+          <a:prstGeom prst="rect">
+            <a:avLst/>
+          </a:prstGeom>
+          <a:noFill/>
+          <a:ln>
+            <a:noFill/>
+          </a:ln>
+        </p:spPr>
+        <p:txBody>
+          <a:bodyPr wrap="none" rtlCol="0">
+            <a:spAutoFit/>
+          </a:bodyPr>
+          <a:lstStyle/>
+          <a:p>
+            <a:pPr algn="l"/>
+            <a:r>
+              <a:rPr lang="en-GB" smtClean="0"/>
+              <a:t>Quasi stationary backwards calculation</a:t>
+            </a:r>
+          </a:p>
+        </p:txBody>
+      </p:sp>
+      <p:sp>
+        <p:nvSpPr>
+          <p:cNvPr id="14" name="Textfeld 13"/>
+          <p:cNvSpPr txBox="1"/>
+          <p:nvPr/>
+        </p:nvSpPr>
+        <p:spPr>
+          <a:xfrm>
+            <a:off x="4226422" y="2582308"/>
+            <a:ext cx="900100" cy="276999"/>
+          </a:xfrm>
+          <a:prstGeom prst="rect">
+            <a:avLst/>
+          </a:prstGeom>
+          <a:noFill/>
+          <a:ln>
+            <a:noFill/>
+          </a:ln>
+        </p:spPr>
+        <p:txBody>
+          <a:bodyPr wrap="square" rtlCol="0">
+            <a:spAutoFit/>
+          </a:bodyPr>
+          <a:lstStyle/>
+          <a:p>
+            <a:pPr algn="l"/>
+            <a:r>
+              <a:rPr lang="en-GB" sz="1200" smtClean="0"/>
+              <a:t>Iteration</a:t>
+            </a:r>
+          </a:p>
+        </p:txBody>
+      </p:sp>
+      <p:sp>
+        <p:nvSpPr>
+          <p:cNvPr id="15" name="Pfeil nach unten 14"/>
+          <p:cNvSpPr/>
+          <p:nvPr/>
+        </p:nvSpPr>
+        <p:spPr bwMode="auto">
+          <a:xfrm rot="16200000">
+            <a:off x="3605927" y="2450702"/>
+            <a:ext cx="288032" cy="1105242"/>
+          </a:xfrm>
+          <a:prstGeom prst="downArrow">
+            <a:avLst/>
+          </a:prstGeom>
+          <a:solidFill>
+            <a:srgbClr val="990000"/>
+          </a:solidFill>
+          <a:ln w="19050" cap="flat" cmpd="sng" algn="ctr">
+            <a:solidFill>
+              <a:schemeClr val="tx1"/>
+            </a:solidFill>
+            <a:prstDash val="solid"/>
+            <a:round/>
+            <a:headEnd type="none" w="med" len="med"/>
+            <a:tailEnd type="triangle" w="med" len="med"/>
+          </a:ln>
+          <a:effectLst/>
+          <a:extLst/>
+        </p:spPr>
+        <p:txBody>
+          <a:bodyPr vert="horz" wrap="square" lIns="91440" tIns="45720" rIns="91440" bIns="45720" numCol="1" rtlCol="0" anchor="ctr" anchorCtr="0" compatLnSpc="1">
+            <a:prstTxWarp prst="textNoShape">
+              <a:avLst/>
+            </a:prstTxWarp>
+            <a:noAutofit/>
+          </a:bodyPr>
+          <a:lstStyle/>
+          <a:p>
+            <a:pPr marL="0" marR="0" indent="0" algn="ctr" defTabSz="914400" rtl="0" eaLnBrk="1" fontAlgn="base" latinLnBrk="0" hangingPunct="1">
+              <a:lnSpc>
+                <a:spcPct val="100000"/>
+              </a:lnSpc>
+              <a:spcBef>
+                <a:spcPct val="30000"/>
+              </a:spcBef>
+              <a:spcAft>
+                <a:spcPct val="0"/>
+              </a:spcAft>
+              <a:buClrTx/>
+              <a:buSzTx/>
+              <a:buFontTx/>
+              <a:buNone/>
+              <a:tabLst/>
+            </a:pPr>
+            <a:endParaRPr kumimoji="0" lang="en-GB" sz="2000" b="1" i="0" u="none" strike="noStrike" cap="none" normalizeH="0" baseline="0" smtClean="0">
+              <a:ln>
+                <a:noFill/>
+              </a:ln>
+              <a:solidFill>
+                <a:schemeClr val="tx1"/>
+              </a:solidFill>
+              <a:effectLst/>
+              <a:latin typeface="Arial" pitchFamily="34" charset="0"/>
+            </a:endParaRPr>
+          </a:p>
+        </p:txBody>
+      </p:sp>
+      <p:sp>
+        <p:nvSpPr>
+          <p:cNvPr id="16" name="Textfeld 15"/>
+          <p:cNvSpPr txBox="1"/>
+          <p:nvPr/>
+        </p:nvSpPr>
+        <p:spPr>
+          <a:xfrm>
+            <a:off x="5220640" y="4441089"/>
+            <a:ext cx="1459898" cy="261610"/>
+          </a:xfrm>
+          <a:prstGeom prst="rect">
+            <a:avLst/>
+          </a:prstGeom>
+          <a:noFill/>
+          <a:ln>
+            <a:noFill/>
+          </a:ln>
+        </p:spPr>
+        <p:txBody>
+          <a:bodyPr wrap="square" rtlCol="0">
+            <a:spAutoFit/>
+          </a:bodyPr>
+          <a:lstStyle/>
+          <a:p>
+            <a:pPr algn="l"/>
+            <a:r>
+              <a:rPr lang="en-GB" sz="1100" b="0"/>
+              <a:t>Torque </a:t>
+            </a:r>
+            <a:r>
+              <a:rPr lang="en-GB" sz="1100" b="0" smtClean="0"/>
+              <a:t>converter</a:t>
+            </a:r>
+          </a:p>
+        </p:txBody>
+      </p:sp>
+      <p:sp>
+        <p:nvSpPr>
+          <p:cNvPr id="17" name="Textfeld 16"/>
+          <p:cNvSpPr txBox="1"/>
+          <p:nvPr/>
+        </p:nvSpPr>
+        <p:spPr>
+          <a:xfrm>
+            <a:off x="7010944" y="4441089"/>
+            <a:ext cx="1027850" cy="261610"/>
+          </a:xfrm>
+          <a:prstGeom prst="rect">
+            <a:avLst/>
+          </a:prstGeom>
+          <a:noFill/>
+          <a:ln>
+            <a:noFill/>
+          </a:ln>
+        </p:spPr>
+        <p:txBody>
+          <a:bodyPr wrap="square" rtlCol="0">
+            <a:spAutoFit/>
+          </a:bodyPr>
+          <a:lstStyle/>
+          <a:p>
+            <a:pPr algn="l"/>
+            <a:r>
+              <a:rPr lang="en-GB" sz="1100" b="0" smtClean="0"/>
+              <a:t>Transmission</a:t>
+            </a:r>
+          </a:p>
+        </p:txBody>
+      </p:sp>
+      <p:sp>
+        <p:nvSpPr>
+          <p:cNvPr id="18" name="Rechteck 17"/>
+          <p:cNvSpPr/>
+          <p:nvPr/>
+        </p:nvSpPr>
+        <p:spPr bwMode="auto">
+          <a:xfrm>
+            <a:off x="192188" y="2211868"/>
+            <a:ext cx="2843642" cy="2444453"/>
+          </a:xfrm>
+          <a:prstGeom prst="rect">
+            <a:avLst/>
+          </a:prstGeom>
+          <a:noFill/>
+          <a:ln w="19050" cap="flat" cmpd="sng" algn="ctr">
+            <a:solidFill>
+              <a:schemeClr val="tx1"/>
+            </a:solidFill>
+            <a:prstDash val="solid"/>
+            <a:round/>
+            <a:headEnd type="none" w="med" len="med"/>
+            <a:tailEnd type="triangle" w="med" len="med"/>
+          </a:ln>
+          <a:effectLst/>
+          <a:extLst/>
+        </p:spPr>
+        <p:txBody>
+          <a:bodyPr vert="horz" wrap="square" lIns="91440" tIns="45720" rIns="91440" bIns="45720" numCol="1" rtlCol="0" anchor="ctr" anchorCtr="0" compatLnSpc="1">
+            <a:prstTxWarp prst="textNoShape">
+              <a:avLst/>
+            </a:prstTxWarp>
+            <a:spAutoFit/>
+          </a:bodyPr>
+          <a:lstStyle/>
+          <a:p>
+            <a:pPr marL="0" marR="0" indent="0" algn="ctr" defTabSz="914400" rtl="0" eaLnBrk="1" fontAlgn="base" latinLnBrk="0" hangingPunct="1">
+              <a:lnSpc>
+                <a:spcPct val="100000"/>
+              </a:lnSpc>
+              <a:spcBef>
+                <a:spcPct val="30000"/>
+              </a:spcBef>
+              <a:spcAft>
+                <a:spcPct val="0"/>
+              </a:spcAft>
+              <a:buClrTx/>
+              <a:buSzTx/>
+              <a:buFontTx/>
+              <a:buNone/>
+              <a:tabLst/>
+            </a:pPr>
+            <a:endParaRPr kumimoji="0" lang="en-GB" sz="2000" b="1" i="0" u="none" strike="noStrike" cap="none" normalizeH="0" baseline="0" smtClean="0">
+              <a:ln>
+                <a:noFill/>
+              </a:ln>
+              <a:solidFill>
+                <a:schemeClr val="tx1"/>
+              </a:solidFill>
+              <a:effectLst/>
+              <a:latin typeface="Arial" pitchFamily="34" charset="0"/>
+            </a:endParaRPr>
+          </a:p>
+        </p:txBody>
+      </p:sp>
+      <p:sp>
+        <p:nvSpPr>
+          <p:cNvPr id="19" name="Textfeld 18"/>
+          <p:cNvSpPr txBox="1"/>
+          <p:nvPr/>
+        </p:nvSpPr>
+        <p:spPr>
+          <a:xfrm>
+            <a:off x="192188" y="1968816"/>
+            <a:ext cx="3295290" cy="261610"/>
+          </a:xfrm>
+          <a:prstGeom prst="rect">
+            <a:avLst/>
+          </a:prstGeom>
+          <a:noFill/>
+          <a:ln>
+            <a:noFill/>
+          </a:ln>
+        </p:spPr>
+        <p:txBody>
+          <a:bodyPr wrap="square" rtlCol="0">
+            <a:spAutoFit/>
+          </a:bodyPr>
+          <a:lstStyle/>
+          <a:p>
+            <a:pPr algn="l"/>
+            <a:r>
+              <a:rPr lang="en-GB" sz="1100" b="0"/>
+              <a:t>Torque converter </a:t>
+            </a:r>
+            <a:r>
+              <a:rPr lang="en-GB" sz="1100" b="0" smtClean="0"/>
+              <a:t>characteristic (.vtcc file)</a:t>
+            </a:r>
+          </a:p>
+        </p:txBody>
+      </p:sp>
+      <p:pic>
+        <p:nvPicPr>
+          <p:cNvPr id="20" name="Picture 2"/>
+          <p:cNvPicPr>
+            <a:picLocks noChangeAspect="1" noChangeArrowheads="1"/>
+          </p:cNvPicPr>
+          <p:nvPr/>
+        </p:nvPicPr>
+        <p:blipFill rotWithShape="1">
+          <a:blip r:embed="rId5" cstate="print">
+            <a:extLst>
+              <a:ext uri="{28A0092B-C50C-407E-A947-70E740481C1C}">
+                <a14:useLocalDpi xmlns:a14="http://schemas.microsoft.com/office/drawing/2010/main" val="0"/>
+              </a:ext>
+            </a:extLst>
+          </a:blip>
+          <a:srcRect l="35067" r="35174"/>
+          <a:stretch/>
+        </p:blipFill>
+        <p:spPr bwMode="auto">
+          <a:xfrm>
+            <a:off x="1654322" y="548680"/>
+            <a:ext cx="2279001" cy="549269"/>
+          </a:xfrm>
+          <a:prstGeom prst="rect">
+            <a:avLst/>
+          </a:prstGeom>
+          <a:noFill/>
+          <a:ln>
+            <a:noFill/>
+          </a:ln>
+          <a:effectLst/>
+          <a:extLst>
+            <a:ext uri="{909E8E84-426E-40DD-AFC4-6F175D3DCCD1}">
+              <a14:hiddenFill xmlns:a14="http://schemas.microsoft.com/office/drawing/2010/main">
+                <a:solidFill>
+                  <a:schemeClr val="accent1"/>
+                </a:solidFill>
+              </a14:hiddenFill>
+            </a:ext>
+            <a:ext uri="{91240B29-F687-4F45-9708-019B960494DF}">
+              <a14:hiddenLine xmlns:a14="http://schemas.microsoft.com/office/drawing/2010/main" w="9525">
+                <a:solidFill>
+                  <a:schemeClr val="tx1"/>
+                </a:solidFill>
+                <a:miter lim="800000"/>
+                <a:headEnd/>
+                <a:tailEnd/>
+              </a14:hiddenLine>
+            </a:ext>
+            <a:ext uri="{AF507438-7753-43E0-B8FC-AC1667EBCBE1}">
+              <a14:hiddenEffects xmlns:a14="http://schemas.microsoft.com/office/drawing/2010/main">
+                <a:effectLst>
+                  <a:outerShdw dist="35921" dir="2700000" algn="ctr" rotWithShape="0">
+                    <a:schemeClr val="bg2"/>
+                  </a:outerShdw>
+                </a:effectLst>
+              </a14:hiddenEffects>
+            </a:ext>
+          </a:extLst>
+        </p:spPr>
+      </p:pic>
+    </p:spTree>
+    <p:extLst>
+      <p:ext uri="{BB962C8B-B14F-4D97-AF65-F5344CB8AC3E}">
+        <p14:creationId xmlns:p14="http://schemas.microsoft.com/office/powerpoint/2010/main" val="4265253464"/>
+      </p:ext>
+    </p:extLst>
+  </p:cSld>
+  <p:clrMapOvr>
+    <a:masterClrMapping/>
+  </p:clrMapOvr>
+</p:sld>
+</file>
+
+<file path=ppt/slides/slide15.xml><?xml version="1.0" encoding="utf-8"?>
+<p:sld xmlns:a="http://schemas.openxmlformats.org/drawingml/2006/main" xmlns:r="http://schemas.openxmlformats.org/officeDocument/2006/relationships" xmlns:p="http://schemas.openxmlformats.org/presentationml/2006/main">
+  <p:cSld>
+    <p:spTree>
+      <p:nvGrpSpPr>
+        <p:cNvPr id="1" name=""/>
+        <p:cNvGrpSpPr/>
+        <p:nvPr/>
+      </p:nvGrpSpPr>
+      <p:grpSpPr>
+        <a:xfrm>
+          <a:off x="0" y="0"/>
+          <a:ext cx="0" cy="0"/>
+          <a:chOff x="0" y="0"/>
+          <a:chExt cx="0" cy="0"/>
+        </a:xfrm>
+      </p:grpSpPr>
+      <p:pic>
+        <p:nvPicPr>
+          <p:cNvPr id="4" name="Picture 6"/>
+          <p:cNvPicPr>
+            <a:picLocks noChangeAspect="1" noChangeArrowheads="1"/>
+          </p:cNvPicPr>
+          <p:nvPr/>
+        </p:nvPicPr>
+        <p:blipFill>
+          <a:blip r:embed="rId2">
+            <a:extLst>
+              <a:ext uri="{28A0092B-C50C-407E-A947-70E740481C1C}">
+                <a14:useLocalDpi xmlns:a14="http://schemas.microsoft.com/office/drawing/2010/main" val="0"/>
+              </a:ext>
+            </a:extLst>
+          </a:blip>
+          <a:srcRect/>
+          <a:stretch>
+            <a:fillRect/>
+          </a:stretch>
+        </p:blipFill>
+        <p:spPr bwMode="auto">
+          <a:xfrm>
+            <a:off x="225936" y="2047890"/>
+            <a:ext cx="3524250" cy="3819525"/>
+          </a:xfrm>
+          <a:prstGeom prst="rect">
+            <a:avLst/>
+          </a:prstGeom>
+          <a:noFill/>
+          <a:ln>
+            <a:noFill/>
+          </a:ln>
+          <a:effectLst/>
+          <a:extLst>
+            <a:ext uri="{909E8E84-426E-40DD-AFC4-6F175D3DCCD1}">
+              <a14:hiddenFill xmlns:a14="http://schemas.microsoft.com/office/drawing/2010/main">
+                <a:solidFill>
+                  <a:schemeClr val="accent1"/>
+                </a:solidFill>
+              </a14:hiddenFill>
+            </a:ext>
+            <a:ext uri="{91240B29-F687-4F45-9708-019B960494DF}">
+              <a14:hiddenLine xmlns:a14="http://schemas.microsoft.com/office/drawing/2010/main" w="9525">
+                <a:solidFill>
+                  <a:schemeClr val="tx1"/>
+                </a:solidFill>
+                <a:miter lim="800000"/>
+                <a:headEnd/>
+                <a:tailEnd/>
+              </a14:hiddenLine>
+            </a:ext>
+            <a:ext uri="{AF507438-7753-43E0-B8FC-AC1667EBCBE1}">
+              <a14:hiddenEffects xmlns:a14="http://schemas.microsoft.com/office/drawing/2010/main">
+                <a:effectLst>
+                  <a:outerShdw dist="35921" dir="2700000" algn="ctr" rotWithShape="0">
+                    <a:schemeClr val="bg2"/>
+                  </a:outerShdw>
+                </a:effectLst>
+              </a14:hiddenEffects>
+            </a:ext>
+          </a:extLst>
+        </p:spPr>
+      </p:pic>
+      <p:pic>
+        <p:nvPicPr>
+          <p:cNvPr id="5" name="Picture 5"/>
+          <p:cNvPicPr>
+            <a:picLocks noChangeAspect="1" noChangeArrowheads="1"/>
+          </p:cNvPicPr>
+          <p:nvPr/>
+        </p:nvPicPr>
+        <p:blipFill>
+          <a:blip r:embed="rId3">
+            <a:extLst>
+              <a:ext uri="{28A0092B-C50C-407E-A947-70E740481C1C}">
+                <a14:useLocalDpi xmlns:a14="http://schemas.microsoft.com/office/drawing/2010/main" val="0"/>
+              </a:ext>
+            </a:extLst>
+          </a:blip>
+          <a:srcRect/>
+          <a:stretch>
+            <a:fillRect/>
+          </a:stretch>
+        </p:blipFill>
+        <p:spPr bwMode="auto">
+          <a:xfrm>
+            <a:off x="5724128" y="1997848"/>
+            <a:ext cx="3200400" cy="3438525"/>
+          </a:xfrm>
+          <a:prstGeom prst="rect">
+            <a:avLst/>
+          </a:prstGeom>
+          <a:noFill/>
+          <a:ln>
+            <a:noFill/>
+          </a:ln>
+          <a:effectLst/>
+          <a:extLst>
+            <a:ext uri="{909E8E84-426E-40DD-AFC4-6F175D3DCCD1}">
+              <a14:hiddenFill xmlns:a14="http://schemas.microsoft.com/office/drawing/2010/main">
+                <a:solidFill>
+                  <a:schemeClr val="accent1"/>
+                </a:solidFill>
+              </a14:hiddenFill>
+            </a:ext>
+            <a:ext uri="{91240B29-F687-4F45-9708-019B960494DF}">
+              <a14:hiddenLine xmlns:a14="http://schemas.microsoft.com/office/drawing/2010/main" w="9525">
+                <a:solidFill>
+                  <a:schemeClr val="tx1"/>
+                </a:solidFill>
+                <a:miter lim="800000"/>
+                <a:headEnd/>
+                <a:tailEnd/>
+              </a14:hiddenLine>
+            </a:ext>
+            <a:ext uri="{AF507438-7753-43E0-B8FC-AC1667EBCBE1}">
+              <a14:hiddenEffects xmlns:a14="http://schemas.microsoft.com/office/drawing/2010/main">
+                <a:effectLst>
+                  <a:outerShdw dist="35921" dir="2700000" algn="ctr" rotWithShape="0">
+                    <a:schemeClr val="bg2"/>
+                  </a:outerShdw>
+                </a:effectLst>
+              </a14:hiddenEffects>
+            </a:ext>
+          </a:extLst>
+        </p:spPr>
+      </p:pic>
+      <p:sp>
+        <p:nvSpPr>
+          <p:cNvPr id="6" name="Textfeld 5"/>
+          <p:cNvSpPr txBox="1"/>
+          <p:nvPr/>
+        </p:nvSpPr>
+        <p:spPr>
+          <a:xfrm>
+            <a:off x="323528" y="1691516"/>
+            <a:ext cx="1010982" cy="369332"/>
+          </a:xfrm>
+          <a:prstGeom prst="rect">
+            <a:avLst/>
+          </a:prstGeom>
+          <a:noFill/>
+        </p:spPr>
+        <p:txBody>
+          <a:bodyPr wrap="none" rtlCol="0">
+            <a:spAutoFit/>
+          </a:bodyPr>
+          <a:lstStyle/>
+          <a:p>
+            <a:r>
+              <a:rPr lang="en-GB" smtClean="0"/>
+              <a:t>.vaux file</a:t>
+            </a:r>
+            <a:endParaRPr lang="en-GB"/>
+          </a:p>
+        </p:txBody>
+      </p:sp>
+      <p:cxnSp>
+        <p:nvCxnSpPr>
+          <p:cNvPr id="7" name="Gerade Verbindung mit Pfeil 6"/>
+          <p:cNvCxnSpPr>
+            <a:endCxn id="8" idx="1"/>
+          </p:cNvCxnSpPr>
+          <p:nvPr/>
+        </p:nvCxnSpPr>
+        <p:spPr>
+          <a:xfrm flipV="1">
+            <a:off x="1528571" y="2533957"/>
+            <a:ext cx="2348433" cy="3804"/>
+          </a:xfrm>
+          <a:prstGeom prst="straightConnector1">
+            <a:avLst/>
+          </a:prstGeom>
+          <a:ln w="28575">
+            <a:solidFill>
+              <a:srgbClr val="00B050"/>
+            </a:solidFill>
+            <a:tailEnd type="arrow"/>
+          </a:ln>
+        </p:spPr>
+        <p:style>
+          <a:lnRef idx="1">
+            <a:schemeClr val="accent2"/>
+          </a:lnRef>
+          <a:fillRef idx="0">
+            <a:schemeClr val="accent2"/>
+          </a:fillRef>
+          <a:effectRef idx="0">
+            <a:schemeClr val="accent2"/>
+          </a:effectRef>
+          <a:fontRef idx="minor">
+            <a:schemeClr val="tx1"/>
+          </a:fontRef>
+        </p:style>
+      </p:cxnSp>
+      <p:sp>
+        <p:nvSpPr>
+          <p:cNvPr id="8" name="Textfeld 7"/>
+          <p:cNvSpPr txBox="1"/>
+          <p:nvPr/>
+        </p:nvSpPr>
+        <p:spPr>
+          <a:xfrm>
+            <a:off x="3877004" y="2395457"/>
+            <a:ext cx="839012" cy="276999"/>
+          </a:xfrm>
+          <a:prstGeom prst="rect">
+            <a:avLst/>
+          </a:prstGeom>
+          <a:noFill/>
+        </p:spPr>
+        <p:txBody>
+          <a:bodyPr wrap="none" rtlCol="0">
+            <a:spAutoFit/>
+          </a:bodyPr>
+          <a:lstStyle/>
+          <a:p>
+            <a:r>
+              <a:rPr lang="en-GB" sz="1200" smtClean="0">
+                <a:solidFill>
+                  <a:srgbClr val="00B050"/>
+                </a:solidFill>
+              </a:rPr>
+              <a:t>TransRatio</a:t>
+            </a:r>
+            <a:endParaRPr lang="en-GB">
+              <a:solidFill>
+                <a:srgbClr val="00B050"/>
+              </a:solidFill>
+            </a:endParaRPr>
+          </a:p>
+        </p:txBody>
+      </p:sp>
+      <p:cxnSp>
+        <p:nvCxnSpPr>
+          <p:cNvPr id="9" name="Gerade Verbindung mit Pfeil 8"/>
+          <p:cNvCxnSpPr>
+            <a:endCxn id="10" idx="1"/>
+          </p:cNvCxnSpPr>
+          <p:nvPr/>
+        </p:nvCxnSpPr>
+        <p:spPr>
+          <a:xfrm flipV="1">
+            <a:off x="1515661" y="2897801"/>
+            <a:ext cx="2361343" cy="2"/>
+          </a:xfrm>
+          <a:prstGeom prst="straightConnector1">
+            <a:avLst/>
+          </a:prstGeom>
+          <a:ln w="28575">
+            <a:solidFill>
+              <a:schemeClr val="accent6">
+                <a:lumMod val="75000"/>
+              </a:schemeClr>
+            </a:solidFill>
+            <a:tailEnd type="arrow"/>
+          </a:ln>
+        </p:spPr>
+        <p:style>
+          <a:lnRef idx="1">
+            <a:schemeClr val="accent2"/>
+          </a:lnRef>
+          <a:fillRef idx="0">
+            <a:schemeClr val="accent2"/>
+          </a:fillRef>
+          <a:effectRef idx="0">
+            <a:schemeClr val="accent2"/>
+          </a:effectRef>
+          <a:fontRef idx="minor">
+            <a:schemeClr val="tx1"/>
+          </a:fontRef>
+        </p:style>
+      </p:cxnSp>
+      <p:sp>
+        <p:nvSpPr>
+          <p:cNvPr id="10" name="Textfeld 9"/>
+          <p:cNvSpPr txBox="1"/>
+          <p:nvPr/>
+        </p:nvSpPr>
+        <p:spPr>
+          <a:xfrm>
+            <a:off x="3877004" y="2759301"/>
+            <a:ext cx="717761" cy="276999"/>
+          </a:xfrm>
+          <a:prstGeom prst="rect">
+            <a:avLst/>
+          </a:prstGeom>
+          <a:noFill/>
+        </p:spPr>
+        <p:txBody>
+          <a:bodyPr wrap="none" rtlCol="0">
+            <a:spAutoFit/>
+          </a:bodyPr>
+          <a:lstStyle/>
+          <a:p>
+            <a:r>
+              <a:rPr lang="en-GB" sz="1200" smtClean="0">
+                <a:solidFill>
+                  <a:schemeClr val="accent6">
+                    <a:lumMod val="75000"/>
+                  </a:schemeClr>
+                </a:solidFill>
+              </a:rPr>
+              <a:t>EffToEng</a:t>
+            </a:r>
+            <a:endParaRPr lang="en-GB">
+              <a:solidFill>
+                <a:schemeClr val="accent6">
+                  <a:lumMod val="75000"/>
+                </a:schemeClr>
+              </a:solidFill>
+            </a:endParaRPr>
+          </a:p>
+        </p:txBody>
+      </p:sp>
+      <p:cxnSp>
+        <p:nvCxnSpPr>
+          <p:cNvPr id="11" name="Gerade Verbindung mit Pfeil 10"/>
+          <p:cNvCxnSpPr>
+            <a:endCxn id="12" idx="1"/>
+          </p:cNvCxnSpPr>
+          <p:nvPr/>
+        </p:nvCxnSpPr>
+        <p:spPr>
+          <a:xfrm>
+            <a:off x="1515660" y="3329849"/>
+            <a:ext cx="2361343" cy="0"/>
+          </a:xfrm>
+          <a:prstGeom prst="straightConnector1">
+            <a:avLst/>
+          </a:prstGeom>
+          <a:ln w="28575">
+            <a:solidFill>
+              <a:srgbClr val="7030A0"/>
+            </a:solidFill>
+            <a:tailEnd type="arrow"/>
+          </a:ln>
+        </p:spPr>
+        <p:style>
+          <a:lnRef idx="1">
+            <a:schemeClr val="accent2"/>
+          </a:lnRef>
+          <a:fillRef idx="0">
+            <a:schemeClr val="accent2"/>
+          </a:fillRef>
+          <a:effectRef idx="0">
+            <a:schemeClr val="accent2"/>
+          </a:effectRef>
+          <a:fontRef idx="minor">
+            <a:schemeClr val="tx1"/>
+          </a:fontRef>
+        </p:style>
+      </p:cxnSp>
+      <p:sp>
+        <p:nvSpPr>
+          <p:cNvPr id="12" name="Textfeld 11"/>
+          <p:cNvSpPr txBox="1"/>
+          <p:nvPr/>
+        </p:nvSpPr>
+        <p:spPr>
+          <a:xfrm>
+            <a:off x="3877003" y="3191349"/>
+            <a:ext cx="745012" cy="276999"/>
+          </a:xfrm>
+          <a:prstGeom prst="rect">
+            <a:avLst/>
+          </a:prstGeom>
+          <a:noFill/>
+        </p:spPr>
+        <p:txBody>
+          <a:bodyPr wrap="none" rtlCol="0">
+            <a:spAutoFit/>
+          </a:bodyPr>
+          <a:lstStyle/>
+          <a:p>
+            <a:r>
+              <a:rPr lang="en-GB" sz="1200" smtClean="0">
+                <a:solidFill>
+                  <a:srgbClr val="7030A0"/>
+                </a:solidFill>
+              </a:rPr>
+              <a:t>EffToSply</a:t>
+            </a:r>
+            <a:endParaRPr lang="en-GB">
+              <a:solidFill>
+                <a:srgbClr val="7030A0"/>
+              </a:solidFill>
+            </a:endParaRPr>
+          </a:p>
+        </p:txBody>
+      </p:sp>
+      <p:sp>
+        <p:nvSpPr>
+          <p:cNvPr id="13" name="Rechteck 12"/>
+          <p:cNvSpPr/>
+          <p:nvPr/>
+        </p:nvSpPr>
+        <p:spPr>
+          <a:xfrm>
+            <a:off x="225936" y="3761897"/>
+            <a:ext cx="3524250" cy="2115375"/>
+          </a:xfrm>
+          <a:prstGeom prst="rect">
+            <a:avLst/>
+          </a:prstGeom>
+          <a:noFill/>
+          <a:ln>
+            <a:solidFill>
+              <a:srgbClr val="FF0000"/>
+            </a:solidFill>
+          </a:ln>
+        </p:spPr>
+        <p:style>
+          <a:lnRef idx="2">
+            <a:schemeClr val="accent1">
+              <a:shade val="50000"/>
+            </a:schemeClr>
+          </a:lnRef>
+          <a:fillRef idx="1">
+            <a:schemeClr val="accent1"/>
+          </a:fillRef>
+          <a:effectRef idx="0">
+            <a:schemeClr val="accent1"/>
+          </a:effectRef>
+          <a:fontRef idx="minor">
+            <a:schemeClr val="lt1"/>
+          </a:fontRef>
+        </p:style>
+        <p:txBody>
+          <a:bodyPr rtlCol="0" anchor="ctr"/>
+          <a:lstStyle/>
+          <a:p>
+            <a:pPr algn="ctr"/>
+            <a:endParaRPr lang="en-GB"/>
+          </a:p>
+        </p:txBody>
+      </p:sp>
+      <p:cxnSp>
+        <p:nvCxnSpPr>
+          <p:cNvPr id="14" name="Gerade Verbindung mit Pfeil 13"/>
+          <p:cNvCxnSpPr/>
+          <p:nvPr/>
+        </p:nvCxnSpPr>
+        <p:spPr>
+          <a:xfrm>
+            <a:off x="3851920" y="4548469"/>
+            <a:ext cx="466507" cy="0"/>
+          </a:xfrm>
+          <a:prstGeom prst="straightConnector1">
+            <a:avLst/>
+          </a:prstGeom>
+          <a:ln w="28575">
+            <a:solidFill>
+              <a:srgbClr val="FF0000"/>
+            </a:solidFill>
+            <a:tailEnd type="arrow"/>
+          </a:ln>
+        </p:spPr>
+        <p:style>
+          <a:lnRef idx="1">
+            <a:schemeClr val="accent2"/>
+          </a:lnRef>
+          <a:fillRef idx="0">
+            <a:schemeClr val="accent2"/>
+          </a:fillRef>
+          <a:effectRef idx="0">
+            <a:schemeClr val="accent2"/>
+          </a:effectRef>
+          <a:fontRef idx="minor">
+            <a:schemeClr val="tx1"/>
+          </a:fontRef>
+        </p:style>
+      </p:cxnSp>
+      <p:sp>
+        <p:nvSpPr>
+          <p:cNvPr id="15" name="Textfeld 14"/>
+          <p:cNvSpPr txBox="1"/>
+          <p:nvPr/>
+        </p:nvSpPr>
+        <p:spPr>
+          <a:xfrm>
+            <a:off x="4318427" y="4409969"/>
+            <a:ext cx="1092094" cy="276999"/>
+          </a:xfrm>
+          <a:prstGeom prst="rect">
+            <a:avLst/>
+          </a:prstGeom>
+          <a:noFill/>
+        </p:spPr>
+        <p:txBody>
+          <a:bodyPr wrap="none" rtlCol="0">
+            <a:spAutoFit/>
+          </a:bodyPr>
+          <a:lstStyle/>
+          <a:p>
+            <a:r>
+              <a:rPr lang="en-GB" sz="1200" b="1" smtClean="0">
+                <a:solidFill>
+                  <a:srgbClr val="FF0000"/>
+                </a:solidFill>
+              </a:rPr>
+              <a:t>AuxMap(</a:t>
+            </a:r>
+            <a:r>
+              <a:rPr lang="en-GB" sz="1200" smtClean="0">
+                <a:solidFill>
+                  <a:srgbClr val="FF0000"/>
+                </a:solidFill>
+              </a:rPr>
+              <a:t>n,Pe</a:t>
+            </a:r>
+            <a:r>
+              <a:rPr lang="en-GB" sz="1200" b="1" smtClean="0">
+                <a:solidFill>
+                  <a:srgbClr val="FF0000"/>
+                </a:solidFill>
+              </a:rPr>
+              <a:t>)</a:t>
+            </a:r>
+            <a:endParaRPr lang="en-GB" b="1">
+              <a:solidFill>
+                <a:srgbClr val="FF0000"/>
+              </a:solidFill>
+            </a:endParaRPr>
+          </a:p>
+        </p:txBody>
+      </p:sp>
+      <p:sp>
+        <p:nvSpPr>
+          <p:cNvPr id="16" name="Textfeld 15"/>
+          <p:cNvSpPr txBox="1"/>
+          <p:nvPr/>
+        </p:nvSpPr>
+        <p:spPr>
+          <a:xfrm>
+            <a:off x="5724128" y="1611512"/>
+            <a:ext cx="935192" cy="369332"/>
+          </a:xfrm>
+          <a:prstGeom prst="rect">
+            <a:avLst/>
+          </a:prstGeom>
+          <a:noFill/>
+        </p:spPr>
+        <p:txBody>
+          <a:bodyPr wrap="none" rtlCol="0">
+            <a:spAutoFit/>
+          </a:bodyPr>
+          <a:lstStyle/>
+          <a:p>
+            <a:r>
+              <a:rPr lang="en-GB" smtClean="0"/>
+              <a:t>.vdri file</a:t>
+            </a:r>
+            <a:endParaRPr lang="en-GB"/>
+          </a:p>
+        </p:txBody>
+      </p:sp>
+      <p:cxnSp>
+        <p:nvCxnSpPr>
+          <p:cNvPr id="17" name="Gerade Verbindung mit Pfeil 16"/>
+          <p:cNvCxnSpPr/>
+          <p:nvPr/>
+        </p:nvCxnSpPr>
+        <p:spPr>
+          <a:xfrm>
+            <a:off x="8604448" y="5358182"/>
+            <a:ext cx="0" cy="504056"/>
+          </a:xfrm>
+          <a:prstGeom prst="straightConnector1">
+            <a:avLst/>
+          </a:prstGeom>
+          <a:ln w="28575">
+            <a:solidFill>
+              <a:schemeClr val="tx2"/>
+            </a:solidFill>
+            <a:tailEnd type="arrow"/>
+          </a:ln>
+        </p:spPr>
+        <p:style>
+          <a:lnRef idx="1">
+            <a:schemeClr val="accent2"/>
+          </a:lnRef>
+          <a:fillRef idx="0">
+            <a:schemeClr val="accent2"/>
+          </a:fillRef>
+          <a:effectRef idx="0">
+            <a:schemeClr val="accent2"/>
+          </a:effectRef>
+          <a:fontRef idx="minor">
+            <a:schemeClr val="tx1"/>
+          </a:fontRef>
+        </p:style>
+      </p:cxnSp>
+      <p:sp>
+        <p:nvSpPr>
+          <p:cNvPr id="18" name="Textfeld 17"/>
+          <p:cNvSpPr txBox="1"/>
+          <p:nvPr/>
+        </p:nvSpPr>
+        <p:spPr>
+          <a:xfrm>
+            <a:off x="8316416" y="5888305"/>
+            <a:ext cx="667940" cy="276999"/>
+          </a:xfrm>
+          <a:prstGeom prst="rect">
+            <a:avLst/>
+          </a:prstGeom>
+          <a:noFill/>
+        </p:spPr>
+        <p:txBody>
+          <a:bodyPr wrap="none" rtlCol="0">
+            <a:spAutoFit/>
+          </a:bodyPr>
+          <a:lstStyle/>
+          <a:p>
+            <a:r>
+              <a:rPr lang="en-GB" sz="1200" smtClean="0">
+                <a:solidFill>
+                  <a:schemeClr val="tx2"/>
+                </a:solidFill>
+              </a:rPr>
+              <a:t>Psupply</a:t>
+            </a:r>
+            <a:endParaRPr lang="en-GB">
+              <a:solidFill>
+                <a:schemeClr val="tx2"/>
+              </a:solidFill>
+            </a:endParaRPr>
+          </a:p>
+        </p:txBody>
+      </p:sp>
+    </p:spTree>
+    <p:extLst>
+      <p:ext uri="{BB962C8B-B14F-4D97-AF65-F5344CB8AC3E}">
+        <p14:creationId xmlns:p14="http://schemas.microsoft.com/office/powerpoint/2010/main" val="333213530"/>
+      </p:ext>
+    </p:extLst>
+  </p:cSld>
+  <p:clrMapOvr>
+    <a:masterClrMapping/>
+  </p:clrMapOvr>
+  <p:timing>
+    <p:tnLst>
+      <p:par>
+        <p:cTn id="1" dur="indefinite" restart="never" nodeType="tmRoot"/>
+      </p:par>
+    </p:tnLst>
+  </p:timing>
+</p:sld>
+</file>
+
+<file path=ppt/slides/slide16.xml><?xml version="1.0" encoding="utf-8"?>
+<p:sld xmlns:a="http://schemas.openxmlformats.org/drawingml/2006/main" xmlns:r="http://schemas.openxmlformats.org/officeDocument/2006/relationships" xmlns:p="http://schemas.openxmlformats.org/presentationml/2006/main">
+  <p:cSld>
+    <p:spTree>
+      <p:nvGrpSpPr>
+        <p:cNvPr id="1" name=""/>
+        <p:cNvGrpSpPr/>
+        <p:nvPr/>
+      </p:nvGrpSpPr>
+      <p:grpSpPr>
+        <a:xfrm>
+          <a:off x="0" y="0"/>
+          <a:ext cx="0" cy="0"/>
+          <a:chOff x="0" y="0"/>
+          <a:chExt cx="0" cy="0"/>
+        </a:xfrm>
+      </p:grpSpPr>
+      <p:sp>
+        <p:nvSpPr>
+          <p:cNvPr id="19" name="Textfeld 18"/>
+          <p:cNvSpPr txBox="1"/>
+          <p:nvPr/>
+        </p:nvSpPr>
+        <p:spPr>
+          <a:xfrm>
+            <a:off x="901744" y="3779748"/>
+            <a:ext cx="6478568" cy="369332"/>
+          </a:xfrm>
+          <a:prstGeom prst="rect">
+            <a:avLst/>
+          </a:prstGeom>
+          <a:noFill/>
+        </p:spPr>
+        <p:txBody>
+          <a:bodyPr wrap="none" rtlCol="0">
+            <a:spAutoFit/>
+          </a:bodyPr>
+          <a:lstStyle/>
+          <a:p>
+            <a:pPr algn="l"/>
+            <a:r>
+              <a:rPr lang="en-GB" sz="1800" b="1" smtClean="0"/>
+              <a:t>P</a:t>
+            </a:r>
+            <a:r>
+              <a:rPr lang="en-GB" sz="1800" b="1" baseline="-25000" smtClean="0"/>
+              <a:t>AuxDemand</a:t>
+            </a:r>
+            <a:r>
+              <a:rPr lang="en-GB" sz="1800" b="1" smtClean="0"/>
+              <a:t> is directly added to the engine's power demand</a:t>
+            </a:r>
+          </a:p>
+        </p:txBody>
+      </p:sp>
+      <p:sp>
+        <p:nvSpPr>
+          <p:cNvPr id="3" name="Textfeld 2"/>
+          <p:cNvSpPr txBox="1"/>
+          <p:nvPr/>
+        </p:nvSpPr>
+        <p:spPr>
+          <a:xfrm>
+            <a:off x="323528" y="1424267"/>
+            <a:ext cx="2601866" cy="580928"/>
+          </a:xfrm>
+          <a:prstGeom prst="rect">
+            <a:avLst/>
+          </a:prstGeom>
+          <a:noFill/>
+          <a:ln>
+            <a:noFill/>
+          </a:ln>
+        </p:spPr>
+        <p:txBody>
+          <a:bodyPr wrap="none" rtlCol="0">
+            <a:spAutoFit/>
+          </a:bodyPr>
+          <a:lstStyle/>
+          <a:p>
+            <a:pPr algn="l"/>
+            <a:r>
+              <a:rPr lang="en-GB" b="0" smtClean="0"/>
+              <a:t>1) n</a:t>
+            </a:r>
+            <a:r>
+              <a:rPr lang="en-GB" b="0" baseline="-25000" smtClean="0"/>
+              <a:t>Aux </a:t>
+            </a:r>
+            <a:r>
+              <a:rPr lang="en-GB" b="0" smtClean="0"/>
+              <a:t>= n</a:t>
+            </a:r>
+            <a:r>
+              <a:rPr lang="en-GB" b="0" baseline="-25000" smtClean="0"/>
+              <a:t>Eng</a:t>
+            </a:r>
+            <a:r>
+              <a:rPr lang="en-GB" b="0" smtClean="0"/>
+              <a:t> * </a:t>
+            </a:r>
+            <a:r>
+              <a:rPr lang="en-GB" smtClean="0">
+                <a:solidFill>
+                  <a:srgbClr val="00B050"/>
+                </a:solidFill>
+              </a:rPr>
+              <a:t>TransRatio</a:t>
+            </a:r>
+          </a:p>
+          <a:p>
+            <a:pPr algn="l"/>
+            <a:r>
+              <a:rPr lang="en-GB" sz="1050" b="0" smtClean="0"/>
+              <a:t>with</a:t>
+            </a:r>
+            <a:r>
+              <a:rPr lang="en-GB" sz="1050" b="0"/>
+              <a:t>: </a:t>
+            </a:r>
+            <a:r>
+              <a:rPr lang="en-GB" sz="1050" b="0" smtClean="0"/>
+              <a:t>n</a:t>
+            </a:r>
+            <a:r>
+              <a:rPr lang="en-GB" sz="1050" b="0" baseline="-25000" smtClean="0"/>
+              <a:t>Eng</a:t>
+            </a:r>
+            <a:r>
+              <a:rPr lang="en-GB" sz="1050" b="0" smtClean="0"/>
+              <a:t> </a:t>
+            </a:r>
+            <a:r>
+              <a:rPr lang="en-GB" sz="1050" b="0"/>
+              <a:t>= engine </a:t>
+            </a:r>
+            <a:r>
+              <a:rPr lang="en-GB" sz="1050" b="0" smtClean="0"/>
+              <a:t>speed</a:t>
+            </a:r>
+            <a:endParaRPr lang="en-GB" sz="1200" b="0"/>
+          </a:p>
+        </p:txBody>
+      </p:sp>
+      <p:sp>
+        <p:nvSpPr>
+          <p:cNvPr id="22" name="Textfeld 21"/>
+          <p:cNvSpPr txBox="1"/>
+          <p:nvPr/>
+        </p:nvSpPr>
+        <p:spPr>
+          <a:xfrm>
+            <a:off x="323527" y="2132856"/>
+            <a:ext cx="3129318" cy="338554"/>
+          </a:xfrm>
+          <a:prstGeom prst="rect">
+            <a:avLst/>
+          </a:prstGeom>
+          <a:noFill/>
+          <a:ln>
+            <a:noFill/>
+          </a:ln>
+        </p:spPr>
+        <p:txBody>
+          <a:bodyPr wrap="none" rtlCol="0">
+            <a:spAutoFit/>
+          </a:bodyPr>
+          <a:lstStyle/>
+          <a:p>
+            <a:pPr algn="l"/>
+            <a:r>
+              <a:rPr lang="en-GB" b="0" smtClean="0"/>
+              <a:t>2) P</a:t>
+            </a:r>
+            <a:r>
+              <a:rPr lang="en-GB" b="0" baseline="-25000" smtClean="0"/>
+              <a:t>AuxOut </a:t>
+            </a:r>
+            <a:r>
+              <a:rPr lang="en-GB" b="0" smtClean="0"/>
+              <a:t>= </a:t>
+            </a:r>
+            <a:r>
+              <a:rPr lang="en-GB" smtClean="0">
+                <a:solidFill>
+                  <a:schemeClr val="tx2"/>
+                </a:solidFill>
+              </a:rPr>
+              <a:t>Psupply </a:t>
+            </a:r>
+            <a:r>
+              <a:rPr lang="en-GB" smtClean="0"/>
+              <a:t>/ </a:t>
+            </a:r>
+            <a:r>
+              <a:rPr lang="en-GB" smtClean="0">
+                <a:solidFill>
+                  <a:srgbClr val="7030A0"/>
+                </a:solidFill>
+              </a:rPr>
+              <a:t>EffToSply</a:t>
+            </a:r>
+            <a:endParaRPr lang="en-GB" smtClean="0">
+              <a:solidFill>
+                <a:srgbClr val="00B050"/>
+              </a:solidFill>
+            </a:endParaRPr>
+          </a:p>
+        </p:txBody>
+      </p:sp>
+      <p:sp>
+        <p:nvSpPr>
+          <p:cNvPr id="23" name="Textfeld 22"/>
+          <p:cNvSpPr txBox="1"/>
+          <p:nvPr/>
+        </p:nvSpPr>
+        <p:spPr>
+          <a:xfrm>
+            <a:off x="332404" y="2661080"/>
+            <a:ext cx="3087640" cy="338554"/>
+          </a:xfrm>
+          <a:prstGeom prst="rect">
+            <a:avLst/>
+          </a:prstGeom>
+          <a:noFill/>
+          <a:ln>
+            <a:noFill/>
+          </a:ln>
+        </p:spPr>
+        <p:txBody>
+          <a:bodyPr wrap="none" rtlCol="0">
+            <a:spAutoFit/>
+          </a:bodyPr>
+          <a:lstStyle/>
+          <a:p>
+            <a:pPr algn="l"/>
+            <a:r>
+              <a:rPr lang="en-GB" b="0" dirty="0"/>
+              <a:t>3</a:t>
+            </a:r>
+            <a:r>
+              <a:rPr lang="en-GB" b="0" dirty="0" smtClean="0"/>
+              <a:t>) </a:t>
+            </a:r>
+            <a:r>
+              <a:rPr lang="en-GB" b="0" dirty="0" err="1" smtClean="0"/>
+              <a:t>P</a:t>
+            </a:r>
+            <a:r>
+              <a:rPr lang="en-GB" b="0" baseline="-25000" dirty="0" err="1" smtClean="0"/>
+              <a:t>AuxIn</a:t>
+            </a:r>
+            <a:r>
+              <a:rPr lang="en-GB" b="0" baseline="-25000" dirty="0" smtClean="0"/>
+              <a:t> </a:t>
+            </a:r>
+            <a:r>
+              <a:rPr lang="en-GB" b="0" dirty="0" smtClean="0"/>
+              <a:t>= </a:t>
+            </a:r>
+            <a:r>
+              <a:rPr lang="en-GB" dirty="0" err="1" smtClean="0">
+                <a:solidFill>
+                  <a:srgbClr val="FF0000"/>
+                </a:solidFill>
+              </a:rPr>
+              <a:t>AuxMap</a:t>
+            </a:r>
+            <a:r>
+              <a:rPr lang="en-GB" dirty="0" smtClean="0">
+                <a:solidFill>
+                  <a:srgbClr val="FF0000"/>
+                </a:solidFill>
+              </a:rPr>
+              <a:t>(</a:t>
+            </a:r>
+            <a:r>
+              <a:rPr lang="en-GB" b="0" dirty="0" err="1"/>
+              <a:t>n</a:t>
+            </a:r>
+            <a:r>
+              <a:rPr lang="en-GB" b="0" baseline="-25000" dirty="0" err="1"/>
+              <a:t>Aux</a:t>
+            </a:r>
+            <a:r>
+              <a:rPr lang="en-GB" dirty="0" smtClean="0">
+                <a:solidFill>
+                  <a:srgbClr val="FF0000"/>
+                </a:solidFill>
+              </a:rPr>
+              <a:t>,</a:t>
+            </a:r>
+            <a:r>
+              <a:rPr lang="en-GB" dirty="0" smtClean="0"/>
+              <a:t> </a:t>
+            </a:r>
+            <a:r>
+              <a:rPr lang="en-GB" b="0" dirty="0" err="1"/>
+              <a:t>P</a:t>
+            </a:r>
+            <a:r>
+              <a:rPr lang="en-GB" b="0" baseline="-25000" dirty="0" err="1"/>
+              <a:t>AuxOut</a:t>
+            </a:r>
+            <a:r>
+              <a:rPr lang="en-GB" dirty="0" smtClean="0">
+                <a:solidFill>
+                  <a:srgbClr val="FF0000"/>
+                </a:solidFill>
+              </a:rPr>
+              <a:t>)</a:t>
+            </a:r>
+            <a:endParaRPr lang="en-GB" dirty="0" smtClean="0">
+              <a:solidFill>
+                <a:srgbClr val="00B050"/>
+              </a:solidFill>
+            </a:endParaRPr>
+          </a:p>
+        </p:txBody>
+      </p:sp>
+      <p:sp>
+        <p:nvSpPr>
+          <p:cNvPr id="24" name="Textfeld 23"/>
+          <p:cNvSpPr txBox="1"/>
+          <p:nvPr/>
+        </p:nvSpPr>
+        <p:spPr>
+          <a:xfrm>
+            <a:off x="323528" y="3203684"/>
+            <a:ext cx="3098028" cy="338554"/>
+          </a:xfrm>
+          <a:prstGeom prst="rect">
+            <a:avLst/>
+          </a:prstGeom>
+          <a:noFill/>
+          <a:ln>
+            <a:noFill/>
+          </a:ln>
+        </p:spPr>
+        <p:txBody>
+          <a:bodyPr wrap="none" rtlCol="0">
+            <a:spAutoFit/>
+          </a:bodyPr>
+          <a:lstStyle/>
+          <a:p>
+            <a:pPr algn="l"/>
+            <a:r>
+              <a:rPr lang="en-GB" b="0" smtClean="0"/>
+              <a:t>4) </a:t>
+            </a:r>
+            <a:r>
+              <a:rPr lang="en-GB" smtClean="0"/>
+              <a:t>P</a:t>
+            </a:r>
+            <a:r>
+              <a:rPr lang="en-GB" baseline="-25000" smtClean="0"/>
+              <a:t>AuxDemand</a:t>
+            </a:r>
+            <a:r>
+              <a:rPr lang="en-GB" b="0" baseline="-25000" smtClean="0"/>
+              <a:t> </a:t>
+            </a:r>
+            <a:r>
+              <a:rPr lang="en-GB" b="0"/>
+              <a:t>= P</a:t>
+            </a:r>
+            <a:r>
+              <a:rPr lang="en-GB" b="0" baseline="-25000"/>
+              <a:t>AuxIn</a:t>
+            </a:r>
+            <a:r>
+              <a:rPr lang="en-GB" b="0" smtClean="0"/>
+              <a:t> </a:t>
+            </a:r>
+            <a:r>
+              <a:rPr lang="en-GB"/>
+              <a:t>/</a:t>
+            </a:r>
+            <a:r>
+              <a:rPr lang="en-GB">
+                <a:solidFill>
+                  <a:srgbClr val="FF0000"/>
+                </a:solidFill>
+              </a:rPr>
+              <a:t> </a:t>
+            </a:r>
+            <a:r>
+              <a:rPr lang="en-GB">
+                <a:solidFill>
+                  <a:schemeClr val="accent6">
+                    <a:lumMod val="75000"/>
+                  </a:schemeClr>
+                </a:solidFill>
+              </a:rPr>
+              <a:t>EffToEng</a:t>
+            </a:r>
+            <a:endParaRPr lang="en-GB" smtClean="0">
+              <a:solidFill>
+                <a:srgbClr val="00B050"/>
+              </a:solidFill>
+            </a:endParaRPr>
+          </a:p>
+        </p:txBody>
+      </p:sp>
+      <p:sp>
+        <p:nvSpPr>
+          <p:cNvPr id="20" name="Pfeil nach rechts 19"/>
+          <p:cNvSpPr/>
+          <p:nvPr/>
+        </p:nvSpPr>
+        <p:spPr bwMode="auto">
+          <a:xfrm>
+            <a:off x="467543" y="3820398"/>
+            <a:ext cx="404441" cy="288032"/>
+          </a:xfrm>
+          <a:prstGeom prst="rightArrow">
+            <a:avLst/>
+          </a:prstGeom>
+          <a:solidFill>
+            <a:schemeClr val="accent6">
+              <a:lumMod val="50000"/>
+            </a:schemeClr>
+          </a:solidFill>
+          <a:ln w="19050" cap="flat" cmpd="sng" algn="ctr">
+            <a:noFill/>
+            <a:prstDash val="solid"/>
+            <a:round/>
+            <a:headEnd type="none" w="med" len="med"/>
+            <a:tailEnd type="triangle" w="med" len="med"/>
+          </a:ln>
+          <a:effectLst/>
+          <a:extLst/>
+        </p:spPr>
+        <p:txBody>
+          <a:bodyPr vert="horz" wrap="square" lIns="91440" tIns="45720" rIns="91440" bIns="45720" numCol="1" rtlCol="0" anchor="ctr" anchorCtr="0" compatLnSpc="1">
+            <a:prstTxWarp prst="textNoShape">
+              <a:avLst/>
+            </a:prstTxWarp>
+            <a:spAutoFit/>
+          </a:bodyPr>
+          <a:lstStyle/>
+          <a:p>
+            <a:pPr marL="0" marR="0" indent="0" algn="ctr" defTabSz="914400" rtl="0" eaLnBrk="1" fontAlgn="base" latinLnBrk="0" hangingPunct="1">
+              <a:lnSpc>
+                <a:spcPct val="100000"/>
+              </a:lnSpc>
+              <a:spcBef>
+                <a:spcPct val="30000"/>
+              </a:spcBef>
+              <a:spcAft>
+                <a:spcPct val="0"/>
+              </a:spcAft>
+              <a:buClrTx/>
+              <a:buSzTx/>
+              <a:buFontTx/>
+              <a:buNone/>
+              <a:tabLst/>
+            </a:pPr>
+            <a:endParaRPr kumimoji="0" lang="en-GB" sz="2000" b="1" i="0" u="none" strike="noStrike" cap="none" normalizeH="0" baseline="0" smtClean="0">
+              <a:ln>
+                <a:noFill/>
+              </a:ln>
+              <a:solidFill>
+                <a:schemeClr val="tx1"/>
+              </a:solidFill>
+              <a:effectLst/>
+              <a:latin typeface="Arial" pitchFamily="34" charset="0"/>
+            </a:endParaRPr>
+          </a:p>
+        </p:txBody>
+      </p:sp>
+    </p:spTree>
+    <p:extLst>
+      <p:ext uri="{BB962C8B-B14F-4D97-AF65-F5344CB8AC3E}">
+        <p14:creationId xmlns:p14="http://schemas.microsoft.com/office/powerpoint/2010/main" val="3323098294"/>
+      </p:ext>
+    </p:extLst>
+  </p:cSld>
+  <p:clrMapOvr>
+    <a:masterClrMapping/>
+  </p:clrMapOvr>
+  <p:timing>
+    <p:tnLst>
+      <p:par>
+        <p:cTn id="1" dur="indefinite" restart="never" nodeType="tmRoot"/>
+      </p:par>
+    </p:tnLst>
+  </p:timing>
+</p:sld>
+</file>
+
+<file path=ppt/slides/slide17.xml><?xml version="1.0" encoding="utf-8"?>
+<p:sld xmlns:a="http://schemas.openxmlformats.org/drawingml/2006/main" xmlns:r="http://schemas.openxmlformats.org/officeDocument/2006/relationships" xmlns:p="http://schemas.openxmlformats.org/presentationml/2006/main">
+  <p:cSld>
+    <p:spTree>
+      <p:nvGrpSpPr>
+        <p:cNvPr id="1" name=""/>
+        <p:cNvGrpSpPr/>
+        <p:nvPr/>
+      </p:nvGrpSpPr>
+      <p:grpSpPr>
+        <a:xfrm>
+          <a:off x="0" y="0"/>
+          <a:ext cx="0" cy="0"/>
+          <a:chOff x="0" y="0"/>
+          <a:chExt cx="0" cy="0"/>
+        </a:xfrm>
+      </p:grpSpPr>
+    </p:spTree>
+    <p:extLst>
+      <p:ext uri="{BB962C8B-B14F-4D97-AF65-F5344CB8AC3E}">
+        <p14:creationId xmlns:p14="http://schemas.microsoft.com/office/powerpoint/2010/main" val="163971466"/>
+      </p:ext>
+    </p:extLst>
+  </p:cSld>
+  <p:clrMapOvr>
+    <a:masterClrMapping/>
+  </p:clrMapOvr>
+</p:sld>
+</file>
+
+<file path=ppt/slides/slide18.xml><?xml version="1.0" encoding="utf-8"?>
+<p:sld xmlns:a="http://schemas.openxmlformats.org/drawingml/2006/main" xmlns:r="http://schemas.openxmlformats.org/officeDocument/2006/relationships" xmlns:p="http://schemas.openxmlformats.org/presentationml/2006/main">
+  <p:cSld>
+    <p:spTree>
+      <p:nvGrpSpPr>
+        <p:cNvPr id="1" name=""/>
+        <p:cNvGrpSpPr/>
+        <p:nvPr/>
+      </p:nvGrpSpPr>
+      <p:grpSpPr>
+        <a:xfrm>
+          <a:off x="0" y="0"/>
+          <a:ext cx="0" cy="0"/>
+          <a:chOff x="0" y="0"/>
+          <a:chExt cx="0" cy="0"/>
+        </a:xfrm>
+      </p:grpSpPr>
+    </p:spTree>
+    <p:extLst>
+      <p:ext uri="{BB962C8B-B14F-4D97-AF65-F5344CB8AC3E}">
+        <p14:creationId xmlns:p14="http://schemas.microsoft.com/office/powerpoint/2010/main" val="59190741"/>
+      </p:ext>
+    </p:extLst>
+  </p:cSld>
+  <p:clrMapOvr>
+    <a:masterClrMapping/>
+  </p:clrMapOvr>
+</p:sld>
+</file>
+
+<file path=ppt/slides/slide19.xml><?xml version="1.0" encoding="utf-8"?>
+<p:sld xmlns:a="http://schemas.openxmlformats.org/drawingml/2006/main" xmlns:r="http://schemas.openxmlformats.org/officeDocument/2006/relationships" xmlns:p="http://schemas.openxmlformats.org/presentationml/2006/main">
+  <p:cSld>
+    <p:spTree>
+      <p:nvGrpSpPr>
+        <p:cNvPr id="1" name=""/>
+        <p:cNvGrpSpPr/>
+        <p:nvPr/>
+      </p:nvGrpSpPr>
+      <p:grpSpPr>
+        <a:xfrm>
+          <a:off x="0" y="0"/>
+          <a:ext cx="0" cy="0"/>
+          <a:chOff x="0" y="0"/>
+          <a:chExt cx="0" cy="0"/>
+        </a:xfrm>
+      </p:grpSpPr>
+    </p:spTree>
+    <p:extLst>
+      <p:ext uri="{BB962C8B-B14F-4D97-AF65-F5344CB8AC3E}">
+        <p14:creationId xmlns:p14="http://schemas.microsoft.com/office/powerpoint/2010/main" val="3898365292"/>
       </p:ext>
     </p:extLst>
   </p:cSld>
@@ -6189,7 +10389,7 @@
       </p:grpSpPr>
       <p:pic>
         <p:nvPicPr>
-          <p:cNvPr id="1026" name="Picture 2"/>
+          <p:cNvPr id="2" name="Picture 2"/>
           <p:cNvPicPr>
             <a:picLocks noChangeAspect="1" noChangeArrowheads="1"/>
           </p:cNvPicPr>
@@ -6210,8 +10410,8 @@
         </p:blipFill>
         <p:spPr bwMode="auto">
           <a:xfrm>
-            <a:off x="107504" y="1818201"/>
-            <a:ext cx="3176959" cy="2052160"/>
+            <a:off x="1841899" y="1978228"/>
+            <a:ext cx="3176958" cy="2447036"/>
           </a:xfrm>
           <a:prstGeom prst="rect">
             <a:avLst/>
@@ -6220,7 +10420,6 @@
           <a:ln>
             <a:noFill/>
           </a:ln>
-          <a:effectLst/>
           <a:extLst>
             <a:ext uri="{909E8E84-426E-40DD-AFC4-6F175D3DCCD1}">
               <a14:hiddenFill xmlns:a14="http://schemas.microsoft.com/office/drawing/2010/main">
@@ -6239,15 +10438,6 @@
                 <a:tailEnd/>
               </a14:hiddenLine>
             </a:ext>
-            <a:ext uri="{AF507438-7753-43E0-B8FC-AC1667EBCBE1}">
-              <a14:hiddenEffects xmlns:a14="http://schemas.microsoft.com/office/drawing/2010/main">
-                <a:effectLst>
-                  <a:outerShdw dist="35921" dir="2700000" algn="ctr" rotWithShape="0">
-                    <a:schemeClr val="bg2"/>
-                  </a:outerShdw>
-                </a:effectLst>
-              </a14:hiddenEffects>
-            </a:ext>
           </a:extLst>
         </p:spPr>
       </p:pic>
@@ -6259,7 +10449,7 @@
         </p:nvSpPr>
         <p:spPr>
           <a:xfrm>
-            <a:off x="249742" y="2247101"/>
+            <a:off x="1984136" y="2407127"/>
             <a:ext cx="2882154" cy="166405"/>
           </a:xfrm>
           <a:prstGeom prst="rect">
@@ -6311,7 +10501,7 @@
         </p:nvSpPr>
         <p:spPr>
           <a:xfrm>
-            <a:off x="984931" y="2609430"/>
+            <a:off x="2747900" y="2883756"/>
             <a:ext cx="235407" cy="130149"/>
           </a:xfrm>
           <a:prstGeom prst="rect">
@@ -6363,8 +10553,8 @@
         </p:nvSpPr>
         <p:spPr>
           <a:xfrm>
-            <a:off x="2306246" y="2609431"/>
-            <a:ext cx="813684" cy="130148"/>
+            <a:off x="3335790" y="2762250"/>
+            <a:ext cx="1517198" cy="566737"/>
           </a:xfrm>
           <a:prstGeom prst="rect">
             <a:avLst/>
@@ -6415,7 +10605,7 @@
         </p:nvSpPr>
         <p:spPr>
           <a:xfrm>
-            <a:off x="673816" y="3004307"/>
+            <a:off x="2416148" y="3554983"/>
             <a:ext cx="304210" cy="130149"/>
           </a:xfrm>
           <a:prstGeom prst="rect">
@@ -6467,7 +10657,7 @@
         </p:nvSpPr>
         <p:spPr>
           <a:xfrm>
-            <a:off x="870691" y="3270549"/>
+            <a:off x="2613023" y="3821225"/>
             <a:ext cx="316740" cy="130149"/>
           </a:xfrm>
           <a:prstGeom prst="rect">
@@ -6519,7 +10709,7 @@
         </p:nvSpPr>
         <p:spPr>
           <a:xfrm>
-            <a:off x="362702" y="3598615"/>
+            <a:off x="2105034" y="4149291"/>
             <a:ext cx="647234" cy="159066"/>
           </a:xfrm>
           <a:prstGeom prst="rect">
@@ -6571,7 +10761,7 @@
         </p:nvSpPr>
         <p:spPr>
           <a:xfrm>
-            <a:off x="1748185" y="3004307"/>
+            <a:off x="3490517" y="3554983"/>
             <a:ext cx="304800" cy="130149"/>
           </a:xfrm>
           <a:prstGeom prst="rect">
@@ -7511,7 +11701,7 @@
       </p:grpSpPr>
       <p:pic>
         <p:nvPicPr>
-          <p:cNvPr id="1026" name="Picture 2"/>
+          <p:cNvPr id="2" name="Picture 2"/>
           <p:cNvPicPr>
             <a:picLocks noChangeAspect="1" noChangeArrowheads="1"/>
           </p:cNvPicPr>
@@ -7532,8 +11722,8 @@
         </p:blipFill>
         <p:spPr bwMode="auto">
           <a:xfrm>
-            <a:off x="2483768" y="1124746"/>
-            <a:ext cx="4337995" cy="4268129"/>
+            <a:off x="2483768" y="1124745"/>
+            <a:ext cx="4337994" cy="4268129"/>
           </a:xfrm>
           <a:prstGeom prst="rect">
             <a:avLst/>
@@ -7625,6 +11815,162 @@
           <a:xfrm>
             <a:off x="2597320" y="2314175"/>
             <a:ext cx="4041020" cy="155975"/>
+          </a:xfrm>
+          <a:prstGeom prst="rect">
+            <a:avLst/>
+          </a:prstGeom>
+          <a:solidFill>
+            <a:schemeClr val="accent2">
+              <a:lumMod val="20000"/>
+              <a:lumOff val="80000"/>
+              <a:alpha val="50196"/>
+            </a:schemeClr>
+          </a:solidFill>
+          <a:ln w="9525">
+            <a:solidFill>
+              <a:srgbClr val="FF0000"/>
+            </a:solidFill>
+          </a:ln>
+        </p:spPr>
+        <p:style>
+          <a:lnRef idx="2">
+            <a:schemeClr val="accent1">
+              <a:shade val="50000"/>
+            </a:schemeClr>
+          </a:lnRef>
+          <a:fillRef idx="1">
+            <a:schemeClr val="accent1"/>
+          </a:fillRef>
+          <a:effectRef idx="0">
+            <a:schemeClr val="accent1"/>
+          </a:effectRef>
+          <a:fontRef idx="minor">
+            <a:schemeClr val="lt1"/>
+          </a:fontRef>
+        </p:style>
+        <p:txBody>
+          <a:bodyPr rtlCol="0" anchor="ctr"/>
+          <a:lstStyle/>
+          <a:p>
+            <a:pPr algn="ctr"/>
+            <a:endParaRPr lang="en-GB"/>
+          </a:p>
+        </p:txBody>
+      </p:sp>
+      <p:sp>
+        <p:nvSpPr>
+          <p:cNvPr id="6" name="Rechteck 5"/>
+          <p:cNvSpPr/>
+          <p:nvPr/>
+        </p:nvSpPr>
+        <p:spPr>
+          <a:xfrm>
+            <a:off x="2597320" y="2636912"/>
+            <a:ext cx="2406728" cy="576064"/>
+          </a:xfrm>
+          <a:prstGeom prst="rect">
+            <a:avLst/>
+          </a:prstGeom>
+          <a:solidFill>
+            <a:schemeClr val="accent2">
+              <a:lumMod val="20000"/>
+              <a:lumOff val="80000"/>
+              <a:alpha val="50196"/>
+            </a:schemeClr>
+          </a:solidFill>
+          <a:ln w="9525">
+            <a:solidFill>
+              <a:srgbClr val="FF0000"/>
+            </a:solidFill>
+          </a:ln>
+        </p:spPr>
+        <p:style>
+          <a:lnRef idx="2">
+            <a:schemeClr val="accent1">
+              <a:shade val="50000"/>
+            </a:schemeClr>
+          </a:lnRef>
+          <a:fillRef idx="1">
+            <a:schemeClr val="accent1"/>
+          </a:fillRef>
+          <a:effectRef idx="0">
+            <a:schemeClr val="accent1"/>
+          </a:effectRef>
+          <a:fontRef idx="minor">
+            <a:schemeClr val="lt1"/>
+          </a:fontRef>
+        </p:style>
+        <p:txBody>
+          <a:bodyPr rtlCol="0" anchor="ctr"/>
+          <a:lstStyle/>
+          <a:p>
+            <a:pPr algn="ctr"/>
+            <a:endParaRPr lang="en-GB"/>
+          </a:p>
+        </p:txBody>
+      </p:sp>
+      <p:sp>
+        <p:nvSpPr>
+          <p:cNvPr id="7" name="Rechteck 6"/>
+          <p:cNvSpPr/>
+          <p:nvPr/>
+        </p:nvSpPr>
+        <p:spPr>
+          <a:xfrm>
+            <a:off x="2597320" y="3356992"/>
+            <a:ext cx="2406728" cy="720080"/>
+          </a:xfrm>
+          <a:prstGeom prst="rect">
+            <a:avLst/>
+          </a:prstGeom>
+          <a:solidFill>
+            <a:schemeClr val="accent2">
+              <a:lumMod val="20000"/>
+              <a:lumOff val="80000"/>
+              <a:alpha val="50196"/>
+            </a:schemeClr>
+          </a:solidFill>
+          <a:ln w="9525">
+            <a:solidFill>
+              <a:srgbClr val="FF0000"/>
+            </a:solidFill>
+          </a:ln>
+        </p:spPr>
+        <p:style>
+          <a:lnRef idx="2">
+            <a:schemeClr val="accent1">
+              <a:shade val="50000"/>
+            </a:schemeClr>
+          </a:lnRef>
+          <a:fillRef idx="1">
+            <a:schemeClr val="accent1"/>
+          </a:fillRef>
+          <a:effectRef idx="0">
+            <a:schemeClr val="accent1"/>
+          </a:effectRef>
+          <a:fontRef idx="minor">
+            <a:schemeClr val="lt1"/>
+          </a:fontRef>
+        </p:style>
+        <p:txBody>
+          <a:bodyPr rtlCol="0" anchor="ctr"/>
+          <a:lstStyle/>
+          <a:p>
+            <a:pPr algn="ctr"/>
+            <a:endParaRPr lang="en-GB"/>
+          </a:p>
+        </p:txBody>
+      </p:sp>
+      <p:sp>
+        <p:nvSpPr>
+          <p:cNvPr id="8" name="Rechteck 7"/>
+          <p:cNvSpPr/>
+          <p:nvPr/>
+        </p:nvSpPr>
+        <p:spPr>
+          <a:xfrm>
+            <a:off x="2597320" y="4221088"/>
+            <a:ext cx="2406728" cy="576064"/>
           </a:xfrm>
           <a:prstGeom prst="rect">
             <a:avLst/>

</xml_diff>

<commit_message>
- User manual updates - Exact road gradient calculation (see changelog)
</commit_message>
<xml_diff>
--- a/User Manual Source/material User Manual.pptx
+++ b/User Manual Source/material User Manual.pptx
@@ -309,7 +309,7 @@
           <a:p>
             <a:fld id="{11A2203D-8DA4-4655-BF9E-AA17BDE25312}" type="datetimeFigureOut">
               <a:rPr lang="en-GB" smtClean="0"/>
-              <a:t>27/09/2013</a:t>
+              <a:t>18/11/2013</a:t>
             </a:fld>
             <a:endParaRPr lang="en-GB"/>
           </a:p>
@@ -479,7 +479,7 @@
           <a:p>
             <a:fld id="{11A2203D-8DA4-4655-BF9E-AA17BDE25312}" type="datetimeFigureOut">
               <a:rPr lang="en-GB" smtClean="0"/>
-              <a:t>27/09/2013</a:t>
+              <a:t>18/11/2013</a:t>
             </a:fld>
             <a:endParaRPr lang="en-GB"/>
           </a:p>
@@ -659,7 +659,7 @@
           <a:p>
             <a:fld id="{11A2203D-8DA4-4655-BF9E-AA17BDE25312}" type="datetimeFigureOut">
               <a:rPr lang="en-GB" smtClean="0"/>
-              <a:t>27/09/2013</a:t>
+              <a:t>18/11/2013</a:t>
             </a:fld>
             <a:endParaRPr lang="en-GB"/>
           </a:p>
@@ -829,7 +829,7 @@
           <a:p>
             <a:fld id="{11A2203D-8DA4-4655-BF9E-AA17BDE25312}" type="datetimeFigureOut">
               <a:rPr lang="en-GB" smtClean="0"/>
-              <a:t>27/09/2013</a:t>
+              <a:t>18/11/2013</a:t>
             </a:fld>
             <a:endParaRPr lang="en-GB"/>
           </a:p>
@@ -1075,7 +1075,7 @@
           <a:p>
             <a:fld id="{11A2203D-8DA4-4655-BF9E-AA17BDE25312}" type="datetimeFigureOut">
               <a:rPr lang="en-GB" smtClean="0"/>
-              <a:t>27/09/2013</a:t>
+              <a:t>18/11/2013</a:t>
             </a:fld>
             <a:endParaRPr lang="en-GB"/>
           </a:p>
@@ -1363,7 +1363,7 @@
           <a:p>
             <a:fld id="{11A2203D-8DA4-4655-BF9E-AA17BDE25312}" type="datetimeFigureOut">
               <a:rPr lang="en-GB" smtClean="0"/>
-              <a:t>27/09/2013</a:t>
+              <a:t>18/11/2013</a:t>
             </a:fld>
             <a:endParaRPr lang="en-GB"/>
           </a:p>
@@ -1785,7 +1785,7 @@
           <a:p>
             <a:fld id="{11A2203D-8DA4-4655-BF9E-AA17BDE25312}" type="datetimeFigureOut">
               <a:rPr lang="en-GB" smtClean="0"/>
-              <a:t>27/09/2013</a:t>
+              <a:t>18/11/2013</a:t>
             </a:fld>
             <a:endParaRPr lang="en-GB"/>
           </a:p>
@@ -1903,7 +1903,7 @@
           <a:p>
             <a:fld id="{11A2203D-8DA4-4655-BF9E-AA17BDE25312}" type="datetimeFigureOut">
               <a:rPr lang="en-GB" smtClean="0"/>
-              <a:t>27/09/2013</a:t>
+              <a:t>18/11/2013</a:t>
             </a:fld>
             <a:endParaRPr lang="en-GB"/>
           </a:p>
@@ -1998,7 +1998,7 @@
           <a:p>
             <a:fld id="{11A2203D-8DA4-4655-BF9E-AA17BDE25312}" type="datetimeFigureOut">
               <a:rPr lang="en-GB" smtClean="0"/>
-              <a:t>27/09/2013</a:t>
+              <a:t>18/11/2013</a:t>
             </a:fld>
             <a:endParaRPr lang="en-GB"/>
           </a:p>
@@ -2275,7 +2275,7 @@
           <a:p>
             <a:fld id="{11A2203D-8DA4-4655-BF9E-AA17BDE25312}" type="datetimeFigureOut">
               <a:rPr lang="en-GB" smtClean="0"/>
-              <a:t>27/09/2013</a:t>
+              <a:t>18/11/2013</a:t>
             </a:fld>
             <a:endParaRPr lang="en-GB"/>
           </a:p>
@@ -2528,7 +2528,7 @@
           <a:p>
             <a:fld id="{11A2203D-8DA4-4655-BF9E-AA17BDE25312}" type="datetimeFigureOut">
               <a:rPr lang="en-GB" smtClean="0"/>
-              <a:t>27/09/2013</a:t>
+              <a:t>18/11/2013</a:t>
             </a:fld>
             <a:endParaRPr lang="en-GB"/>
           </a:p>
@@ -2744,7 +2744,7 @@
           <a:p>
             <a:fld id="{11A2203D-8DA4-4655-BF9E-AA17BDE25312}" type="datetimeFigureOut">
               <a:rPr lang="en-GB" smtClean="0"/>
-              <a:t>27/09/2013</a:t>
+              <a:t>18/11/2013</a:t>
             </a:fld>
             <a:endParaRPr lang="en-GB"/>
           </a:p>
@@ -15661,6 +15661,167 @@
           </a:p>
         </p:txBody>
       </p:sp>
+      <mc:AlternateContent xmlns:mc="http://schemas.openxmlformats.org/markup-compatibility/2006">
+        <mc:Choice xmlns:a14="http://schemas.microsoft.com/office/drawing/2010/main" Requires="a14">
+          <p:sp>
+            <p:nvSpPr>
+              <p:cNvPr id="2" name="Rechteck 1"/>
+              <p:cNvSpPr/>
+              <p:nvPr/>
+            </p:nvSpPr>
+            <p:spPr>
+              <a:xfrm>
+                <a:off x="827584" y="5805264"/>
+                <a:ext cx="6408712" cy="369332"/>
+              </a:xfrm>
+              <a:prstGeom prst="rect">
+                <a:avLst/>
+              </a:prstGeom>
+            </p:spPr>
+            <p:txBody>
+              <a:bodyPr wrap="square">
+                <a:spAutoFit/>
+              </a:bodyPr>
+              <a:lstStyle/>
+              <a:p>
+                <a14:m>
+                  <m:oMathPara xmlns:m="http://schemas.openxmlformats.org/officeDocument/2006/math">
+                    <m:oMathParaPr>
+                      <m:jc m:val="centerGroup"/>
+                    </m:oMathParaPr>
+                    <m:oMath xmlns:m="http://schemas.openxmlformats.org/officeDocument/2006/math">
+                      <m:r>
+                        <a:rPr lang="de-AT" b="0" i="1" smtClean="0">
+                          <a:latin typeface="Cambria Math"/>
+                        </a:rPr>
+                        <m:t>𝑂𝑢𝑡𝑝𝑢𝑡</m:t>
+                      </m:r>
+                      <m:r>
+                        <a:rPr lang="de-AT" b="0" i="1" smtClean="0">
+                          <a:latin typeface="Cambria Math"/>
+                        </a:rPr>
+                        <m:t> </m:t>
+                      </m:r>
+                      <m:r>
+                        <a:rPr lang="de-AT" b="0" i="1" smtClean="0">
+                          <a:latin typeface="Cambria Math"/>
+                        </a:rPr>
+                        <m:t>𝑇𝑜𝑟𝑞𝑢𝑒</m:t>
+                      </m:r>
+                      <m:r>
+                        <a:rPr lang="en-US" i="1"/>
+                        <m:t>=</m:t>
+                      </m:r>
+                      <m:d>
+                        <m:dPr>
+                          <m:ctrlPr>
+                            <a:rPr lang="en-GB" i="1"/>
+                          </m:ctrlPr>
+                        </m:dPr>
+                        <m:e>
+                          <m:r>
+                            <a:rPr lang="de-AT" b="0" i="1" smtClean="0">
+                              <a:latin typeface="Cambria Math"/>
+                            </a:rPr>
+                            <m:t>𝐼𝑛𝑝𝑢𝑡</m:t>
+                          </m:r>
+                          <m:r>
+                            <a:rPr lang="de-AT" b="0" i="1" smtClean="0">
+                              <a:latin typeface="Cambria Math"/>
+                            </a:rPr>
+                            <m:t> </m:t>
+                          </m:r>
+                          <m:r>
+                            <a:rPr lang="de-AT" b="0" i="1" smtClean="0">
+                              <a:latin typeface="Cambria Math"/>
+                            </a:rPr>
+                            <m:t>𝑇𝑜𝑟𝑞𝑢𝑒</m:t>
+                          </m:r>
+                          <m:r>
+                            <a:rPr lang="en-US" i="1"/>
+                            <m:t>−</m:t>
+                          </m:r>
+                          <m:r>
+                            <a:rPr lang="de-AT" b="0" i="1" smtClean="0">
+                              <a:latin typeface="Cambria Math"/>
+                            </a:rPr>
+                            <m:t>𝑇𝑜𝑟𝑞𝑢𝑒</m:t>
+                          </m:r>
+                          <m:r>
+                            <a:rPr lang="de-AT" b="0" i="1" smtClean="0">
+                              <a:latin typeface="Cambria Math"/>
+                            </a:rPr>
+                            <m:t> </m:t>
+                          </m:r>
+                          <m:r>
+                            <a:rPr lang="de-AT" b="0" i="1" smtClean="0">
+                              <a:latin typeface="Cambria Math"/>
+                            </a:rPr>
+                            <m:t>𝐿𝑜𝑠𝑠</m:t>
+                          </m:r>
+                        </m:e>
+                      </m:d>
+                      <m:r>
+                        <a:rPr lang="en-US" i="1"/>
+                        <m:t>×</m:t>
+                      </m:r>
+                      <m:r>
+                        <a:rPr lang="de-AT" b="0" i="1" smtClean="0">
+                          <a:latin typeface="Cambria Math"/>
+                        </a:rPr>
+                        <m:t>𝐺</m:t>
+                      </m:r>
+                      <m:r>
+                        <a:rPr lang="en-GB" i="1"/>
+                        <m:t>𝑒𝑎𝑟𝑅𝑎𝑡𝑖𝑜</m:t>
+                      </m:r>
+                    </m:oMath>
+                  </m:oMathPara>
+                </a14:m>
+                <a:endParaRPr lang="en-GB" dirty="0"/>
+              </a:p>
+            </p:txBody>
+          </p:sp>
+        </mc:Choice>
+        <mc:Fallback>
+          <p:sp>
+            <p:nvSpPr>
+              <p:cNvPr id="2" name="Rechteck 1"/>
+              <p:cNvSpPr>
+                <a:spLocks noRot="1" noChangeAspect="1" noMove="1" noResize="1" noEditPoints="1" noAdjustHandles="1" noChangeArrowheads="1" noChangeShapeType="1" noTextEdit="1"/>
+              </p:cNvSpPr>
+              <p:nvPr/>
+            </p:nvSpPr>
+            <p:spPr>
+              <a:xfrm>
+                <a:off x="827584" y="5805264"/>
+                <a:ext cx="6408712" cy="369332"/>
+              </a:xfrm>
+              <a:prstGeom prst="rect">
+                <a:avLst/>
+              </a:prstGeom>
+              <a:blipFill rotWithShape="1">
+                <a:blip r:embed="rId3"/>
+                <a:stretch>
+                  <a:fillRect l="-190" b="-11475"/>
+                </a:stretch>
+              </a:blipFill>
+            </p:spPr>
+            <p:txBody>
+              <a:bodyPr/>
+              <a:lstStyle/>
+              <a:p>
+                <a:r>
+                  <a:rPr lang="en-GB">
+                    <a:noFill/>
+                  </a:rPr>
+                  <a:t> </a:t>
+                </a:r>
+              </a:p>
+            </p:txBody>
+          </p:sp>
+        </mc:Fallback>
+      </mc:AlternateContent>
     </p:spTree>
     <p:extLst>
       <p:ext uri="{BB962C8B-B14F-4D97-AF65-F5344CB8AC3E}">

</xml_diff>

<commit_message>
ver 2.0.0 --> 2.0.1-beta1: Rename "Update Notes"--> "Release Notes" and fix its template
readme: Update Release-checklist
BUG: Minor, sample Coach-file fails: Generic Vehicles\Engineering Mode\24t Coach\24t Coach.vecto
</commit_message>
<xml_diff>
--- a/User Manual Source/material User Manual.pptx
+++ b/User Manual Source/material User Manual.pptx
@@ -306,7 +306,7 @@
           <a:p>
             <a:fld id="{11A2203D-8DA4-4655-BF9E-AA17BDE25312}" type="datetimeFigureOut">
               <a:rPr lang="en-GB" smtClean="0"/>
-              <a:t>12/05/2014</a:t>
+              <a:t>16/05/2014</a:t>
             </a:fld>
             <a:endParaRPr lang="en-GB"/>
           </a:p>
@@ -348,7 +348,7 @@
           <a:p>
             <a:fld id="{ABC64FA3-CC51-4897-AF65-A78DEE8417C4}" type="slidenum">
               <a:rPr lang="en-GB" smtClean="0"/>
-              <a:t>‹Nr.›</a:t>
+              <a:t>‹#›</a:t>
             </a:fld>
             <a:endParaRPr lang="en-GB"/>
           </a:p>
@@ -476,7 +476,7 @@
           <a:p>
             <a:fld id="{11A2203D-8DA4-4655-BF9E-AA17BDE25312}" type="datetimeFigureOut">
               <a:rPr lang="en-GB" smtClean="0"/>
-              <a:t>12/05/2014</a:t>
+              <a:t>16/05/2014</a:t>
             </a:fld>
             <a:endParaRPr lang="en-GB"/>
           </a:p>
@@ -518,7 +518,7 @@
           <a:p>
             <a:fld id="{ABC64FA3-CC51-4897-AF65-A78DEE8417C4}" type="slidenum">
               <a:rPr lang="en-GB" smtClean="0"/>
-              <a:t>‹Nr.›</a:t>
+              <a:t>‹#›</a:t>
             </a:fld>
             <a:endParaRPr lang="en-GB"/>
           </a:p>
@@ -656,7 +656,7 @@
           <a:p>
             <a:fld id="{11A2203D-8DA4-4655-BF9E-AA17BDE25312}" type="datetimeFigureOut">
               <a:rPr lang="en-GB" smtClean="0"/>
-              <a:t>12/05/2014</a:t>
+              <a:t>16/05/2014</a:t>
             </a:fld>
             <a:endParaRPr lang="en-GB"/>
           </a:p>
@@ -698,7 +698,7 @@
           <a:p>
             <a:fld id="{ABC64FA3-CC51-4897-AF65-A78DEE8417C4}" type="slidenum">
               <a:rPr lang="en-GB" smtClean="0"/>
-              <a:t>‹Nr.›</a:t>
+              <a:t>‹#›</a:t>
             </a:fld>
             <a:endParaRPr lang="en-GB"/>
           </a:p>
@@ -826,7 +826,7 @@
           <a:p>
             <a:fld id="{11A2203D-8DA4-4655-BF9E-AA17BDE25312}" type="datetimeFigureOut">
               <a:rPr lang="en-GB" smtClean="0"/>
-              <a:t>12/05/2014</a:t>
+              <a:t>16/05/2014</a:t>
             </a:fld>
             <a:endParaRPr lang="en-GB"/>
           </a:p>
@@ -868,7 +868,7 @@
           <a:p>
             <a:fld id="{ABC64FA3-CC51-4897-AF65-A78DEE8417C4}" type="slidenum">
               <a:rPr lang="en-GB" smtClean="0"/>
-              <a:t>‹Nr.›</a:t>
+              <a:t>‹#›</a:t>
             </a:fld>
             <a:endParaRPr lang="en-GB"/>
           </a:p>
@@ -1072,7 +1072,7 @@
           <a:p>
             <a:fld id="{11A2203D-8DA4-4655-BF9E-AA17BDE25312}" type="datetimeFigureOut">
               <a:rPr lang="en-GB" smtClean="0"/>
-              <a:t>12/05/2014</a:t>
+              <a:t>16/05/2014</a:t>
             </a:fld>
             <a:endParaRPr lang="en-GB"/>
           </a:p>
@@ -1114,7 +1114,7 @@
           <a:p>
             <a:fld id="{ABC64FA3-CC51-4897-AF65-A78DEE8417C4}" type="slidenum">
               <a:rPr lang="en-GB" smtClean="0"/>
-              <a:t>‹Nr.›</a:t>
+              <a:t>‹#›</a:t>
             </a:fld>
             <a:endParaRPr lang="en-GB"/>
           </a:p>
@@ -1360,7 +1360,7 @@
           <a:p>
             <a:fld id="{11A2203D-8DA4-4655-BF9E-AA17BDE25312}" type="datetimeFigureOut">
               <a:rPr lang="en-GB" smtClean="0"/>
-              <a:t>12/05/2014</a:t>
+              <a:t>16/05/2014</a:t>
             </a:fld>
             <a:endParaRPr lang="en-GB"/>
           </a:p>
@@ -1402,7 +1402,7 @@
           <a:p>
             <a:fld id="{ABC64FA3-CC51-4897-AF65-A78DEE8417C4}" type="slidenum">
               <a:rPr lang="en-GB" smtClean="0"/>
-              <a:t>‹Nr.›</a:t>
+              <a:t>‹#›</a:t>
             </a:fld>
             <a:endParaRPr lang="en-GB"/>
           </a:p>
@@ -1782,7 +1782,7 @@
           <a:p>
             <a:fld id="{11A2203D-8DA4-4655-BF9E-AA17BDE25312}" type="datetimeFigureOut">
               <a:rPr lang="en-GB" smtClean="0"/>
-              <a:t>12/05/2014</a:t>
+              <a:t>16/05/2014</a:t>
             </a:fld>
             <a:endParaRPr lang="en-GB"/>
           </a:p>
@@ -1824,7 +1824,7 @@
           <a:p>
             <a:fld id="{ABC64FA3-CC51-4897-AF65-A78DEE8417C4}" type="slidenum">
               <a:rPr lang="en-GB" smtClean="0"/>
-              <a:t>‹Nr.›</a:t>
+              <a:t>‹#›</a:t>
             </a:fld>
             <a:endParaRPr lang="en-GB"/>
           </a:p>
@@ -1900,7 +1900,7 @@
           <a:p>
             <a:fld id="{11A2203D-8DA4-4655-BF9E-AA17BDE25312}" type="datetimeFigureOut">
               <a:rPr lang="en-GB" smtClean="0"/>
-              <a:t>12/05/2014</a:t>
+              <a:t>16/05/2014</a:t>
             </a:fld>
             <a:endParaRPr lang="en-GB"/>
           </a:p>
@@ -1942,7 +1942,7 @@
           <a:p>
             <a:fld id="{ABC64FA3-CC51-4897-AF65-A78DEE8417C4}" type="slidenum">
               <a:rPr lang="en-GB" smtClean="0"/>
-              <a:t>‹Nr.›</a:t>
+              <a:t>‹#›</a:t>
             </a:fld>
             <a:endParaRPr lang="en-GB"/>
           </a:p>
@@ -1995,7 +1995,7 @@
           <a:p>
             <a:fld id="{11A2203D-8DA4-4655-BF9E-AA17BDE25312}" type="datetimeFigureOut">
               <a:rPr lang="en-GB" smtClean="0"/>
-              <a:t>12/05/2014</a:t>
+              <a:t>16/05/2014</a:t>
             </a:fld>
             <a:endParaRPr lang="en-GB"/>
           </a:p>
@@ -2037,7 +2037,7 @@
           <a:p>
             <a:fld id="{ABC64FA3-CC51-4897-AF65-A78DEE8417C4}" type="slidenum">
               <a:rPr lang="en-GB" smtClean="0"/>
-              <a:t>‹Nr.›</a:t>
+              <a:t>‹#›</a:t>
             </a:fld>
             <a:endParaRPr lang="en-GB"/>
           </a:p>
@@ -2272,7 +2272,7 @@
           <a:p>
             <a:fld id="{11A2203D-8DA4-4655-BF9E-AA17BDE25312}" type="datetimeFigureOut">
               <a:rPr lang="en-GB" smtClean="0"/>
-              <a:t>12/05/2014</a:t>
+              <a:t>16/05/2014</a:t>
             </a:fld>
             <a:endParaRPr lang="en-GB"/>
           </a:p>
@@ -2314,7 +2314,7 @@
           <a:p>
             <a:fld id="{ABC64FA3-CC51-4897-AF65-A78DEE8417C4}" type="slidenum">
               <a:rPr lang="en-GB" smtClean="0"/>
-              <a:t>‹Nr.›</a:t>
+              <a:t>‹#›</a:t>
             </a:fld>
             <a:endParaRPr lang="en-GB"/>
           </a:p>
@@ -2525,7 +2525,7 @@
           <a:p>
             <a:fld id="{11A2203D-8DA4-4655-BF9E-AA17BDE25312}" type="datetimeFigureOut">
               <a:rPr lang="en-GB" smtClean="0"/>
-              <a:t>12/05/2014</a:t>
+              <a:t>16/05/2014</a:t>
             </a:fld>
             <a:endParaRPr lang="en-GB"/>
           </a:p>
@@ -2567,7 +2567,7 @@
           <a:p>
             <a:fld id="{ABC64FA3-CC51-4897-AF65-A78DEE8417C4}" type="slidenum">
               <a:rPr lang="en-GB" smtClean="0"/>
-              <a:t>‹Nr.›</a:t>
+              <a:t>‹#›</a:t>
             </a:fld>
             <a:endParaRPr lang="en-GB"/>
           </a:p>
@@ -2741,7 +2741,7 @@
           <a:p>
             <a:fld id="{11A2203D-8DA4-4655-BF9E-AA17BDE25312}" type="datetimeFigureOut">
               <a:rPr lang="en-GB" smtClean="0"/>
-              <a:t>12/05/2014</a:t>
+              <a:t>16/05/2014</a:t>
             </a:fld>
             <a:endParaRPr lang="en-GB"/>
           </a:p>
@@ -2819,7 +2819,7 @@
           <a:p>
             <a:fld id="{ABC64FA3-CC51-4897-AF65-A78DEE8417C4}" type="slidenum">
               <a:rPr lang="en-GB" smtClean="0"/>
-              <a:t>‹Nr.›</a:t>
+              <a:t>‹#›</a:t>
             </a:fld>
             <a:endParaRPr lang="en-GB"/>
           </a:p>
@@ -3465,7 +3465,7 @@
         <p:spPr>
           <a:xfrm>
             <a:off x="179512" y="133372"/>
-            <a:ext cx="3352136" cy="400110"/>
+            <a:ext cx="3392339" cy="400110"/>
           </a:xfrm>
           <a:prstGeom prst="rect">
             <a:avLst/>
@@ -3480,7 +3480,11 @@
           <a:p>
             <a:r>
               <a:rPr lang="en-GB" sz="2000" b="1" dirty="0" smtClean="0"/>
-              <a:t>Original in Update Notes.pptx</a:t>
+              <a:t>Original in </a:t>
+            </a:r>
+            <a:r>
+              <a:rPr lang="en-GB" sz="2000" b="1" dirty="0" smtClean="0"/>
+              <a:t>Release Notes.pptx</a:t>
             </a:r>
             <a:endParaRPr lang="en-GB" sz="2000" b="1" dirty="0"/>
           </a:p>
@@ -9599,7 +9603,7 @@
         <p:spPr>
           <a:xfrm>
             <a:off x="179512" y="133372"/>
-            <a:ext cx="3352136" cy="400110"/>
+            <a:ext cx="3392339" cy="400110"/>
           </a:xfrm>
           <a:prstGeom prst="rect">
             <a:avLst/>
@@ -9614,7 +9618,15 @@
           <a:p>
             <a:r>
               <a:rPr lang="en-GB" sz="2000" b="1" dirty="0" smtClean="0"/>
-              <a:t>Original in Update Notes.pptx</a:t>
+              <a:t>Original </a:t>
+            </a:r>
+            <a:r>
+              <a:rPr lang="en-GB" sz="2000" b="1" smtClean="0"/>
+              <a:t>in </a:t>
+            </a:r>
+            <a:r>
+              <a:rPr lang="en-GB" sz="2000" b="1" smtClean="0"/>
+              <a:t>Release Notes.pptx</a:t>
             </a:r>
             <a:endParaRPr lang="en-GB" sz="2000" b="1" dirty="0"/>
           </a:p>

</xml_diff>

<commit_message>
2.0.3-beta0 * Implemented engine-side TC inertia input parameter in GBX file * Updated User Manual for TC inertia * Relabeled "OK" buttons to "Save" in input file editors
</commit_message>
<xml_diff>
--- a/User Manual Source/material User Manual.pptx
+++ b/User Manual Source/material User Manual.pptx
@@ -306,7 +306,7 @@
           <a:p>
             <a:fld id="{11A2203D-8DA4-4655-BF9E-AA17BDE25312}" type="datetimeFigureOut">
               <a:rPr lang="en-GB" smtClean="0"/>
-              <a:t>16/05/2014</a:t>
+              <a:t>23/06/2014</a:t>
             </a:fld>
             <a:endParaRPr lang="en-GB"/>
           </a:p>
@@ -348,7 +348,7 @@
           <a:p>
             <a:fld id="{ABC64FA3-CC51-4897-AF65-A78DEE8417C4}" type="slidenum">
               <a:rPr lang="en-GB" smtClean="0"/>
-              <a:t>‹#›</a:t>
+              <a:t>‹Nr.›</a:t>
             </a:fld>
             <a:endParaRPr lang="en-GB"/>
           </a:p>
@@ -476,7 +476,7 @@
           <a:p>
             <a:fld id="{11A2203D-8DA4-4655-BF9E-AA17BDE25312}" type="datetimeFigureOut">
               <a:rPr lang="en-GB" smtClean="0"/>
-              <a:t>16/05/2014</a:t>
+              <a:t>23/06/2014</a:t>
             </a:fld>
             <a:endParaRPr lang="en-GB"/>
           </a:p>
@@ -518,7 +518,7 @@
           <a:p>
             <a:fld id="{ABC64FA3-CC51-4897-AF65-A78DEE8417C4}" type="slidenum">
               <a:rPr lang="en-GB" smtClean="0"/>
-              <a:t>‹#›</a:t>
+              <a:t>‹Nr.›</a:t>
             </a:fld>
             <a:endParaRPr lang="en-GB"/>
           </a:p>
@@ -656,7 +656,7 @@
           <a:p>
             <a:fld id="{11A2203D-8DA4-4655-BF9E-AA17BDE25312}" type="datetimeFigureOut">
               <a:rPr lang="en-GB" smtClean="0"/>
-              <a:t>16/05/2014</a:t>
+              <a:t>23/06/2014</a:t>
             </a:fld>
             <a:endParaRPr lang="en-GB"/>
           </a:p>
@@ -698,7 +698,7 @@
           <a:p>
             <a:fld id="{ABC64FA3-CC51-4897-AF65-A78DEE8417C4}" type="slidenum">
               <a:rPr lang="en-GB" smtClean="0"/>
-              <a:t>‹#›</a:t>
+              <a:t>‹Nr.›</a:t>
             </a:fld>
             <a:endParaRPr lang="en-GB"/>
           </a:p>
@@ -826,7 +826,7 @@
           <a:p>
             <a:fld id="{11A2203D-8DA4-4655-BF9E-AA17BDE25312}" type="datetimeFigureOut">
               <a:rPr lang="en-GB" smtClean="0"/>
-              <a:t>16/05/2014</a:t>
+              <a:t>23/06/2014</a:t>
             </a:fld>
             <a:endParaRPr lang="en-GB"/>
           </a:p>
@@ -868,7 +868,7 @@
           <a:p>
             <a:fld id="{ABC64FA3-CC51-4897-AF65-A78DEE8417C4}" type="slidenum">
               <a:rPr lang="en-GB" smtClean="0"/>
-              <a:t>‹#›</a:t>
+              <a:t>‹Nr.›</a:t>
             </a:fld>
             <a:endParaRPr lang="en-GB"/>
           </a:p>
@@ -1072,7 +1072,7 @@
           <a:p>
             <a:fld id="{11A2203D-8DA4-4655-BF9E-AA17BDE25312}" type="datetimeFigureOut">
               <a:rPr lang="en-GB" smtClean="0"/>
-              <a:t>16/05/2014</a:t>
+              <a:t>23/06/2014</a:t>
             </a:fld>
             <a:endParaRPr lang="en-GB"/>
           </a:p>
@@ -1114,7 +1114,7 @@
           <a:p>
             <a:fld id="{ABC64FA3-CC51-4897-AF65-A78DEE8417C4}" type="slidenum">
               <a:rPr lang="en-GB" smtClean="0"/>
-              <a:t>‹#›</a:t>
+              <a:t>‹Nr.›</a:t>
             </a:fld>
             <a:endParaRPr lang="en-GB"/>
           </a:p>
@@ -1360,7 +1360,7 @@
           <a:p>
             <a:fld id="{11A2203D-8DA4-4655-BF9E-AA17BDE25312}" type="datetimeFigureOut">
               <a:rPr lang="en-GB" smtClean="0"/>
-              <a:t>16/05/2014</a:t>
+              <a:t>23/06/2014</a:t>
             </a:fld>
             <a:endParaRPr lang="en-GB"/>
           </a:p>
@@ -1402,7 +1402,7 @@
           <a:p>
             <a:fld id="{ABC64FA3-CC51-4897-AF65-A78DEE8417C4}" type="slidenum">
               <a:rPr lang="en-GB" smtClean="0"/>
-              <a:t>‹#›</a:t>
+              <a:t>‹Nr.›</a:t>
             </a:fld>
             <a:endParaRPr lang="en-GB"/>
           </a:p>
@@ -1782,7 +1782,7 @@
           <a:p>
             <a:fld id="{11A2203D-8DA4-4655-BF9E-AA17BDE25312}" type="datetimeFigureOut">
               <a:rPr lang="en-GB" smtClean="0"/>
-              <a:t>16/05/2014</a:t>
+              <a:t>23/06/2014</a:t>
             </a:fld>
             <a:endParaRPr lang="en-GB"/>
           </a:p>
@@ -1824,7 +1824,7 @@
           <a:p>
             <a:fld id="{ABC64FA3-CC51-4897-AF65-A78DEE8417C4}" type="slidenum">
               <a:rPr lang="en-GB" smtClean="0"/>
-              <a:t>‹#›</a:t>
+              <a:t>‹Nr.›</a:t>
             </a:fld>
             <a:endParaRPr lang="en-GB"/>
           </a:p>
@@ -1900,7 +1900,7 @@
           <a:p>
             <a:fld id="{11A2203D-8DA4-4655-BF9E-AA17BDE25312}" type="datetimeFigureOut">
               <a:rPr lang="en-GB" smtClean="0"/>
-              <a:t>16/05/2014</a:t>
+              <a:t>23/06/2014</a:t>
             </a:fld>
             <a:endParaRPr lang="en-GB"/>
           </a:p>
@@ -1942,7 +1942,7 @@
           <a:p>
             <a:fld id="{ABC64FA3-CC51-4897-AF65-A78DEE8417C4}" type="slidenum">
               <a:rPr lang="en-GB" smtClean="0"/>
-              <a:t>‹#›</a:t>
+              <a:t>‹Nr.›</a:t>
             </a:fld>
             <a:endParaRPr lang="en-GB"/>
           </a:p>
@@ -1995,7 +1995,7 @@
           <a:p>
             <a:fld id="{11A2203D-8DA4-4655-BF9E-AA17BDE25312}" type="datetimeFigureOut">
               <a:rPr lang="en-GB" smtClean="0"/>
-              <a:t>16/05/2014</a:t>
+              <a:t>23/06/2014</a:t>
             </a:fld>
             <a:endParaRPr lang="en-GB"/>
           </a:p>
@@ -2037,7 +2037,7 @@
           <a:p>
             <a:fld id="{ABC64FA3-CC51-4897-AF65-A78DEE8417C4}" type="slidenum">
               <a:rPr lang="en-GB" smtClean="0"/>
-              <a:t>‹#›</a:t>
+              <a:t>‹Nr.›</a:t>
             </a:fld>
             <a:endParaRPr lang="en-GB"/>
           </a:p>
@@ -2272,7 +2272,7 @@
           <a:p>
             <a:fld id="{11A2203D-8DA4-4655-BF9E-AA17BDE25312}" type="datetimeFigureOut">
               <a:rPr lang="en-GB" smtClean="0"/>
-              <a:t>16/05/2014</a:t>
+              <a:t>23/06/2014</a:t>
             </a:fld>
             <a:endParaRPr lang="en-GB"/>
           </a:p>
@@ -2314,7 +2314,7 @@
           <a:p>
             <a:fld id="{ABC64FA3-CC51-4897-AF65-A78DEE8417C4}" type="slidenum">
               <a:rPr lang="en-GB" smtClean="0"/>
-              <a:t>‹#›</a:t>
+              <a:t>‹Nr.›</a:t>
             </a:fld>
             <a:endParaRPr lang="en-GB"/>
           </a:p>
@@ -2525,7 +2525,7 @@
           <a:p>
             <a:fld id="{11A2203D-8DA4-4655-BF9E-AA17BDE25312}" type="datetimeFigureOut">
               <a:rPr lang="en-GB" smtClean="0"/>
-              <a:t>16/05/2014</a:t>
+              <a:t>23/06/2014</a:t>
             </a:fld>
             <a:endParaRPr lang="en-GB"/>
           </a:p>
@@ -2567,7 +2567,7 @@
           <a:p>
             <a:fld id="{ABC64FA3-CC51-4897-AF65-A78DEE8417C4}" type="slidenum">
               <a:rPr lang="en-GB" smtClean="0"/>
-              <a:t>‹#›</a:t>
+              <a:t>‹Nr.›</a:t>
             </a:fld>
             <a:endParaRPr lang="en-GB"/>
           </a:p>
@@ -2741,7 +2741,7 @@
           <a:p>
             <a:fld id="{11A2203D-8DA4-4655-BF9E-AA17BDE25312}" type="datetimeFigureOut">
               <a:rPr lang="en-GB" smtClean="0"/>
-              <a:t>16/05/2014</a:t>
+              <a:t>23/06/2014</a:t>
             </a:fld>
             <a:endParaRPr lang="en-GB"/>
           </a:p>
@@ -2819,7 +2819,7 @@
           <a:p>
             <a:fld id="{ABC64FA3-CC51-4897-AF65-A78DEE8417C4}" type="slidenum">
               <a:rPr lang="en-GB" smtClean="0"/>
-              <a:t>‹#›</a:t>
+              <a:t>‹Nr.›</a:t>
             </a:fld>
             <a:endParaRPr lang="en-GB"/>
           </a:p>
@@ -3480,11 +3480,7 @@
           <a:p>
             <a:r>
               <a:rPr lang="en-GB" sz="2000" b="1" dirty="0" smtClean="0"/>
-              <a:t>Original in </a:t>
-            </a:r>
-            <a:r>
-              <a:rPr lang="en-GB" sz="2000" b="1" dirty="0" smtClean="0"/>
-              <a:t>Release Notes.pptx</a:t>
+              <a:t>Original in Release Notes.pptx</a:t>
             </a:r>
             <a:endParaRPr lang="en-GB" sz="2000" b="1" dirty="0"/>
           </a:p>
@@ -9210,6 +9206,60 @@
           <a:chExt cx="0" cy="0"/>
         </a:xfrm>
       </p:grpSpPr>
+      <p:pic>
+        <p:nvPicPr>
+          <p:cNvPr id="1027" name="Picture 3"/>
+          <p:cNvPicPr>
+            <a:picLocks noChangeAspect="1" noChangeArrowheads="1"/>
+          </p:cNvPicPr>
+          <p:nvPr/>
+        </p:nvPicPr>
+        <p:blipFill>
+          <a:blip r:embed="rId2">
+            <a:extLst>
+              <a:ext uri="{28A0092B-C50C-407E-A947-70E740481C1C}">
+                <a14:useLocalDpi xmlns:a14="http://schemas.microsoft.com/office/drawing/2010/main" val="0"/>
+              </a:ext>
+            </a:extLst>
+          </a:blip>
+          <a:srcRect/>
+          <a:stretch>
+            <a:fillRect/>
+          </a:stretch>
+        </p:blipFill>
+        <p:spPr bwMode="auto">
+          <a:xfrm>
+            <a:off x="395536" y="-750425"/>
+            <a:ext cx="8505825" cy="6238875"/>
+          </a:xfrm>
+          <a:prstGeom prst="rect">
+            <a:avLst/>
+          </a:prstGeom>
+          <a:noFill/>
+          <a:ln>
+            <a:noFill/>
+          </a:ln>
+          <a:extLst>
+            <a:ext uri="{909E8E84-426E-40DD-AFC4-6F175D3DCCD1}">
+              <a14:hiddenFill xmlns:a14="http://schemas.microsoft.com/office/drawing/2010/main">
+                <a:solidFill>
+                  <a:schemeClr val="accent1"/>
+                </a:solidFill>
+              </a14:hiddenFill>
+            </a:ext>
+            <a:ext uri="{91240B29-F687-4F45-9708-019B960494DF}">
+              <a14:hiddenLine xmlns:a14="http://schemas.microsoft.com/office/drawing/2010/main" w="9525">
+                <a:solidFill>
+                  <a:schemeClr val="tx1"/>
+                </a:solidFill>
+                <a:miter lim="800000"/>
+                <a:headEnd/>
+                <a:tailEnd/>
+              </a14:hiddenLine>
+            </a:ext>
+          </a:extLst>
+        </p:spPr>
+      </p:pic>
       <mc:AlternateContent xmlns:mc="http://schemas.openxmlformats.org/markup-compatibility/2006" xmlns:a14="http://schemas.microsoft.com/office/drawing/2010/main">
         <mc:Choice Requires="a14">
           <p:sp>
@@ -9382,60 +9432,6 @@
           </p:sp>
         </mc:Fallback>
       </mc:AlternateContent>
-      <p:pic>
-        <p:nvPicPr>
-          <p:cNvPr id="12" name="Picture 2"/>
-          <p:cNvPicPr>
-            <a:picLocks noChangeAspect="1" noChangeArrowheads="1"/>
-          </p:cNvPicPr>
-          <p:nvPr/>
-        </p:nvPicPr>
-        <p:blipFill>
-          <a:blip r:embed="rId4">
-            <a:extLst>
-              <a:ext uri="{28A0092B-C50C-407E-A947-70E740481C1C}">
-                <a14:useLocalDpi xmlns:a14="http://schemas.microsoft.com/office/drawing/2010/main" val="0"/>
-              </a:ext>
-            </a:extLst>
-          </a:blip>
-          <a:srcRect/>
-          <a:stretch>
-            <a:fillRect/>
-          </a:stretch>
-        </p:blipFill>
-        <p:spPr bwMode="auto">
-          <a:xfrm>
-            <a:off x="466428" y="-1179512"/>
-            <a:ext cx="8505825" cy="6238875"/>
-          </a:xfrm>
-          <a:prstGeom prst="rect">
-            <a:avLst/>
-          </a:prstGeom>
-          <a:noFill/>
-          <a:ln>
-            <a:noFill/>
-          </a:ln>
-          <a:extLst>
-            <a:ext uri="{909E8E84-426E-40DD-AFC4-6F175D3DCCD1}">
-              <a14:hiddenFill xmlns:a14="http://schemas.microsoft.com/office/drawing/2010/main">
-                <a:solidFill>
-                  <a:schemeClr val="accent1"/>
-                </a:solidFill>
-              </a14:hiddenFill>
-            </a:ext>
-            <a:ext uri="{91240B29-F687-4F45-9708-019B960494DF}">
-              <a14:hiddenLine xmlns:a14="http://schemas.microsoft.com/office/drawing/2010/main" w="9525">
-                <a:solidFill>
-                  <a:schemeClr val="tx1"/>
-                </a:solidFill>
-                <a:miter lim="800000"/>
-                <a:headEnd/>
-                <a:tailEnd/>
-              </a14:hiddenLine>
-            </a:ext>
-          </a:extLst>
-        </p:spPr>
-      </p:pic>
       <p:sp>
         <p:nvSpPr>
           <p:cNvPr id="28" name="Rechteck 27"/>
@@ -9444,7 +9440,7 @@
         </p:nvSpPr>
         <p:spPr>
           <a:xfrm>
-            <a:off x="4865261" y="-657769"/>
+            <a:off x="4823422" y="-191521"/>
             <a:ext cx="3897740" cy="3566069"/>
           </a:xfrm>
           <a:prstGeom prst="rect">
@@ -9622,11 +9618,7 @@
             </a:r>
             <a:r>
               <a:rPr lang="en-GB" sz="2000" b="1" smtClean="0"/>
-              <a:t>in </a:t>
-            </a:r>
-            <a:r>
-              <a:rPr lang="en-GB" sz="2000" b="1" smtClean="0"/>
-              <a:t>Release Notes.pptx</a:t>
+              <a:t>in Release Notes.pptx</a:t>
             </a:r>
             <a:endParaRPr lang="en-GB" sz="2000" b="1" dirty="0"/>
           </a:p>

</xml_diff>